<commit_message>
week5 - day 3 - final ppt
</commit_message>
<xml_diff>
--- a/Word representation.pptx
+++ b/Word representation.pptx
@@ -35,17 +35,20 @@
     <p:sldId id="294" r:id="rId29"/>
     <p:sldId id="296" r:id="rId30"/>
     <p:sldId id="297" r:id="rId31"/>
-    <p:sldId id="281" r:id="rId32"/>
-    <p:sldId id="282" r:id="rId33"/>
-    <p:sldId id="283" r:id="rId34"/>
-    <p:sldId id="284" r:id="rId35"/>
-    <p:sldId id="285" r:id="rId36"/>
-    <p:sldId id="286" r:id="rId37"/>
-    <p:sldId id="287" r:id="rId38"/>
-    <p:sldId id="288" r:id="rId39"/>
-    <p:sldId id="289" r:id="rId40"/>
-    <p:sldId id="290" r:id="rId41"/>
-    <p:sldId id="291" r:id="rId42"/>
+    <p:sldId id="298" r:id="rId32"/>
+    <p:sldId id="300" r:id="rId33"/>
+    <p:sldId id="299" r:id="rId34"/>
+    <p:sldId id="281" r:id="rId35"/>
+    <p:sldId id="282" r:id="rId36"/>
+    <p:sldId id="283" r:id="rId37"/>
+    <p:sldId id="284" r:id="rId38"/>
+    <p:sldId id="285" r:id="rId39"/>
+    <p:sldId id="286" r:id="rId40"/>
+    <p:sldId id="287" r:id="rId41"/>
+    <p:sldId id="288" r:id="rId42"/>
+    <p:sldId id="289" r:id="rId43"/>
+    <p:sldId id="290" r:id="rId44"/>
+    <p:sldId id="291" r:id="rId45"/>
   </p:sldIdLst>
   <p:sldSz cx="12192000" cy="6858000"/>
   <p:notesSz cx="6858000" cy="9144000"/>
@@ -21719,7 +21722,7 @@
           </p:nvSpPr>
           <p:spPr>
             <a:xfrm>
-              <a:off x="9947840" y="3820981"/>
+              <a:off x="10149105" y="3820981"/>
               <a:ext cx="1504461" cy="508567"/>
             </a:xfrm>
             <a:prstGeom prst="rect">
@@ -22762,7 +22765,7 @@
           </p:nvSpPr>
           <p:spPr>
             <a:xfrm>
-              <a:off x="9947840" y="3820981"/>
+              <a:off x="10149105" y="3820981"/>
               <a:ext cx="1504461" cy="508567"/>
             </a:xfrm>
             <a:prstGeom prst="rect">
@@ -26075,10 +26078,10 @@
       </p:sp>
       <p:grpSp>
         <p:nvGrpSpPr>
-          <p:cNvPr id="15" name="Group 14">
+          <p:cNvPr id="5" name="Group 4">
             <a:extLst>
               <a:ext uri="{FF2B5EF4-FFF2-40B4-BE49-F238E27FC236}">
-                <a16:creationId xmlns:a16="http://schemas.microsoft.com/office/drawing/2014/main" id="{E8C9EF51-64F3-4C35-A655-9E608ADA7662}"/>
+                <a16:creationId xmlns:a16="http://schemas.microsoft.com/office/drawing/2014/main" id="{5D466965-D892-4A0F-86D1-89363AE669A8}"/>
               </a:ext>
             </a:extLst>
           </p:cNvPr>
@@ -26087,48 +26090,555 @@
         </p:nvGrpSpPr>
         <p:grpSpPr>
           <a:xfrm>
-            <a:off x="5374547" y="857504"/>
+            <a:off x="5545123" y="733934"/>
             <a:ext cx="5133101" cy="1666366"/>
             <a:chOff x="5374547" y="857504"/>
             <a:chExt cx="5133101" cy="1666366"/>
           </a:xfrm>
         </p:grpSpPr>
-        <p:pic>
-          <p:nvPicPr>
-            <p:cNvPr id="10" name="Picture 9">
+        <p:grpSp>
+          <p:nvGrpSpPr>
+            <p:cNvPr id="15" name="Group 14">
               <a:extLst>
                 <a:ext uri="{FF2B5EF4-FFF2-40B4-BE49-F238E27FC236}">
-                  <a16:creationId xmlns:a16="http://schemas.microsoft.com/office/drawing/2014/main" id="{D78198EE-0AC2-4CC8-97F3-98382466D112}"/>
+                  <a16:creationId xmlns:a16="http://schemas.microsoft.com/office/drawing/2014/main" id="{E8C9EF51-64F3-4C35-A655-9E608ADA7662}"/>
                 </a:ext>
               </a:extLst>
             </p:cNvPr>
-            <p:cNvPicPr>
-              <a:picLocks noChangeAspect="1"/>
-            </p:cNvPicPr>
+            <p:cNvGrpSpPr/>
             <p:nvPr/>
-          </p:nvPicPr>
-          <p:blipFill>
-            <a:blip r:embed="rId3"/>
-            <a:stretch>
-              <a:fillRect/>
-            </a:stretch>
-          </p:blipFill>
+          </p:nvGrpSpPr>
+          <p:grpSpPr>
+            <a:xfrm>
+              <a:off x="5374547" y="857504"/>
+              <a:ext cx="5133101" cy="1666366"/>
+              <a:chOff x="5374547" y="857504"/>
+              <a:chExt cx="5133101" cy="1666366"/>
+            </a:xfrm>
+          </p:grpSpPr>
+          <p:pic>
+            <p:nvPicPr>
+              <p:cNvPr id="10" name="Picture 9">
+                <a:extLst>
+                  <a:ext uri="{FF2B5EF4-FFF2-40B4-BE49-F238E27FC236}">
+                    <a16:creationId xmlns:a16="http://schemas.microsoft.com/office/drawing/2014/main" id="{D78198EE-0AC2-4CC8-97F3-98382466D112}"/>
+                  </a:ext>
+                </a:extLst>
+              </p:cNvPr>
+              <p:cNvPicPr>
+                <a:picLocks noChangeAspect="1"/>
+              </p:cNvPicPr>
+              <p:nvPr/>
+            </p:nvPicPr>
+            <p:blipFill>
+              <a:blip r:embed="rId3"/>
+              <a:stretch>
+                <a:fillRect/>
+              </a:stretch>
+            </p:blipFill>
+            <p:spPr>
+              <a:xfrm>
+                <a:off x="5545123" y="1128713"/>
+                <a:ext cx="4962525" cy="561975"/>
+              </a:xfrm>
+              <a:prstGeom prst="rect">
+                <a:avLst/>
+              </a:prstGeom>
+            </p:spPr>
+          </p:pic>
+          <p:sp>
+            <p:nvSpPr>
+              <p:cNvPr id="13" name="Subtitle 2">
+                <a:extLst>
+                  <a:ext uri="{FF2B5EF4-FFF2-40B4-BE49-F238E27FC236}">
+                    <a16:creationId xmlns:a16="http://schemas.microsoft.com/office/drawing/2014/main" id="{9B491875-4A08-4751-B6A6-6E1638D05EC4}"/>
+                  </a:ext>
+                </a:extLst>
+              </p:cNvPr>
+              <p:cNvSpPr txBox="1">
+                <a:spLocks/>
+              </p:cNvSpPr>
+              <p:nvPr/>
+            </p:nvSpPr>
+            <p:spPr>
+              <a:xfrm>
+                <a:off x="5683541" y="857504"/>
+                <a:ext cx="3552738" cy="340803"/>
+              </a:xfrm>
+              <a:prstGeom prst="rect">
+                <a:avLst/>
+              </a:prstGeom>
+            </p:spPr>
+            <p:txBody>
+              <a:bodyPr vert="horz" lIns="91440" tIns="45720" rIns="91440" bIns="45720" rtlCol="0">
+                <a:normAutofit fontScale="70000" lnSpcReduction="20000"/>
+              </a:bodyPr>
+              <a:lstStyle>
+                <a:lvl1pPr marL="228600" indent="-228600" algn="l" defTabSz="914400" rtl="0" eaLnBrk="1" latinLnBrk="0" hangingPunct="1">
+                  <a:lnSpc>
+                    <a:spcPct val="90000"/>
+                  </a:lnSpc>
+                  <a:spcBef>
+                    <a:spcPts val="1000"/>
+                  </a:spcBef>
+                  <a:buFont typeface="Arial" panose="020B0604020202020204" pitchFamily="34" charset="0"/>
+                  <a:buChar char="•"/>
+                  <a:defRPr sz="2800" kern="1200">
+                    <a:solidFill>
+                      <a:schemeClr val="tx1"/>
+                    </a:solidFill>
+                    <a:latin typeface="+mn-lt"/>
+                    <a:ea typeface="+mn-ea"/>
+                    <a:cs typeface="+mn-cs"/>
+                  </a:defRPr>
+                </a:lvl1pPr>
+                <a:lvl2pPr marL="685800" indent="-228600" algn="l" defTabSz="914400" rtl="0" eaLnBrk="1" latinLnBrk="0" hangingPunct="1">
+                  <a:lnSpc>
+                    <a:spcPct val="90000"/>
+                  </a:lnSpc>
+                  <a:spcBef>
+                    <a:spcPts val="500"/>
+                  </a:spcBef>
+                  <a:buFont typeface="Arial" panose="020B0604020202020204" pitchFamily="34" charset="0"/>
+                  <a:buChar char="•"/>
+                  <a:defRPr sz="2400" kern="1200">
+                    <a:solidFill>
+                      <a:schemeClr val="tx1"/>
+                    </a:solidFill>
+                    <a:latin typeface="+mn-lt"/>
+                    <a:ea typeface="+mn-ea"/>
+                    <a:cs typeface="+mn-cs"/>
+                  </a:defRPr>
+                </a:lvl2pPr>
+                <a:lvl3pPr marL="1143000" indent="-228600" algn="l" defTabSz="914400" rtl="0" eaLnBrk="1" latinLnBrk="0" hangingPunct="1">
+                  <a:lnSpc>
+                    <a:spcPct val="90000"/>
+                  </a:lnSpc>
+                  <a:spcBef>
+                    <a:spcPts val="500"/>
+                  </a:spcBef>
+                  <a:buFont typeface="Arial" panose="020B0604020202020204" pitchFamily="34" charset="0"/>
+                  <a:buChar char="•"/>
+                  <a:defRPr sz="2000" kern="1200">
+                    <a:solidFill>
+                      <a:schemeClr val="tx1"/>
+                    </a:solidFill>
+                    <a:latin typeface="+mn-lt"/>
+                    <a:ea typeface="+mn-ea"/>
+                    <a:cs typeface="+mn-cs"/>
+                  </a:defRPr>
+                </a:lvl3pPr>
+                <a:lvl4pPr marL="1600200" indent="-228600" algn="l" defTabSz="914400" rtl="0" eaLnBrk="1" latinLnBrk="0" hangingPunct="1">
+                  <a:lnSpc>
+                    <a:spcPct val="90000"/>
+                  </a:lnSpc>
+                  <a:spcBef>
+                    <a:spcPts val="500"/>
+                  </a:spcBef>
+                  <a:buFont typeface="Arial" panose="020B0604020202020204" pitchFamily="34" charset="0"/>
+                  <a:buChar char="•"/>
+                  <a:defRPr sz="1800" kern="1200">
+                    <a:solidFill>
+                      <a:schemeClr val="tx1"/>
+                    </a:solidFill>
+                    <a:latin typeface="+mn-lt"/>
+                    <a:ea typeface="+mn-ea"/>
+                    <a:cs typeface="+mn-cs"/>
+                  </a:defRPr>
+                </a:lvl4pPr>
+                <a:lvl5pPr marL="2057400" indent="-228600" algn="l" defTabSz="914400" rtl="0" eaLnBrk="1" latinLnBrk="0" hangingPunct="1">
+                  <a:lnSpc>
+                    <a:spcPct val="90000"/>
+                  </a:lnSpc>
+                  <a:spcBef>
+                    <a:spcPts val="500"/>
+                  </a:spcBef>
+                  <a:buFont typeface="Arial" panose="020B0604020202020204" pitchFamily="34" charset="0"/>
+                  <a:buChar char="•"/>
+                  <a:defRPr sz="1800" kern="1200">
+                    <a:solidFill>
+                      <a:schemeClr val="tx1"/>
+                    </a:solidFill>
+                    <a:latin typeface="+mn-lt"/>
+                    <a:ea typeface="+mn-ea"/>
+                    <a:cs typeface="+mn-cs"/>
+                  </a:defRPr>
+                </a:lvl5pPr>
+                <a:lvl6pPr marL="2514600" indent="-228600" algn="l" defTabSz="914400" rtl="0" eaLnBrk="1" latinLnBrk="0" hangingPunct="1">
+                  <a:lnSpc>
+                    <a:spcPct val="90000"/>
+                  </a:lnSpc>
+                  <a:spcBef>
+                    <a:spcPts val="500"/>
+                  </a:spcBef>
+                  <a:buFont typeface="Arial" panose="020B0604020202020204" pitchFamily="34" charset="0"/>
+                  <a:buChar char="•"/>
+                  <a:defRPr sz="1800" kern="1200">
+                    <a:solidFill>
+                      <a:schemeClr val="tx1"/>
+                    </a:solidFill>
+                    <a:latin typeface="+mn-lt"/>
+                    <a:ea typeface="+mn-ea"/>
+                    <a:cs typeface="+mn-cs"/>
+                  </a:defRPr>
+                </a:lvl6pPr>
+                <a:lvl7pPr marL="2971800" indent="-228600" algn="l" defTabSz="914400" rtl="0" eaLnBrk="1" latinLnBrk="0" hangingPunct="1">
+                  <a:lnSpc>
+                    <a:spcPct val="90000"/>
+                  </a:lnSpc>
+                  <a:spcBef>
+                    <a:spcPts val="500"/>
+                  </a:spcBef>
+                  <a:buFont typeface="Arial" panose="020B0604020202020204" pitchFamily="34" charset="0"/>
+                  <a:buChar char="•"/>
+                  <a:defRPr sz="1800" kern="1200">
+                    <a:solidFill>
+                      <a:schemeClr val="tx1"/>
+                    </a:solidFill>
+                    <a:latin typeface="+mn-lt"/>
+                    <a:ea typeface="+mn-ea"/>
+                    <a:cs typeface="+mn-cs"/>
+                  </a:defRPr>
+                </a:lvl7pPr>
+                <a:lvl8pPr marL="3429000" indent="-228600" algn="l" defTabSz="914400" rtl="0" eaLnBrk="1" latinLnBrk="0" hangingPunct="1">
+                  <a:lnSpc>
+                    <a:spcPct val="90000"/>
+                  </a:lnSpc>
+                  <a:spcBef>
+                    <a:spcPts val="500"/>
+                  </a:spcBef>
+                  <a:buFont typeface="Arial" panose="020B0604020202020204" pitchFamily="34" charset="0"/>
+                  <a:buChar char="•"/>
+                  <a:defRPr sz="1800" kern="1200">
+                    <a:solidFill>
+                      <a:schemeClr val="tx1"/>
+                    </a:solidFill>
+                    <a:latin typeface="+mn-lt"/>
+                    <a:ea typeface="+mn-ea"/>
+                    <a:cs typeface="+mn-cs"/>
+                  </a:defRPr>
+                </a:lvl8pPr>
+                <a:lvl9pPr marL="3886200" indent="-228600" algn="l" defTabSz="914400" rtl="0" eaLnBrk="1" latinLnBrk="0" hangingPunct="1">
+                  <a:lnSpc>
+                    <a:spcPct val="90000"/>
+                  </a:lnSpc>
+                  <a:spcBef>
+                    <a:spcPts val="500"/>
+                  </a:spcBef>
+                  <a:buFont typeface="Arial" panose="020B0604020202020204" pitchFamily="34" charset="0"/>
+                  <a:buChar char="•"/>
+                  <a:defRPr sz="1800" kern="1200">
+                    <a:solidFill>
+                      <a:schemeClr val="tx1"/>
+                    </a:solidFill>
+                    <a:latin typeface="+mn-lt"/>
+                    <a:ea typeface="+mn-ea"/>
+                    <a:cs typeface="+mn-cs"/>
+                  </a:defRPr>
+                </a:lvl9pPr>
+              </a:lstStyle>
+              <a:p>
+                <a:pPr marL="0" indent="0">
+                  <a:buNone/>
+                </a:pPr>
+                <a:r>
+                  <a:rPr lang="en-US" dirty="0" err="1">
+                    <a:latin typeface="Times New Roman" panose="02020603050405020304" pitchFamily="18" charset="0"/>
+                    <a:cs typeface="Times New Roman" panose="02020603050405020304" pitchFamily="18" charset="0"/>
+                  </a:rPr>
+                  <a:t>Đã</a:t>
+                </a:r>
+                <a:r>
+                  <a:rPr lang="en-US" dirty="0">
+                    <a:latin typeface="Times New Roman" panose="02020603050405020304" pitchFamily="18" charset="0"/>
+                    <a:cs typeface="Times New Roman" panose="02020603050405020304" pitchFamily="18" charset="0"/>
+                  </a:rPr>
+                  <a:t> </a:t>
+                </a:r>
+                <a:r>
+                  <a:rPr lang="en-US" dirty="0" err="1">
+                    <a:latin typeface="Times New Roman" panose="02020603050405020304" pitchFamily="18" charset="0"/>
+                    <a:cs typeface="Times New Roman" panose="02020603050405020304" pitchFamily="18" charset="0"/>
+                  </a:rPr>
+                  <a:t>sử</a:t>
+                </a:r>
+                <a:r>
+                  <a:rPr lang="en-US" dirty="0">
+                    <a:latin typeface="Times New Roman" panose="02020603050405020304" pitchFamily="18" charset="0"/>
+                    <a:cs typeface="Times New Roman" panose="02020603050405020304" pitchFamily="18" charset="0"/>
+                  </a:rPr>
+                  <a:t> </a:t>
+                </a:r>
+                <a:r>
+                  <a:rPr lang="en-US" dirty="0" err="1">
+                    <a:latin typeface="Times New Roman" panose="02020603050405020304" pitchFamily="18" charset="0"/>
+                    <a:cs typeface="Times New Roman" panose="02020603050405020304" pitchFamily="18" charset="0"/>
+                  </a:rPr>
+                  <a:t>dụng</a:t>
+                </a:r>
+                <a:r>
+                  <a:rPr lang="en-US" dirty="0">
+                    <a:latin typeface="Times New Roman" panose="02020603050405020304" pitchFamily="18" charset="0"/>
+                    <a:cs typeface="Times New Roman" panose="02020603050405020304" pitchFamily="18" charset="0"/>
+                  </a:rPr>
+                  <a:t> 75% hash dictionary</a:t>
+                </a:r>
+              </a:p>
+            </p:txBody>
+          </p:sp>
+          <p:sp>
+            <p:nvSpPr>
+              <p:cNvPr id="14" name="Subtitle 2">
+                <a:extLst>
+                  <a:ext uri="{FF2B5EF4-FFF2-40B4-BE49-F238E27FC236}">
+                    <a16:creationId xmlns:a16="http://schemas.microsoft.com/office/drawing/2014/main" id="{8C32594D-CDD2-47D3-B069-71E3271A8E2B}"/>
+                  </a:ext>
+                </a:extLst>
+              </p:cNvPr>
+              <p:cNvSpPr txBox="1">
+                <a:spLocks/>
+              </p:cNvSpPr>
+              <p:nvPr/>
+            </p:nvSpPr>
+            <p:spPr>
+              <a:xfrm>
+                <a:off x="5374547" y="2183067"/>
+                <a:ext cx="1152088" cy="340803"/>
+              </a:xfrm>
+              <a:prstGeom prst="rect">
+                <a:avLst/>
+              </a:prstGeom>
+            </p:spPr>
+            <p:txBody>
+              <a:bodyPr vert="horz" lIns="91440" tIns="45720" rIns="91440" bIns="45720" rtlCol="0">
+                <a:normAutofit fontScale="77500" lnSpcReduction="20000"/>
+              </a:bodyPr>
+              <a:lstStyle>
+                <a:lvl1pPr marL="228600" indent="-228600" algn="l" defTabSz="914400" rtl="0" eaLnBrk="1" latinLnBrk="0" hangingPunct="1">
+                  <a:lnSpc>
+                    <a:spcPct val="90000"/>
+                  </a:lnSpc>
+                  <a:spcBef>
+                    <a:spcPts val="1000"/>
+                  </a:spcBef>
+                  <a:buFont typeface="Arial" panose="020B0604020202020204" pitchFamily="34" charset="0"/>
+                  <a:buChar char="•"/>
+                  <a:defRPr sz="2800" kern="1200">
+                    <a:solidFill>
+                      <a:schemeClr val="tx1"/>
+                    </a:solidFill>
+                    <a:latin typeface="+mn-lt"/>
+                    <a:ea typeface="+mn-ea"/>
+                    <a:cs typeface="+mn-cs"/>
+                  </a:defRPr>
+                </a:lvl1pPr>
+                <a:lvl2pPr marL="685800" indent="-228600" algn="l" defTabSz="914400" rtl="0" eaLnBrk="1" latinLnBrk="0" hangingPunct="1">
+                  <a:lnSpc>
+                    <a:spcPct val="90000"/>
+                  </a:lnSpc>
+                  <a:spcBef>
+                    <a:spcPts val="500"/>
+                  </a:spcBef>
+                  <a:buFont typeface="Arial" panose="020B0604020202020204" pitchFamily="34" charset="0"/>
+                  <a:buChar char="•"/>
+                  <a:defRPr sz="2400" kern="1200">
+                    <a:solidFill>
+                      <a:schemeClr val="tx1"/>
+                    </a:solidFill>
+                    <a:latin typeface="+mn-lt"/>
+                    <a:ea typeface="+mn-ea"/>
+                    <a:cs typeface="+mn-cs"/>
+                  </a:defRPr>
+                </a:lvl2pPr>
+                <a:lvl3pPr marL="1143000" indent="-228600" algn="l" defTabSz="914400" rtl="0" eaLnBrk="1" latinLnBrk="0" hangingPunct="1">
+                  <a:lnSpc>
+                    <a:spcPct val="90000"/>
+                  </a:lnSpc>
+                  <a:spcBef>
+                    <a:spcPts val="500"/>
+                  </a:spcBef>
+                  <a:buFont typeface="Arial" panose="020B0604020202020204" pitchFamily="34" charset="0"/>
+                  <a:buChar char="•"/>
+                  <a:defRPr sz="2000" kern="1200">
+                    <a:solidFill>
+                      <a:schemeClr val="tx1"/>
+                    </a:solidFill>
+                    <a:latin typeface="+mn-lt"/>
+                    <a:ea typeface="+mn-ea"/>
+                    <a:cs typeface="+mn-cs"/>
+                  </a:defRPr>
+                </a:lvl3pPr>
+                <a:lvl4pPr marL="1600200" indent="-228600" algn="l" defTabSz="914400" rtl="0" eaLnBrk="1" latinLnBrk="0" hangingPunct="1">
+                  <a:lnSpc>
+                    <a:spcPct val="90000"/>
+                  </a:lnSpc>
+                  <a:spcBef>
+                    <a:spcPts val="500"/>
+                  </a:spcBef>
+                  <a:buFont typeface="Arial" panose="020B0604020202020204" pitchFamily="34" charset="0"/>
+                  <a:buChar char="•"/>
+                  <a:defRPr sz="1800" kern="1200">
+                    <a:solidFill>
+                      <a:schemeClr val="tx1"/>
+                    </a:solidFill>
+                    <a:latin typeface="+mn-lt"/>
+                    <a:ea typeface="+mn-ea"/>
+                    <a:cs typeface="+mn-cs"/>
+                  </a:defRPr>
+                </a:lvl4pPr>
+                <a:lvl5pPr marL="2057400" indent="-228600" algn="l" defTabSz="914400" rtl="0" eaLnBrk="1" latinLnBrk="0" hangingPunct="1">
+                  <a:lnSpc>
+                    <a:spcPct val="90000"/>
+                  </a:lnSpc>
+                  <a:spcBef>
+                    <a:spcPts val="500"/>
+                  </a:spcBef>
+                  <a:buFont typeface="Arial" panose="020B0604020202020204" pitchFamily="34" charset="0"/>
+                  <a:buChar char="•"/>
+                  <a:defRPr sz="1800" kern="1200">
+                    <a:solidFill>
+                      <a:schemeClr val="tx1"/>
+                    </a:solidFill>
+                    <a:latin typeface="+mn-lt"/>
+                    <a:ea typeface="+mn-ea"/>
+                    <a:cs typeface="+mn-cs"/>
+                  </a:defRPr>
+                </a:lvl5pPr>
+                <a:lvl6pPr marL="2514600" indent="-228600" algn="l" defTabSz="914400" rtl="0" eaLnBrk="1" latinLnBrk="0" hangingPunct="1">
+                  <a:lnSpc>
+                    <a:spcPct val="90000"/>
+                  </a:lnSpc>
+                  <a:spcBef>
+                    <a:spcPts val="500"/>
+                  </a:spcBef>
+                  <a:buFont typeface="Arial" panose="020B0604020202020204" pitchFamily="34" charset="0"/>
+                  <a:buChar char="•"/>
+                  <a:defRPr sz="1800" kern="1200">
+                    <a:solidFill>
+                      <a:schemeClr val="tx1"/>
+                    </a:solidFill>
+                    <a:latin typeface="+mn-lt"/>
+                    <a:ea typeface="+mn-ea"/>
+                    <a:cs typeface="+mn-cs"/>
+                  </a:defRPr>
+                </a:lvl6pPr>
+                <a:lvl7pPr marL="2971800" indent="-228600" algn="l" defTabSz="914400" rtl="0" eaLnBrk="1" latinLnBrk="0" hangingPunct="1">
+                  <a:lnSpc>
+                    <a:spcPct val="90000"/>
+                  </a:lnSpc>
+                  <a:spcBef>
+                    <a:spcPts val="500"/>
+                  </a:spcBef>
+                  <a:buFont typeface="Arial" panose="020B0604020202020204" pitchFamily="34" charset="0"/>
+                  <a:buChar char="•"/>
+                  <a:defRPr sz="1800" kern="1200">
+                    <a:solidFill>
+                      <a:schemeClr val="tx1"/>
+                    </a:solidFill>
+                    <a:latin typeface="+mn-lt"/>
+                    <a:ea typeface="+mn-ea"/>
+                    <a:cs typeface="+mn-cs"/>
+                  </a:defRPr>
+                </a:lvl7pPr>
+                <a:lvl8pPr marL="3429000" indent="-228600" algn="l" defTabSz="914400" rtl="0" eaLnBrk="1" latinLnBrk="0" hangingPunct="1">
+                  <a:lnSpc>
+                    <a:spcPct val="90000"/>
+                  </a:lnSpc>
+                  <a:spcBef>
+                    <a:spcPts val="500"/>
+                  </a:spcBef>
+                  <a:buFont typeface="Arial" panose="020B0604020202020204" pitchFamily="34" charset="0"/>
+                  <a:buChar char="•"/>
+                  <a:defRPr sz="1800" kern="1200">
+                    <a:solidFill>
+                      <a:schemeClr val="tx1"/>
+                    </a:solidFill>
+                    <a:latin typeface="+mn-lt"/>
+                    <a:ea typeface="+mn-ea"/>
+                    <a:cs typeface="+mn-cs"/>
+                  </a:defRPr>
+                </a:lvl8pPr>
+                <a:lvl9pPr marL="3886200" indent="-228600" algn="l" defTabSz="914400" rtl="0" eaLnBrk="1" latinLnBrk="0" hangingPunct="1">
+                  <a:lnSpc>
+                    <a:spcPct val="90000"/>
+                  </a:lnSpc>
+                  <a:spcBef>
+                    <a:spcPts val="500"/>
+                  </a:spcBef>
+                  <a:buFont typeface="Arial" panose="020B0604020202020204" pitchFamily="34" charset="0"/>
+                  <a:buChar char="•"/>
+                  <a:defRPr sz="1800" kern="1200">
+                    <a:solidFill>
+                      <a:schemeClr val="tx1"/>
+                    </a:solidFill>
+                    <a:latin typeface="+mn-lt"/>
+                    <a:ea typeface="+mn-ea"/>
+                    <a:cs typeface="+mn-cs"/>
+                  </a:defRPr>
+                </a:lvl9pPr>
+              </a:lstStyle>
+              <a:p>
+                <a:pPr marL="0" indent="0">
+                  <a:buNone/>
+                </a:pPr>
+                <a:r>
+                  <a:rPr lang="en-US" dirty="0">
+                    <a:latin typeface="Times New Roman" panose="02020603050405020304" pitchFamily="18" charset="0"/>
+                    <a:cs typeface="Times New Roman" panose="02020603050405020304" pitchFamily="18" charset="0"/>
+                  </a:rPr>
+                  <a:t>science</a:t>
+                </a:r>
+              </a:p>
+            </p:txBody>
+          </p:sp>
+        </p:grpSp>
+        <p:cxnSp>
+          <p:nvCxnSpPr>
+            <p:cNvPr id="12" name="Straight Arrow Connector 11">
+              <a:extLst>
+                <a:ext uri="{FF2B5EF4-FFF2-40B4-BE49-F238E27FC236}">
+                  <a16:creationId xmlns:a16="http://schemas.microsoft.com/office/drawing/2014/main" id="{5C883ED7-8523-47FA-AA2C-423A8043078C}"/>
+                </a:ext>
+              </a:extLst>
+            </p:cNvPr>
+            <p:cNvCxnSpPr>
+              <a:stCxn id="14" idx="0"/>
+            </p:cNvCxnSpPr>
+            <p:nvPr/>
+          </p:nvCxnSpPr>
           <p:spPr>
-            <a:xfrm>
-              <a:off x="5545123" y="1128713"/>
-              <a:ext cx="4962525" cy="561975"/>
+            <a:xfrm flipV="1">
+              <a:off x="5950591" y="1619075"/>
+              <a:ext cx="651545" cy="563992"/>
             </a:xfrm>
-            <a:prstGeom prst="rect">
+            <a:prstGeom prst="straightConnector1">
               <a:avLst/>
             </a:prstGeom>
+            <a:ln>
+              <a:tailEnd type="triangle"/>
+            </a:ln>
           </p:spPr>
-        </p:pic>
+          <p:style>
+            <a:lnRef idx="1">
+              <a:schemeClr val="dk1"/>
+            </a:lnRef>
+            <a:fillRef idx="0">
+              <a:schemeClr val="dk1"/>
+            </a:fillRef>
+            <a:effectRef idx="0">
+              <a:schemeClr val="dk1"/>
+            </a:effectRef>
+            <a:fontRef idx="minor">
+              <a:schemeClr val="tx1"/>
+            </a:fontRef>
+          </p:style>
+        </p:cxnSp>
         <p:sp>
           <p:nvSpPr>
-            <p:cNvPr id="13" name="Subtitle 2">
+            <p:cNvPr id="11" name="Subtitle 2">
               <a:extLst>
                 <a:ext uri="{FF2B5EF4-FFF2-40B4-BE49-F238E27FC236}">
-                  <a16:creationId xmlns:a16="http://schemas.microsoft.com/office/drawing/2014/main" id="{9B491875-4A08-4751-B6A6-6E1638D05EC4}"/>
+                  <a16:creationId xmlns:a16="http://schemas.microsoft.com/office/drawing/2014/main" id="{DE89707F-086F-43FD-AA51-B4165338030B}"/>
                 </a:ext>
               </a:extLst>
             </p:cNvPr>
@@ -26139,248 +26649,8 @@
           </p:nvSpPr>
           <p:spPr>
             <a:xfrm>
-              <a:off x="5683541" y="857504"/>
-              <a:ext cx="3552738" cy="340803"/>
-            </a:xfrm>
-            <a:prstGeom prst="rect">
-              <a:avLst/>
-            </a:prstGeom>
-          </p:spPr>
-          <p:txBody>
-            <a:bodyPr vert="horz" lIns="91440" tIns="45720" rIns="91440" bIns="45720" rtlCol="0">
-              <a:normAutofit fontScale="70000" lnSpcReduction="20000"/>
-            </a:bodyPr>
-            <a:lstStyle>
-              <a:lvl1pPr marL="228600" indent="-228600" algn="l" defTabSz="914400" rtl="0" eaLnBrk="1" latinLnBrk="0" hangingPunct="1">
-                <a:lnSpc>
-                  <a:spcPct val="90000"/>
-                </a:lnSpc>
-                <a:spcBef>
-                  <a:spcPts val="1000"/>
-                </a:spcBef>
-                <a:buFont typeface="Arial" panose="020B0604020202020204" pitchFamily="34" charset="0"/>
-                <a:buChar char="•"/>
-                <a:defRPr sz="2800" kern="1200">
-                  <a:solidFill>
-                    <a:schemeClr val="tx1"/>
-                  </a:solidFill>
-                  <a:latin typeface="+mn-lt"/>
-                  <a:ea typeface="+mn-ea"/>
-                  <a:cs typeface="+mn-cs"/>
-                </a:defRPr>
-              </a:lvl1pPr>
-              <a:lvl2pPr marL="685800" indent="-228600" algn="l" defTabSz="914400" rtl="0" eaLnBrk="1" latinLnBrk="0" hangingPunct="1">
-                <a:lnSpc>
-                  <a:spcPct val="90000"/>
-                </a:lnSpc>
-                <a:spcBef>
-                  <a:spcPts val="500"/>
-                </a:spcBef>
-                <a:buFont typeface="Arial" panose="020B0604020202020204" pitchFamily="34" charset="0"/>
-                <a:buChar char="•"/>
-                <a:defRPr sz="2400" kern="1200">
-                  <a:solidFill>
-                    <a:schemeClr val="tx1"/>
-                  </a:solidFill>
-                  <a:latin typeface="+mn-lt"/>
-                  <a:ea typeface="+mn-ea"/>
-                  <a:cs typeface="+mn-cs"/>
-                </a:defRPr>
-              </a:lvl2pPr>
-              <a:lvl3pPr marL="1143000" indent="-228600" algn="l" defTabSz="914400" rtl="0" eaLnBrk="1" latinLnBrk="0" hangingPunct="1">
-                <a:lnSpc>
-                  <a:spcPct val="90000"/>
-                </a:lnSpc>
-                <a:spcBef>
-                  <a:spcPts val="500"/>
-                </a:spcBef>
-                <a:buFont typeface="Arial" panose="020B0604020202020204" pitchFamily="34" charset="0"/>
-                <a:buChar char="•"/>
-                <a:defRPr sz="2000" kern="1200">
-                  <a:solidFill>
-                    <a:schemeClr val="tx1"/>
-                  </a:solidFill>
-                  <a:latin typeface="+mn-lt"/>
-                  <a:ea typeface="+mn-ea"/>
-                  <a:cs typeface="+mn-cs"/>
-                </a:defRPr>
-              </a:lvl3pPr>
-              <a:lvl4pPr marL="1600200" indent="-228600" algn="l" defTabSz="914400" rtl="0" eaLnBrk="1" latinLnBrk="0" hangingPunct="1">
-                <a:lnSpc>
-                  <a:spcPct val="90000"/>
-                </a:lnSpc>
-                <a:spcBef>
-                  <a:spcPts val="500"/>
-                </a:spcBef>
-                <a:buFont typeface="Arial" panose="020B0604020202020204" pitchFamily="34" charset="0"/>
-                <a:buChar char="•"/>
-                <a:defRPr sz="1800" kern="1200">
-                  <a:solidFill>
-                    <a:schemeClr val="tx1"/>
-                  </a:solidFill>
-                  <a:latin typeface="+mn-lt"/>
-                  <a:ea typeface="+mn-ea"/>
-                  <a:cs typeface="+mn-cs"/>
-                </a:defRPr>
-              </a:lvl4pPr>
-              <a:lvl5pPr marL="2057400" indent="-228600" algn="l" defTabSz="914400" rtl="0" eaLnBrk="1" latinLnBrk="0" hangingPunct="1">
-                <a:lnSpc>
-                  <a:spcPct val="90000"/>
-                </a:lnSpc>
-                <a:spcBef>
-                  <a:spcPts val="500"/>
-                </a:spcBef>
-                <a:buFont typeface="Arial" panose="020B0604020202020204" pitchFamily="34" charset="0"/>
-                <a:buChar char="•"/>
-                <a:defRPr sz="1800" kern="1200">
-                  <a:solidFill>
-                    <a:schemeClr val="tx1"/>
-                  </a:solidFill>
-                  <a:latin typeface="+mn-lt"/>
-                  <a:ea typeface="+mn-ea"/>
-                  <a:cs typeface="+mn-cs"/>
-                </a:defRPr>
-              </a:lvl5pPr>
-              <a:lvl6pPr marL="2514600" indent="-228600" algn="l" defTabSz="914400" rtl="0" eaLnBrk="1" latinLnBrk="0" hangingPunct="1">
-                <a:lnSpc>
-                  <a:spcPct val="90000"/>
-                </a:lnSpc>
-                <a:spcBef>
-                  <a:spcPts val="500"/>
-                </a:spcBef>
-                <a:buFont typeface="Arial" panose="020B0604020202020204" pitchFamily="34" charset="0"/>
-                <a:buChar char="•"/>
-                <a:defRPr sz="1800" kern="1200">
-                  <a:solidFill>
-                    <a:schemeClr val="tx1"/>
-                  </a:solidFill>
-                  <a:latin typeface="+mn-lt"/>
-                  <a:ea typeface="+mn-ea"/>
-                  <a:cs typeface="+mn-cs"/>
-                </a:defRPr>
-              </a:lvl6pPr>
-              <a:lvl7pPr marL="2971800" indent="-228600" algn="l" defTabSz="914400" rtl="0" eaLnBrk="1" latinLnBrk="0" hangingPunct="1">
-                <a:lnSpc>
-                  <a:spcPct val="90000"/>
-                </a:lnSpc>
-                <a:spcBef>
-                  <a:spcPts val="500"/>
-                </a:spcBef>
-                <a:buFont typeface="Arial" panose="020B0604020202020204" pitchFamily="34" charset="0"/>
-                <a:buChar char="•"/>
-                <a:defRPr sz="1800" kern="1200">
-                  <a:solidFill>
-                    <a:schemeClr val="tx1"/>
-                  </a:solidFill>
-                  <a:latin typeface="+mn-lt"/>
-                  <a:ea typeface="+mn-ea"/>
-                  <a:cs typeface="+mn-cs"/>
-                </a:defRPr>
-              </a:lvl7pPr>
-              <a:lvl8pPr marL="3429000" indent="-228600" algn="l" defTabSz="914400" rtl="0" eaLnBrk="1" latinLnBrk="0" hangingPunct="1">
-                <a:lnSpc>
-                  <a:spcPct val="90000"/>
-                </a:lnSpc>
-                <a:spcBef>
-                  <a:spcPts val="500"/>
-                </a:spcBef>
-                <a:buFont typeface="Arial" panose="020B0604020202020204" pitchFamily="34" charset="0"/>
-                <a:buChar char="•"/>
-                <a:defRPr sz="1800" kern="1200">
-                  <a:solidFill>
-                    <a:schemeClr val="tx1"/>
-                  </a:solidFill>
-                  <a:latin typeface="+mn-lt"/>
-                  <a:ea typeface="+mn-ea"/>
-                  <a:cs typeface="+mn-cs"/>
-                </a:defRPr>
-              </a:lvl8pPr>
-              <a:lvl9pPr marL="3886200" indent="-228600" algn="l" defTabSz="914400" rtl="0" eaLnBrk="1" latinLnBrk="0" hangingPunct="1">
-                <a:lnSpc>
-                  <a:spcPct val="90000"/>
-                </a:lnSpc>
-                <a:spcBef>
-                  <a:spcPts val="500"/>
-                </a:spcBef>
-                <a:buFont typeface="Arial" panose="020B0604020202020204" pitchFamily="34" charset="0"/>
-                <a:buChar char="•"/>
-                <a:defRPr sz="1800" kern="1200">
-                  <a:solidFill>
-                    <a:schemeClr val="tx1"/>
-                  </a:solidFill>
-                  <a:latin typeface="+mn-lt"/>
-                  <a:ea typeface="+mn-ea"/>
-                  <a:cs typeface="+mn-cs"/>
-                </a:defRPr>
-              </a:lvl9pPr>
-            </a:lstStyle>
-            <a:p>
-              <a:pPr marL="0" indent="0">
-                <a:buNone/>
-              </a:pPr>
-              <a:r>
-                <a:rPr lang="en-US" dirty="0" err="1">
-                  <a:latin typeface="Times New Roman" panose="02020603050405020304" pitchFamily="18" charset="0"/>
-                  <a:cs typeface="Times New Roman" panose="02020603050405020304" pitchFamily="18" charset="0"/>
-                </a:rPr>
-                <a:t>Đã</a:t>
-              </a:r>
-              <a:r>
-                <a:rPr lang="en-US" dirty="0">
-                  <a:latin typeface="Times New Roman" panose="02020603050405020304" pitchFamily="18" charset="0"/>
-                  <a:cs typeface="Times New Roman" panose="02020603050405020304" pitchFamily="18" charset="0"/>
-                </a:rPr>
-                <a:t> </a:t>
-              </a:r>
-              <a:r>
-                <a:rPr lang="en-US" dirty="0" err="1">
-                  <a:latin typeface="Times New Roman" panose="02020603050405020304" pitchFamily="18" charset="0"/>
-                  <a:cs typeface="Times New Roman" panose="02020603050405020304" pitchFamily="18" charset="0"/>
-                </a:rPr>
-                <a:t>sử</a:t>
-              </a:r>
-              <a:r>
-                <a:rPr lang="en-US" dirty="0">
-                  <a:latin typeface="Times New Roman" panose="02020603050405020304" pitchFamily="18" charset="0"/>
-                  <a:cs typeface="Times New Roman" panose="02020603050405020304" pitchFamily="18" charset="0"/>
-                </a:rPr>
-                <a:t> </a:t>
-              </a:r>
-              <a:r>
-                <a:rPr lang="en-US" dirty="0" err="1">
-                  <a:latin typeface="Times New Roman" panose="02020603050405020304" pitchFamily="18" charset="0"/>
-                  <a:cs typeface="Times New Roman" panose="02020603050405020304" pitchFamily="18" charset="0"/>
-                </a:rPr>
-                <a:t>dụng</a:t>
-              </a:r>
-              <a:r>
-                <a:rPr lang="en-US" dirty="0">
-                  <a:latin typeface="Times New Roman" panose="02020603050405020304" pitchFamily="18" charset="0"/>
-                  <a:cs typeface="Times New Roman" panose="02020603050405020304" pitchFamily="18" charset="0"/>
-                </a:rPr>
-                <a:t> 75% hash dictionary</a:t>
-              </a:r>
-            </a:p>
-          </p:txBody>
-        </p:sp>
-        <p:sp>
-          <p:nvSpPr>
-            <p:cNvPr id="14" name="Subtitle 2">
-              <a:extLst>
-                <a:ext uri="{FF2B5EF4-FFF2-40B4-BE49-F238E27FC236}">
-                  <a16:creationId xmlns:a16="http://schemas.microsoft.com/office/drawing/2014/main" id="{8C32594D-CDD2-47D3-B069-71E3271A8E2B}"/>
-                </a:ext>
-              </a:extLst>
-            </p:cNvPr>
-            <p:cNvSpPr txBox="1">
-              <a:spLocks/>
-            </p:cNvSpPr>
-            <p:nvPr/>
-          </p:nvSpPr>
-          <p:spPr>
-            <a:xfrm>
-              <a:off x="5374547" y="2183067"/>
-              <a:ext cx="1152088" cy="340803"/>
+              <a:off x="6874297" y="2183066"/>
+              <a:ext cx="860353" cy="340803"/>
             </a:xfrm>
             <a:prstGeom prst="rect">
               <a:avLst/>
@@ -26563,59 +26833,922 @@
                   <a:latin typeface="Times New Roman" panose="02020603050405020304" pitchFamily="18" charset="0"/>
                   <a:cs typeface="Times New Roman" panose="02020603050405020304" pitchFamily="18" charset="0"/>
                 </a:rPr>
-                <a:t>science</a:t>
+                <a:t>N = 3</a:t>
               </a:r>
             </a:p>
           </p:txBody>
         </p:sp>
       </p:grpSp>
-      <p:cxnSp>
-        <p:nvCxnSpPr>
-          <p:cNvPr id="12" name="Straight Arrow Connector 11">
+      <p:grpSp>
+        <p:nvGrpSpPr>
+          <p:cNvPr id="16" name="Group 15">
             <a:extLst>
               <a:ext uri="{FF2B5EF4-FFF2-40B4-BE49-F238E27FC236}">
-                <a16:creationId xmlns:a16="http://schemas.microsoft.com/office/drawing/2014/main" id="{5C883ED7-8523-47FA-AA2C-423A8043078C}"/>
+                <a16:creationId xmlns:a16="http://schemas.microsoft.com/office/drawing/2014/main" id="{FCCCE144-FD89-40F2-B72F-D792151195E6}"/>
               </a:ext>
             </a:extLst>
           </p:cNvPr>
-          <p:cNvCxnSpPr>
-            <a:stCxn id="14" idx="0"/>
-          </p:cNvCxnSpPr>
+          <p:cNvGrpSpPr/>
           <p:nvPr/>
-        </p:nvCxnSpPr>
+        </p:nvGrpSpPr>
+        <p:grpSpPr>
+          <a:xfrm>
+            <a:off x="5545123" y="2595817"/>
+            <a:ext cx="5133101" cy="1666366"/>
+            <a:chOff x="5374547" y="857504"/>
+            <a:chExt cx="5133101" cy="1666366"/>
+          </a:xfrm>
+        </p:grpSpPr>
+        <p:grpSp>
+          <p:nvGrpSpPr>
+            <p:cNvPr id="17" name="Group 16">
+              <a:extLst>
+                <a:ext uri="{FF2B5EF4-FFF2-40B4-BE49-F238E27FC236}">
+                  <a16:creationId xmlns:a16="http://schemas.microsoft.com/office/drawing/2014/main" id="{4A1788DE-DA5C-4455-926D-5D8EFDBB0218}"/>
+                </a:ext>
+              </a:extLst>
+            </p:cNvPr>
+            <p:cNvGrpSpPr/>
+            <p:nvPr/>
+          </p:nvGrpSpPr>
+          <p:grpSpPr>
+            <a:xfrm>
+              <a:off x="5374547" y="857504"/>
+              <a:ext cx="5133101" cy="1666366"/>
+              <a:chOff x="5374547" y="857504"/>
+              <a:chExt cx="5133101" cy="1666366"/>
+            </a:xfrm>
+          </p:grpSpPr>
+          <p:pic>
+            <p:nvPicPr>
+              <p:cNvPr id="21" name="Picture 20">
+                <a:extLst>
+                  <a:ext uri="{FF2B5EF4-FFF2-40B4-BE49-F238E27FC236}">
+                    <a16:creationId xmlns:a16="http://schemas.microsoft.com/office/drawing/2014/main" id="{52F95174-7170-4253-A2B8-A85409D8B7BD}"/>
+                  </a:ext>
+                </a:extLst>
+              </p:cNvPr>
+              <p:cNvPicPr>
+                <a:picLocks noChangeAspect="1"/>
+              </p:cNvPicPr>
+              <p:nvPr/>
+            </p:nvPicPr>
+            <p:blipFill>
+              <a:blip r:embed="rId3"/>
+              <a:stretch>
+                <a:fillRect/>
+              </a:stretch>
+            </p:blipFill>
+            <p:spPr>
+              <a:xfrm>
+                <a:off x="5545123" y="1128713"/>
+                <a:ext cx="4962525" cy="561975"/>
+              </a:xfrm>
+              <a:prstGeom prst="rect">
+                <a:avLst/>
+              </a:prstGeom>
+            </p:spPr>
+          </p:pic>
+          <p:sp>
+            <p:nvSpPr>
+              <p:cNvPr id="22" name="Subtitle 2">
+                <a:extLst>
+                  <a:ext uri="{FF2B5EF4-FFF2-40B4-BE49-F238E27FC236}">
+                    <a16:creationId xmlns:a16="http://schemas.microsoft.com/office/drawing/2014/main" id="{02FED38C-A91B-4078-8E07-70EDFF9F6B09}"/>
+                  </a:ext>
+                </a:extLst>
+              </p:cNvPr>
+              <p:cNvSpPr txBox="1">
+                <a:spLocks/>
+              </p:cNvSpPr>
+              <p:nvPr/>
+            </p:nvSpPr>
+            <p:spPr>
+              <a:xfrm>
+                <a:off x="5683541" y="857504"/>
+                <a:ext cx="3552738" cy="340803"/>
+              </a:xfrm>
+              <a:prstGeom prst="rect">
+                <a:avLst/>
+              </a:prstGeom>
+            </p:spPr>
+            <p:txBody>
+              <a:bodyPr vert="horz" lIns="91440" tIns="45720" rIns="91440" bIns="45720" rtlCol="0">
+                <a:normAutofit fontScale="70000" lnSpcReduction="20000"/>
+              </a:bodyPr>
+              <a:lstStyle>
+                <a:lvl1pPr marL="228600" indent="-228600" algn="l" defTabSz="914400" rtl="0" eaLnBrk="1" latinLnBrk="0" hangingPunct="1">
+                  <a:lnSpc>
+                    <a:spcPct val="90000"/>
+                  </a:lnSpc>
+                  <a:spcBef>
+                    <a:spcPts val="1000"/>
+                  </a:spcBef>
+                  <a:buFont typeface="Arial" panose="020B0604020202020204" pitchFamily="34" charset="0"/>
+                  <a:buChar char="•"/>
+                  <a:defRPr sz="2800" kern="1200">
+                    <a:solidFill>
+                      <a:schemeClr val="tx1"/>
+                    </a:solidFill>
+                    <a:latin typeface="+mn-lt"/>
+                    <a:ea typeface="+mn-ea"/>
+                    <a:cs typeface="+mn-cs"/>
+                  </a:defRPr>
+                </a:lvl1pPr>
+                <a:lvl2pPr marL="685800" indent="-228600" algn="l" defTabSz="914400" rtl="0" eaLnBrk="1" latinLnBrk="0" hangingPunct="1">
+                  <a:lnSpc>
+                    <a:spcPct val="90000"/>
+                  </a:lnSpc>
+                  <a:spcBef>
+                    <a:spcPts val="500"/>
+                  </a:spcBef>
+                  <a:buFont typeface="Arial" panose="020B0604020202020204" pitchFamily="34" charset="0"/>
+                  <a:buChar char="•"/>
+                  <a:defRPr sz="2400" kern="1200">
+                    <a:solidFill>
+                      <a:schemeClr val="tx1"/>
+                    </a:solidFill>
+                    <a:latin typeface="+mn-lt"/>
+                    <a:ea typeface="+mn-ea"/>
+                    <a:cs typeface="+mn-cs"/>
+                  </a:defRPr>
+                </a:lvl2pPr>
+                <a:lvl3pPr marL="1143000" indent="-228600" algn="l" defTabSz="914400" rtl="0" eaLnBrk="1" latinLnBrk="0" hangingPunct="1">
+                  <a:lnSpc>
+                    <a:spcPct val="90000"/>
+                  </a:lnSpc>
+                  <a:spcBef>
+                    <a:spcPts val="500"/>
+                  </a:spcBef>
+                  <a:buFont typeface="Arial" panose="020B0604020202020204" pitchFamily="34" charset="0"/>
+                  <a:buChar char="•"/>
+                  <a:defRPr sz="2000" kern="1200">
+                    <a:solidFill>
+                      <a:schemeClr val="tx1"/>
+                    </a:solidFill>
+                    <a:latin typeface="+mn-lt"/>
+                    <a:ea typeface="+mn-ea"/>
+                    <a:cs typeface="+mn-cs"/>
+                  </a:defRPr>
+                </a:lvl3pPr>
+                <a:lvl4pPr marL="1600200" indent="-228600" algn="l" defTabSz="914400" rtl="0" eaLnBrk="1" latinLnBrk="0" hangingPunct="1">
+                  <a:lnSpc>
+                    <a:spcPct val="90000"/>
+                  </a:lnSpc>
+                  <a:spcBef>
+                    <a:spcPts val="500"/>
+                  </a:spcBef>
+                  <a:buFont typeface="Arial" panose="020B0604020202020204" pitchFamily="34" charset="0"/>
+                  <a:buChar char="•"/>
+                  <a:defRPr sz="1800" kern="1200">
+                    <a:solidFill>
+                      <a:schemeClr val="tx1"/>
+                    </a:solidFill>
+                    <a:latin typeface="+mn-lt"/>
+                    <a:ea typeface="+mn-ea"/>
+                    <a:cs typeface="+mn-cs"/>
+                  </a:defRPr>
+                </a:lvl4pPr>
+                <a:lvl5pPr marL="2057400" indent="-228600" algn="l" defTabSz="914400" rtl="0" eaLnBrk="1" latinLnBrk="0" hangingPunct="1">
+                  <a:lnSpc>
+                    <a:spcPct val="90000"/>
+                  </a:lnSpc>
+                  <a:spcBef>
+                    <a:spcPts val="500"/>
+                  </a:spcBef>
+                  <a:buFont typeface="Arial" panose="020B0604020202020204" pitchFamily="34" charset="0"/>
+                  <a:buChar char="•"/>
+                  <a:defRPr sz="1800" kern="1200">
+                    <a:solidFill>
+                      <a:schemeClr val="tx1"/>
+                    </a:solidFill>
+                    <a:latin typeface="+mn-lt"/>
+                    <a:ea typeface="+mn-ea"/>
+                    <a:cs typeface="+mn-cs"/>
+                  </a:defRPr>
+                </a:lvl5pPr>
+                <a:lvl6pPr marL="2514600" indent="-228600" algn="l" defTabSz="914400" rtl="0" eaLnBrk="1" latinLnBrk="0" hangingPunct="1">
+                  <a:lnSpc>
+                    <a:spcPct val="90000"/>
+                  </a:lnSpc>
+                  <a:spcBef>
+                    <a:spcPts val="500"/>
+                  </a:spcBef>
+                  <a:buFont typeface="Arial" panose="020B0604020202020204" pitchFamily="34" charset="0"/>
+                  <a:buChar char="•"/>
+                  <a:defRPr sz="1800" kern="1200">
+                    <a:solidFill>
+                      <a:schemeClr val="tx1"/>
+                    </a:solidFill>
+                    <a:latin typeface="+mn-lt"/>
+                    <a:ea typeface="+mn-ea"/>
+                    <a:cs typeface="+mn-cs"/>
+                  </a:defRPr>
+                </a:lvl6pPr>
+                <a:lvl7pPr marL="2971800" indent="-228600" algn="l" defTabSz="914400" rtl="0" eaLnBrk="1" latinLnBrk="0" hangingPunct="1">
+                  <a:lnSpc>
+                    <a:spcPct val="90000"/>
+                  </a:lnSpc>
+                  <a:spcBef>
+                    <a:spcPts val="500"/>
+                  </a:spcBef>
+                  <a:buFont typeface="Arial" panose="020B0604020202020204" pitchFamily="34" charset="0"/>
+                  <a:buChar char="•"/>
+                  <a:defRPr sz="1800" kern="1200">
+                    <a:solidFill>
+                      <a:schemeClr val="tx1"/>
+                    </a:solidFill>
+                    <a:latin typeface="+mn-lt"/>
+                    <a:ea typeface="+mn-ea"/>
+                    <a:cs typeface="+mn-cs"/>
+                  </a:defRPr>
+                </a:lvl7pPr>
+                <a:lvl8pPr marL="3429000" indent="-228600" algn="l" defTabSz="914400" rtl="0" eaLnBrk="1" latinLnBrk="0" hangingPunct="1">
+                  <a:lnSpc>
+                    <a:spcPct val="90000"/>
+                  </a:lnSpc>
+                  <a:spcBef>
+                    <a:spcPts val="500"/>
+                  </a:spcBef>
+                  <a:buFont typeface="Arial" panose="020B0604020202020204" pitchFamily="34" charset="0"/>
+                  <a:buChar char="•"/>
+                  <a:defRPr sz="1800" kern="1200">
+                    <a:solidFill>
+                      <a:schemeClr val="tx1"/>
+                    </a:solidFill>
+                    <a:latin typeface="+mn-lt"/>
+                    <a:ea typeface="+mn-ea"/>
+                    <a:cs typeface="+mn-cs"/>
+                  </a:defRPr>
+                </a:lvl8pPr>
+                <a:lvl9pPr marL="3886200" indent="-228600" algn="l" defTabSz="914400" rtl="0" eaLnBrk="1" latinLnBrk="0" hangingPunct="1">
+                  <a:lnSpc>
+                    <a:spcPct val="90000"/>
+                  </a:lnSpc>
+                  <a:spcBef>
+                    <a:spcPts val="500"/>
+                  </a:spcBef>
+                  <a:buFont typeface="Arial" panose="020B0604020202020204" pitchFamily="34" charset="0"/>
+                  <a:buChar char="•"/>
+                  <a:defRPr sz="1800" kern="1200">
+                    <a:solidFill>
+                      <a:schemeClr val="tx1"/>
+                    </a:solidFill>
+                    <a:latin typeface="+mn-lt"/>
+                    <a:ea typeface="+mn-ea"/>
+                    <a:cs typeface="+mn-cs"/>
+                  </a:defRPr>
+                </a:lvl9pPr>
+              </a:lstStyle>
+              <a:p>
+                <a:pPr marL="0" indent="0">
+                  <a:buNone/>
+                </a:pPr>
+                <a:r>
+                  <a:rPr lang="en-US" dirty="0" err="1">
+                    <a:latin typeface="Times New Roman" panose="02020603050405020304" pitchFamily="18" charset="0"/>
+                    <a:cs typeface="Times New Roman" panose="02020603050405020304" pitchFamily="18" charset="0"/>
+                  </a:rPr>
+                  <a:t>Đã</a:t>
+                </a:r>
+                <a:r>
+                  <a:rPr lang="en-US" dirty="0">
+                    <a:latin typeface="Times New Roman" panose="02020603050405020304" pitchFamily="18" charset="0"/>
+                    <a:cs typeface="Times New Roman" panose="02020603050405020304" pitchFamily="18" charset="0"/>
+                  </a:rPr>
+                  <a:t> </a:t>
+                </a:r>
+                <a:r>
+                  <a:rPr lang="en-US" dirty="0" err="1">
+                    <a:latin typeface="Times New Roman" panose="02020603050405020304" pitchFamily="18" charset="0"/>
+                    <a:cs typeface="Times New Roman" panose="02020603050405020304" pitchFamily="18" charset="0"/>
+                  </a:rPr>
+                  <a:t>sử</a:t>
+                </a:r>
+                <a:r>
+                  <a:rPr lang="en-US" dirty="0">
+                    <a:latin typeface="Times New Roman" panose="02020603050405020304" pitchFamily="18" charset="0"/>
+                    <a:cs typeface="Times New Roman" panose="02020603050405020304" pitchFamily="18" charset="0"/>
+                  </a:rPr>
+                  <a:t> </a:t>
+                </a:r>
+                <a:r>
+                  <a:rPr lang="en-US" dirty="0" err="1">
+                    <a:latin typeface="Times New Roman" panose="02020603050405020304" pitchFamily="18" charset="0"/>
+                    <a:cs typeface="Times New Roman" panose="02020603050405020304" pitchFamily="18" charset="0"/>
+                  </a:rPr>
+                  <a:t>dụng</a:t>
+                </a:r>
+                <a:r>
+                  <a:rPr lang="en-US" dirty="0">
+                    <a:latin typeface="Times New Roman" panose="02020603050405020304" pitchFamily="18" charset="0"/>
+                    <a:cs typeface="Times New Roman" panose="02020603050405020304" pitchFamily="18" charset="0"/>
+                  </a:rPr>
+                  <a:t> 75% hash dictionary</a:t>
+                </a:r>
+              </a:p>
+            </p:txBody>
+          </p:sp>
+          <p:sp>
+            <p:nvSpPr>
+              <p:cNvPr id="23" name="Subtitle 2">
+                <a:extLst>
+                  <a:ext uri="{FF2B5EF4-FFF2-40B4-BE49-F238E27FC236}">
+                    <a16:creationId xmlns:a16="http://schemas.microsoft.com/office/drawing/2014/main" id="{2E3689F1-E8BA-4160-A734-AFFB63BA19B2}"/>
+                  </a:ext>
+                </a:extLst>
+              </p:cNvPr>
+              <p:cNvSpPr txBox="1">
+                <a:spLocks/>
+              </p:cNvSpPr>
+              <p:nvPr/>
+            </p:nvSpPr>
+            <p:spPr>
+              <a:xfrm>
+                <a:off x="5374547" y="2183067"/>
+                <a:ext cx="1152088" cy="340803"/>
+              </a:xfrm>
+              <a:prstGeom prst="rect">
+                <a:avLst/>
+              </a:prstGeom>
+            </p:spPr>
+            <p:txBody>
+              <a:bodyPr vert="horz" lIns="91440" tIns="45720" rIns="91440" bIns="45720" rtlCol="0">
+                <a:normAutofit fontScale="77500" lnSpcReduction="20000"/>
+              </a:bodyPr>
+              <a:lstStyle>
+                <a:lvl1pPr marL="228600" indent="-228600" algn="l" defTabSz="914400" rtl="0" eaLnBrk="1" latinLnBrk="0" hangingPunct="1">
+                  <a:lnSpc>
+                    <a:spcPct val="90000"/>
+                  </a:lnSpc>
+                  <a:spcBef>
+                    <a:spcPts val="1000"/>
+                  </a:spcBef>
+                  <a:buFont typeface="Arial" panose="020B0604020202020204" pitchFamily="34" charset="0"/>
+                  <a:buChar char="•"/>
+                  <a:defRPr sz="2800" kern="1200">
+                    <a:solidFill>
+                      <a:schemeClr val="tx1"/>
+                    </a:solidFill>
+                    <a:latin typeface="+mn-lt"/>
+                    <a:ea typeface="+mn-ea"/>
+                    <a:cs typeface="+mn-cs"/>
+                  </a:defRPr>
+                </a:lvl1pPr>
+                <a:lvl2pPr marL="685800" indent="-228600" algn="l" defTabSz="914400" rtl="0" eaLnBrk="1" latinLnBrk="0" hangingPunct="1">
+                  <a:lnSpc>
+                    <a:spcPct val="90000"/>
+                  </a:lnSpc>
+                  <a:spcBef>
+                    <a:spcPts val="500"/>
+                  </a:spcBef>
+                  <a:buFont typeface="Arial" panose="020B0604020202020204" pitchFamily="34" charset="0"/>
+                  <a:buChar char="•"/>
+                  <a:defRPr sz="2400" kern="1200">
+                    <a:solidFill>
+                      <a:schemeClr val="tx1"/>
+                    </a:solidFill>
+                    <a:latin typeface="+mn-lt"/>
+                    <a:ea typeface="+mn-ea"/>
+                    <a:cs typeface="+mn-cs"/>
+                  </a:defRPr>
+                </a:lvl2pPr>
+                <a:lvl3pPr marL="1143000" indent="-228600" algn="l" defTabSz="914400" rtl="0" eaLnBrk="1" latinLnBrk="0" hangingPunct="1">
+                  <a:lnSpc>
+                    <a:spcPct val="90000"/>
+                  </a:lnSpc>
+                  <a:spcBef>
+                    <a:spcPts val="500"/>
+                  </a:spcBef>
+                  <a:buFont typeface="Arial" panose="020B0604020202020204" pitchFamily="34" charset="0"/>
+                  <a:buChar char="•"/>
+                  <a:defRPr sz="2000" kern="1200">
+                    <a:solidFill>
+                      <a:schemeClr val="tx1"/>
+                    </a:solidFill>
+                    <a:latin typeface="+mn-lt"/>
+                    <a:ea typeface="+mn-ea"/>
+                    <a:cs typeface="+mn-cs"/>
+                  </a:defRPr>
+                </a:lvl3pPr>
+                <a:lvl4pPr marL="1600200" indent="-228600" algn="l" defTabSz="914400" rtl="0" eaLnBrk="1" latinLnBrk="0" hangingPunct="1">
+                  <a:lnSpc>
+                    <a:spcPct val="90000"/>
+                  </a:lnSpc>
+                  <a:spcBef>
+                    <a:spcPts val="500"/>
+                  </a:spcBef>
+                  <a:buFont typeface="Arial" panose="020B0604020202020204" pitchFamily="34" charset="0"/>
+                  <a:buChar char="•"/>
+                  <a:defRPr sz="1800" kern="1200">
+                    <a:solidFill>
+                      <a:schemeClr val="tx1"/>
+                    </a:solidFill>
+                    <a:latin typeface="+mn-lt"/>
+                    <a:ea typeface="+mn-ea"/>
+                    <a:cs typeface="+mn-cs"/>
+                  </a:defRPr>
+                </a:lvl4pPr>
+                <a:lvl5pPr marL="2057400" indent="-228600" algn="l" defTabSz="914400" rtl="0" eaLnBrk="1" latinLnBrk="0" hangingPunct="1">
+                  <a:lnSpc>
+                    <a:spcPct val="90000"/>
+                  </a:lnSpc>
+                  <a:spcBef>
+                    <a:spcPts val="500"/>
+                  </a:spcBef>
+                  <a:buFont typeface="Arial" panose="020B0604020202020204" pitchFamily="34" charset="0"/>
+                  <a:buChar char="•"/>
+                  <a:defRPr sz="1800" kern="1200">
+                    <a:solidFill>
+                      <a:schemeClr val="tx1"/>
+                    </a:solidFill>
+                    <a:latin typeface="+mn-lt"/>
+                    <a:ea typeface="+mn-ea"/>
+                    <a:cs typeface="+mn-cs"/>
+                  </a:defRPr>
+                </a:lvl5pPr>
+                <a:lvl6pPr marL="2514600" indent="-228600" algn="l" defTabSz="914400" rtl="0" eaLnBrk="1" latinLnBrk="0" hangingPunct="1">
+                  <a:lnSpc>
+                    <a:spcPct val="90000"/>
+                  </a:lnSpc>
+                  <a:spcBef>
+                    <a:spcPts val="500"/>
+                  </a:spcBef>
+                  <a:buFont typeface="Arial" panose="020B0604020202020204" pitchFamily="34" charset="0"/>
+                  <a:buChar char="•"/>
+                  <a:defRPr sz="1800" kern="1200">
+                    <a:solidFill>
+                      <a:schemeClr val="tx1"/>
+                    </a:solidFill>
+                    <a:latin typeface="+mn-lt"/>
+                    <a:ea typeface="+mn-ea"/>
+                    <a:cs typeface="+mn-cs"/>
+                  </a:defRPr>
+                </a:lvl6pPr>
+                <a:lvl7pPr marL="2971800" indent="-228600" algn="l" defTabSz="914400" rtl="0" eaLnBrk="1" latinLnBrk="0" hangingPunct="1">
+                  <a:lnSpc>
+                    <a:spcPct val="90000"/>
+                  </a:lnSpc>
+                  <a:spcBef>
+                    <a:spcPts val="500"/>
+                  </a:spcBef>
+                  <a:buFont typeface="Arial" panose="020B0604020202020204" pitchFamily="34" charset="0"/>
+                  <a:buChar char="•"/>
+                  <a:defRPr sz="1800" kern="1200">
+                    <a:solidFill>
+                      <a:schemeClr val="tx1"/>
+                    </a:solidFill>
+                    <a:latin typeface="+mn-lt"/>
+                    <a:ea typeface="+mn-ea"/>
+                    <a:cs typeface="+mn-cs"/>
+                  </a:defRPr>
+                </a:lvl7pPr>
+                <a:lvl8pPr marL="3429000" indent="-228600" algn="l" defTabSz="914400" rtl="0" eaLnBrk="1" latinLnBrk="0" hangingPunct="1">
+                  <a:lnSpc>
+                    <a:spcPct val="90000"/>
+                  </a:lnSpc>
+                  <a:spcBef>
+                    <a:spcPts val="500"/>
+                  </a:spcBef>
+                  <a:buFont typeface="Arial" panose="020B0604020202020204" pitchFamily="34" charset="0"/>
+                  <a:buChar char="•"/>
+                  <a:defRPr sz="1800" kern="1200">
+                    <a:solidFill>
+                      <a:schemeClr val="tx1"/>
+                    </a:solidFill>
+                    <a:latin typeface="+mn-lt"/>
+                    <a:ea typeface="+mn-ea"/>
+                    <a:cs typeface="+mn-cs"/>
+                  </a:defRPr>
+                </a:lvl8pPr>
+                <a:lvl9pPr marL="3886200" indent="-228600" algn="l" defTabSz="914400" rtl="0" eaLnBrk="1" latinLnBrk="0" hangingPunct="1">
+                  <a:lnSpc>
+                    <a:spcPct val="90000"/>
+                  </a:lnSpc>
+                  <a:spcBef>
+                    <a:spcPts val="500"/>
+                  </a:spcBef>
+                  <a:buFont typeface="Arial" panose="020B0604020202020204" pitchFamily="34" charset="0"/>
+                  <a:buChar char="•"/>
+                  <a:defRPr sz="1800" kern="1200">
+                    <a:solidFill>
+                      <a:schemeClr val="tx1"/>
+                    </a:solidFill>
+                    <a:latin typeface="+mn-lt"/>
+                    <a:ea typeface="+mn-ea"/>
+                    <a:cs typeface="+mn-cs"/>
+                  </a:defRPr>
+                </a:lvl9pPr>
+              </a:lstStyle>
+              <a:p>
+                <a:pPr marL="0" indent="0">
+                  <a:buNone/>
+                </a:pPr>
+                <a:r>
+                  <a:rPr lang="en-US" dirty="0">
+                    <a:latin typeface="Times New Roman" panose="02020603050405020304" pitchFamily="18" charset="0"/>
+                    <a:cs typeface="Times New Roman" panose="02020603050405020304" pitchFamily="18" charset="0"/>
+                  </a:rPr>
+                  <a:t>science</a:t>
+                </a:r>
+              </a:p>
+            </p:txBody>
+          </p:sp>
+        </p:grpSp>
+        <p:cxnSp>
+          <p:nvCxnSpPr>
+            <p:cNvPr id="19" name="Straight Arrow Connector 18">
+              <a:extLst>
+                <a:ext uri="{FF2B5EF4-FFF2-40B4-BE49-F238E27FC236}">
+                  <a16:creationId xmlns:a16="http://schemas.microsoft.com/office/drawing/2014/main" id="{E98414F2-F136-4DD9-841D-E89E57C1B90F}"/>
+                </a:ext>
+              </a:extLst>
+            </p:cNvPr>
+            <p:cNvCxnSpPr>
+              <a:stCxn id="23" idx="0"/>
+            </p:cNvCxnSpPr>
+            <p:nvPr/>
+          </p:nvCxnSpPr>
+          <p:spPr>
+            <a:xfrm flipV="1">
+              <a:off x="5950591" y="1619075"/>
+              <a:ext cx="651545" cy="563992"/>
+            </a:xfrm>
+            <a:prstGeom prst="straightConnector1">
+              <a:avLst/>
+            </a:prstGeom>
+            <a:ln>
+              <a:tailEnd type="triangle"/>
+            </a:ln>
+          </p:spPr>
+          <p:style>
+            <a:lnRef idx="1">
+              <a:schemeClr val="dk1"/>
+            </a:lnRef>
+            <a:fillRef idx="0">
+              <a:schemeClr val="dk1"/>
+            </a:fillRef>
+            <a:effectRef idx="0">
+              <a:schemeClr val="dk1"/>
+            </a:effectRef>
+            <a:fontRef idx="minor">
+              <a:schemeClr val="tx1"/>
+            </a:fontRef>
+          </p:style>
+        </p:cxnSp>
+        <p:sp>
+          <p:nvSpPr>
+            <p:cNvPr id="20" name="Subtitle 2">
+              <a:extLst>
+                <a:ext uri="{FF2B5EF4-FFF2-40B4-BE49-F238E27FC236}">
+                  <a16:creationId xmlns:a16="http://schemas.microsoft.com/office/drawing/2014/main" id="{A0772FE1-B832-4028-B349-7CAC7A859E2D}"/>
+                </a:ext>
+              </a:extLst>
+            </p:cNvPr>
+            <p:cNvSpPr txBox="1">
+              <a:spLocks/>
+            </p:cNvSpPr>
+            <p:nvPr/>
+          </p:nvSpPr>
+          <p:spPr>
+            <a:xfrm>
+              <a:off x="6874297" y="2183066"/>
+              <a:ext cx="860353" cy="340803"/>
+            </a:xfrm>
+            <a:prstGeom prst="rect">
+              <a:avLst/>
+            </a:prstGeom>
+          </p:spPr>
+          <p:txBody>
+            <a:bodyPr vert="horz" lIns="91440" tIns="45720" rIns="91440" bIns="45720" rtlCol="0">
+              <a:normAutofit fontScale="77500" lnSpcReduction="20000"/>
+            </a:bodyPr>
+            <a:lstStyle>
+              <a:lvl1pPr marL="228600" indent="-228600" algn="l" defTabSz="914400" rtl="0" eaLnBrk="1" latinLnBrk="0" hangingPunct="1">
+                <a:lnSpc>
+                  <a:spcPct val="90000"/>
+                </a:lnSpc>
+                <a:spcBef>
+                  <a:spcPts val="1000"/>
+                </a:spcBef>
+                <a:buFont typeface="Arial" panose="020B0604020202020204" pitchFamily="34" charset="0"/>
+                <a:buChar char="•"/>
+                <a:defRPr sz="2800" kern="1200">
+                  <a:solidFill>
+                    <a:schemeClr val="tx1"/>
+                  </a:solidFill>
+                  <a:latin typeface="+mn-lt"/>
+                  <a:ea typeface="+mn-ea"/>
+                  <a:cs typeface="+mn-cs"/>
+                </a:defRPr>
+              </a:lvl1pPr>
+              <a:lvl2pPr marL="685800" indent="-228600" algn="l" defTabSz="914400" rtl="0" eaLnBrk="1" latinLnBrk="0" hangingPunct="1">
+                <a:lnSpc>
+                  <a:spcPct val="90000"/>
+                </a:lnSpc>
+                <a:spcBef>
+                  <a:spcPts val="500"/>
+                </a:spcBef>
+                <a:buFont typeface="Arial" panose="020B0604020202020204" pitchFamily="34" charset="0"/>
+                <a:buChar char="•"/>
+                <a:defRPr sz="2400" kern="1200">
+                  <a:solidFill>
+                    <a:schemeClr val="tx1"/>
+                  </a:solidFill>
+                  <a:latin typeface="+mn-lt"/>
+                  <a:ea typeface="+mn-ea"/>
+                  <a:cs typeface="+mn-cs"/>
+                </a:defRPr>
+              </a:lvl2pPr>
+              <a:lvl3pPr marL="1143000" indent="-228600" algn="l" defTabSz="914400" rtl="0" eaLnBrk="1" latinLnBrk="0" hangingPunct="1">
+                <a:lnSpc>
+                  <a:spcPct val="90000"/>
+                </a:lnSpc>
+                <a:spcBef>
+                  <a:spcPts val="500"/>
+                </a:spcBef>
+                <a:buFont typeface="Arial" panose="020B0604020202020204" pitchFamily="34" charset="0"/>
+                <a:buChar char="•"/>
+                <a:defRPr sz="2000" kern="1200">
+                  <a:solidFill>
+                    <a:schemeClr val="tx1"/>
+                  </a:solidFill>
+                  <a:latin typeface="+mn-lt"/>
+                  <a:ea typeface="+mn-ea"/>
+                  <a:cs typeface="+mn-cs"/>
+                </a:defRPr>
+              </a:lvl3pPr>
+              <a:lvl4pPr marL="1600200" indent="-228600" algn="l" defTabSz="914400" rtl="0" eaLnBrk="1" latinLnBrk="0" hangingPunct="1">
+                <a:lnSpc>
+                  <a:spcPct val="90000"/>
+                </a:lnSpc>
+                <a:spcBef>
+                  <a:spcPts val="500"/>
+                </a:spcBef>
+                <a:buFont typeface="Arial" panose="020B0604020202020204" pitchFamily="34" charset="0"/>
+                <a:buChar char="•"/>
+                <a:defRPr sz="1800" kern="1200">
+                  <a:solidFill>
+                    <a:schemeClr val="tx1"/>
+                  </a:solidFill>
+                  <a:latin typeface="+mn-lt"/>
+                  <a:ea typeface="+mn-ea"/>
+                  <a:cs typeface="+mn-cs"/>
+                </a:defRPr>
+              </a:lvl4pPr>
+              <a:lvl5pPr marL="2057400" indent="-228600" algn="l" defTabSz="914400" rtl="0" eaLnBrk="1" latinLnBrk="0" hangingPunct="1">
+                <a:lnSpc>
+                  <a:spcPct val="90000"/>
+                </a:lnSpc>
+                <a:spcBef>
+                  <a:spcPts val="500"/>
+                </a:spcBef>
+                <a:buFont typeface="Arial" panose="020B0604020202020204" pitchFamily="34" charset="0"/>
+                <a:buChar char="•"/>
+                <a:defRPr sz="1800" kern="1200">
+                  <a:solidFill>
+                    <a:schemeClr val="tx1"/>
+                  </a:solidFill>
+                  <a:latin typeface="+mn-lt"/>
+                  <a:ea typeface="+mn-ea"/>
+                  <a:cs typeface="+mn-cs"/>
+                </a:defRPr>
+              </a:lvl5pPr>
+              <a:lvl6pPr marL="2514600" indent="-228600" algn="l" defTabSz="914400" rtl="0" eaLnBrk="1" latinLnBrk="0" hangingPunct="1">
+                <a:lnSpc>
+                  <a:spcPct val="90000"/>
+                </a:lnSpc>
+                <a:spcBef>
+                  <a:spcPts val="500"/>
+                </a:spcBef>
+                <a:buFont typeface="Arial" panose="020B0604020202020204" pitchFamily="34" charset="0"/>
+                <a:buChar char="•"/>
+                <a:defRPr sz="1800" kern="1200">
+                  <a:solidFill>
+                    <a:schemeClr val="tx1"/>
+                  </a:solidFill>
+                  <a:latin typeface="+mn-lt"/>
+                  <a:ea typeface="+mn-ea"/>
+                  <a:cs typeface="+mn-cs"/>
+                </a:defRPr>
+              </a:lvl6pPr>
+              <a:lvl7pPr marL="2971800" indent="-228600" algn="l" defTabSz="914400" rtl="0" eaLnBrk="1" latinLnBrk="0" hangingPunct="1">
+                <a:lnSpc>
+                  <a:spcPct val="90000"/>
+                </a:lnSpc>
+                <a:spcBef>
+                  <a:spcPts val="500"/>
+                </a:spcBef>
+                <a:buFont typeface="Arial" panose="020B0604020202020204" pitchFamily="34" charset="0"/>
+                <a:buChar char="•"/>
+                <a:defRPr sz="1800" kern="1200">
+                  <a:solidFill>
+                    <a:schemeClr val="tx1"/>
+                  </a:solidFill>
+                  <a:latin typeface="+mn-lt"/>
+                  <a:ea typeface="+mn-ea"/>
+                  <a:cs typeface="+mn-cs"/>
+                </a:defRPr>
+              </a:lvl7pPr>
+              <a:lvl8pPr marL="3429000" indent="-228600" algn="l" defTabSz="914400" rtl="0" eaLnBrk="1" latinLnBrk="0" hangingPunct="1">
+                <a:lnSpc>
+                  <a:spcPct val="90000"/>
+                </a:lnSpc>
+                <a:spcBef>
+                  <a:spcPts val="500"/>
+                </a:spcBef>
+                <a:buFont typeface="Arial" panose="020B0604020202020204" pitchFamily="34" charset="0"/>
+                <a:buChar char="•"/>
+                <a:defRPr sz="1800" kern="1200">
+                  <a:solidFill>
+                    <a:schemeClr val="tx1"/>
+                  </a:solidFill>
+                  <a:latin typeface="+mn-lt"/>
+                  <a:ea typeface="+mn-ea"/>
+                  <a:cs typeface="+mn-cs"/>
+                </a:defRPr>
+              </a:lvl8pPr>
+              <a:lvl9pPr marL="3886200" indent="-228600" algn="l" defTabSz="914400" rtl="0" eaLnBrk="1" latinLnBrk="0" hangingPunct="1">
+                <a:lnSpc>
+                  <a:spcPct val="90000"/>
+                </a:lnSpc>
+                <a:spcBef>
+                  <a:spcPts val="500"/>
+                </a:spcBef>
+                <a:buFont typeface="Arial" panose="020B0604020202020204" pitchFamily="34" charset="0"/>
+                <a:buChar char="•"/>
+                <a:defRPr sz="1800" kern="1200">
+                  <a:solidFill>
+                    <a:schemeClr val="tx1"/>
+                  </a:solidFill>
+                  <a:latin typeface="+mn-lt"/>
+                  <a:ea typeface="+mn-ea"/>
+                  <a:cs typeface="+mn-cs"/>
+                </a:defRPr>
+              </a:lvl9pPr>
+            </a:lstStyle>
+            <a:p>
+              <a:pPr marL="0" indent="0">
+                <a:buNone/>
+              </a:pPr>
+              <a:r>
+                <a:rPr lang="en-US" dirty="0">
+                  <a:latin typeface="Times New Roman" panose="02020603050405020304" pitchFamily="18" charset="0"/>
+                  <a:cs typeface="Times New Roman" panose="02020603050405020304" pitchFamily="18" charset="0"/>
+                </a:rPr>
+                <a:t>N = 4</a:t>
+              </a:r>
+            </a:p>
+          </p:txBody>
+        </p:sp>
+      </p:grpSp>
+      <p:grpSp>
+        <p:nvGrpSpPr>
+          <p:cNvPr id="25" name="Group 24">
+            <a:extLst>
+              <a:ext uri="{FF2B5EF4-FFF2-40B4-BE49-F238E27FC236}">
+                <a16:creationId xmlns:a16="http://schemas.microsoft.com/office/drawing/2014/main" id="{EA70D96B-4C6E-4980-A741-5ECF1AAB0578}"/>
+              </a:ext>
+            </a:extLst>
+          </p:cNvPr>
+          <p:cNvGrpSpPr/>
+          <p:nvPr/>
+        </p:nvGrpSpPr>
+        <p:grpSpPr>
+          <a:xfrm>
+            <a:off x="5545123" y="4342148"/>
+            <a:ext cx="5743575" cy="1114425"/>
+            <a:chOff x="5545123" y="4342148"/>
+            <a:chExt cx="5743575" cy="1114425"/>
+          </a:xfrm>
+        </p:grpSpPr>
+        <p:pic>
+          <p:nvPicPr>
+            <p:cNvPr id="24" name="Picture 2" descr="3-character n-grams of a word eating">
+              <a:extLst>
+                <a:ext uri="{FF2B5EF4-FFF2-40B4-BE49-F238E27FC236}">
+                  <a16:creationId xmlns:a16="http://schemas.microsoft.com/office/drawing/2014/main" id="{398B6020-5950-4C6F-9E4A-74057C8FF873}"/>
+                </a:ext>
+              </a:extLst>
+            </p:cNvPr>
+            <p:cNvPicPr>
+              <a:picLocks noChangeAspect="1" noChangeArrowheads="1"/>
+            </p:cNvPicPr>
+            <p:nvPr/>
+          </p:nvPicPr>
+          <p:blipFill>
+            <a:blip r:embed="rId4">
+              <a:extLst>
+                <a:ext uri="{28A0092B-C50C-407E-A947-70E740481C1C}">
+                  <a14:useLocalDpi xmlns:a14="http://schemas.microsoft.com/office/drawing/2010/main" val="0"/>
+                </a:ext>
+              </a:extLst>
+            </a:blip>
+            <a:srcRect/>
+            <a:stretch>
+              <a:fillRect/>
+            </a:stretch>
+          </p:blipFill>
+          <p:spPr bwMode="auto">
+            <a:xfrm>
+              <a:off x="5545123" y="4342148"/>
+              <a:ext cx="5743575" cy="1114425"/>
+            </a:xfrm>
+            <a:prstGeom prst="rect">
+              <a:avLst/>
+            </a:prstGeom>
+            <a:noFill/>
+            <a:extLst>
+              <a:ext uri="{909E8E84-426E-40DD-AFC4-6F175D3DCCD1}">
+                <a14:hiddenFill xmlns:a14="http://schemas.microsoft.com/office/drawing/2010/main">
+                  <a:solidFill>
+                    <a:srgbClr val="FFFFFF"/>
+                  </a:solidFill>
+                </a14:hiddenFill>
+              </a:ext>
+            </a:extLst>
+          </p:spPr>
+        </p:pic>
+        <p:cxnSp>
+          <p:nvCxnSpPr>
+            <p:cNvPr id="7" name="Straight Connector 6">
+              <a:extLst>
+                <a:ext uri="{FF2B5EF4-FFF2-40B4-BE49-F238E27FC236}">
+                  <a16:creationId xmlns:a16="http://schemas.microsoft.com/office/drawing/2014/main" id="{E018FB10-581D-4386-9FE3-BA6ACEA43FAF}"/>
+                </a:ext>
+              </a:extLst>
+            </p:cNvPr>
+            <p:cNvCxnSpPr>
+              <a:cxnSpLocks/>
+            </p:cNvCxnSpPr>
+            <p:nvPr/>
+          </p:nvCxnSpPr>
+          <p:spPr>
+            <a:xfrm>
+              <a:off x="7404595" y="5270216"/>
+              <a:ext cx="3884103" cy="0"/>
+            </a:xfrm>
+            <a:prstGeom prst="line">
+              <a:avLst/>
+            </a:prstGeom>
+            <a:ln w="57150">
+              <a:solidFill>
+                <a:srgbClr val="FF0000"/>
+              </a:solidFill>
+            </a:ln>
+          </p:spPr>
+          <p:style>
+            <a:lnRef idx="1">
+              <a:schemeClr val="dk1"/>
+            </a:lnRef>
+            <a:fillRef idx="0">
+              <a:schemeClr val="dk1"/>
+            </a:fillRef>
+            <a:effectRef idx="0">
+              <a:schemeClr val="dk1"/>
+            </a:effectRef>
+            <a:fontRef idx="minor">
+              <a:schemeClr val="tx1"/>
+            </a:fontRef>
+          </p:style>
+        </p:cxnSp>
+      </p:grpSp>
+      <p:pic>
+        <p:nvPicPr>
+          <p:cNvPr id="28" name="Picture 27">
+            <a:extLst>
+              <a:ext uri="{FF2B5EF4-FFF2-40B4-BE49-F238E27FC236}">
+                <a16:creationId xmlns:a16="http://schemas.microsoft.com/office/drawing/2014/main" id="{9FA3601D-49D5-4C91-8D23-7C6127FBB5E2}"/>
+              </a:ext>
+            </a:extLst>
+          </p:cNvPr>
+          <p:cNvPicPr>
+            <a:picLocks noChangeAspect="1"/>
+          </p:cNvPicPr>
+          <p:nvPr/>
+        </p:nvPicPr>
+        <p:blipFill>
+          <a:blip r:embed="rId5"/>
+          <a:stretch>
+            <a:fillRect/>
+          </a:stretch>
+        </p:blipFill>
         <p:spPr>
-          <a:xfrm flipV="1">
-            <a:off x="5950591" y="1619075"/>
-            <a:ext cx="651545" cy="563992"/>
+          <a:xfrm>
+            <a:off x="5744274" y="5626785"/>
+            <a:ext cx="4933950" cy="571500"/>
           </a:xfrm>
-          <a:prstGeom prst="straightConnector1">
+          <a:prstGeom prst="rect">
             <a:avLst/>
           </a:prstGeom>
-          <a:ln>
-            <a:tailEnd type="triangle"/>
-          </a:ln>
         </p:spPr>
-        <p:style>
-          <a:lnRef idx="1">
-            <a:schemeClr val="dk1"/>
-          </a:lnRef>
-          <a:fillRef idx="0">
-            <a:schemeClr val="dk1"/>
-          </a:fillRef>
-          <a:effectRef idx="0">
-            <a:schemeClr val="dk1"/>
-          </a:effectRef>
-          <a:fontRef idx="minor">
-            <a:schemeClr val="tx1"/>
-          </a:fontRef>
-        </p:style>
-      </p:cxnSp>
+      </p:pic>
       <p:sp>
         <p:nvSpPr>
-          <p:cNvPr id="18" name="Subtitle 2">
+          <p:cNvPr id="29" name="Subtitle 2">
             <a:extLst>
               <a:ext uri="{FF2B5EF4-FFF2-40B4-BE49-F238E27FC236}">
-                <a16:creationId xmlns:a16="http://schemas.microsoft.com/office/drawing/2014/main" id="{0C9AC147-4AC7-47F2-B026-05C33C616B8D}"/>
+                <a16:creationId xmlns:a16="http://schemas.microsoft.com/office/drawing/2014/main" id="{8CF1B5BA-3993-424D-8857-EAADAEB0370B}"/>
               </a:ext>
             </a:extLst>
           </p:cNvPr>
@@ -26626,8 +27759,8 @@
         </p:nvSpPr>
         <p:spPr>
           <a:xfrm>
-            <a:off x="7005858" y="3429000"/>
-            <a:ext cx="1152088" cy="340803"/>
+            <a:off x="4407889" y="5055489"/>
+            <a:ext cx="1446228" cy="434641"/>
           </a:xfrm>
           <a:prstGeom prst="rect">
             <a:avLst/>
@@ -26635,7 +27768,7 @@
         </p:spPr>
         <p:txBody>
           <a:bodyPr vert="horz" lIns="91440" tIns="45720" rIns="91440" bIns="45720" rtlCol="0">
-            <a:normAutofit fontScale="77500" lnSpcReduction="20000"/>
+            <a:normAutofit fontScale="85000" lnSpcReduction="10000"/>
           </a:bodyPr>
           <a:lstStyle>
             <a:lvl1pPr marL="228600" indent="-228600" algn="l" defTabSz="914400" rtl="0" eaLnBrk="1" latinLnBrk="0" hangingPunct="1">
@@ -26810,11 +27943,52 @@
                 <a:latin typeface="Times New Roman" panose="02020603050405020304" pitchFamily="18" charset="0"/>
                 <a:cs typeface="Times New Roman" panose="02020603050405020304" pitchFamily="18" charset="0"/>
               </a:rPr>
-              <a:t>science</a:t>
+              <a:t>4 n-grams</a:t>
             </a:r>
           </a:p>
         </p:txBody>
       </p:sp>
+      <p:cxnSp>
+        <p:nvCxnSpPr>
+          <p:cNvPr id="31" name="Straight Connector 30">
+            <a:extLst>
+              <a:ext uri="{FF2B5EF4-FFF2-40B4-BE49-F238E27FC236}">
+                <a16:creationId xmlns:a16="http://schemas.microsoft.com/office/drawing/2014/main" id="{3E38F897-7C1D-4EA5-BE95-CFAF179BDBA1}"/>
+              </a:ext>
+            </a:extLst>
+          </p:cNvPr>
+          <p:cNvCxnSpPr/>
+          <p:nvPr/>
+        </p:nvCxnSpPr>
+        <p:spPr>
+          <a:xfrm>
+            <a:off x="5939406" y="5253438"/>
+            <a:ext cx="1105467" cy="0"/>
+          </a:xfrm>
+          <a:prstGeom prst="line">
+            <a:avLst/>
+          </a:prstGeom>
+          <a:ln w="57150">
+            <a:solidFill>
+              <a:srgbClr val="FF0000"/>
+            </a:solidFill>
+          </a:ln>
+        </p:spPr>
+        <p:style>
+          <a:lnRef idx="1">
+            <a:schemeClr val="dk1"/>
+          </a:lnRef>
+          <a:fillRef idx="0">
+            <a:schemeClr val="dk1"/>
+          </a:fillRef>
+          <a:effectRef idx="0">
+            <a:schemeClr val="dk1"/>
+          </a:effectRef>
+          <a:fontRef idx="minor">
+            <a:schemeClr val="tx1"/>
+          </a:fontRef>
+        </p:style>
+      </p:cxnSp>
     </p:spTree>
     <p:extLst>
       <p:ext uri="{BB962C8B-B14F-4D97-AF65-F5344CB8AC3E}">
@@ -26829,6 +28003,2432 @@
 </file>
 
 <file path=ppt/slides/slide31.xml><?xml version="1.0" encoding="utf-8"?>
+<p:sld xmlns:a="http://schemas.openxmlformats.org/drawingml/2006/main" xmlns:r="http://schemas.openxmlformats.org/officeDocument/2006/relationships" xmlns:p="http://schemas.openxmlformats.org/presentationml/2006/main">
+  <p:cSld>
+    <p:spTree>
+      <p:nvGrpSpPr>
+        <p:cNvPr id="1" name=""/>
+        <p:cNvGrpSpPr/>
+        <p:nvPr/>
+      </p:nvGrpSpPr>
+      <p:grpSpPr>
+        <a:xfrm>
+          <a:off x="0" y="0"/>
+          <a:ext cx="0" cy="0"/>
+          <a:chOff x="0" y="0"/>
+          <a:chExt cx="0" cy="0"/>
+        </a:xfrm>
+      </p:grpSpPr>
+      <p:sp>
+        <p:nvSpPr>
+          <p:cNvPr id="2" name="Title 1">
+            <a:extLst>
+              <a:ext uri="{FF2B5EF4-FFF2-40B4-BE49-F238E27FC236}">
+                <a16:creationId xmlns:a16="http://schemas.microsoft.com/office/drawing/2014/main" id="{03F1F093-082A-4E79-A9AE-FA782EA9D40D}"/>
+              </a:ext>
+            </a:extLst>
+          </p:cNvPr>
+          <p:cNvSpPr>
+            <a:spLocks noGrp="1"/>
+          </p:cNvSpPr>
+          <p:nvPr>
+            <p:ph type="title"/>
+          </p:nvPr>
+        </p:nvSpPr>
+        <p:spPr/>
+        <p:txBody>
+          <a:bodyPr/>
+          <a:lstStyle/>
+          <a:p>
+            <a:r>
+              <a:rPr lang="en-US"/>
+              <a:t>fastText</a:t>
+            </a:r>
+            <a:endParaRPr lang="en-US" dirty="0"/>
+          </a:p>
+        </p:txBody>
+      </p:sp>
+      <p:grpSp>
+        <p:nvGrpSpPr>
+          <p:cNvPr id="26" name="Group 25">
+            <a:extLst>
+              <a:ext uri="{FF2B5EF4-FFF2-40B4-BE49-F238E27FC236}">
+                <a16:creationId xmlns:a16="http://schemas.microsoft.com/office/drawing/2014/main" id="{1DAFB6BE-1636-412A-AD71-85556B38221A}"/>
+              </a:ext>
+            </a:extLst>
+          </p:cNvPr>
+          <p:cNvGrpSpPr/>
+          <p:nvPr/>
+        </p:nvGrpSpPr>
+        <p:grpSpPr>
+          <a:xfrm>
+            <a:off x="2612471" y="1690688"/>
+            <a:ext cx="6967057" cy="3608222"/>
+            <a:chOff x="1983996" y="2103539"/>
+            <a:chExt cx="6967057" cy="3608222"/>
+          </a:xfrm>
+        </p:grpSpPr>
+        <p:sp>
+          <p:nvSpPr>
+            <p:cNvPr id="3" name="Oval 2">
+              <a:extLst>
+                <a:ext uri="{FF2B5EF4-FFF2-40B4-BE49-F238E27FC236}">
+                  <a16:creationId xmlns:a16="http://schemas.microsoft.com/office/drawing/2014/main" id="{E9875F59-FAF9-44E1-81C9-EB395DA89DDA}"/>
+                </a:ext>
+              </a:extLst>
+            </p:cNvPr>
+            <p:cNvSpPr/>
+            <p:nvPr/>
+          </p:nvSpPr>
+          <p:spPr>
+            <a:xfrm>
+              <a:off x="1983996" y="3058836"/>
+              <a:ext cx="1434517" cy="740328"/>
+            </a:xfrm>
+            <a:prstGeom prst="ellipse">
+              <a:avLst/>
+            </a:prstGeom>
+          </p:spPr>
+          <p:style>
+            <a:lnRef idx="2">
+              <a:schemeClr val="accent1">
+                <a:shade val="50000"/>
+              </a:schemeClr>
+            </a:lnRef>
+            <a:fillRef idx="1">
+              <a:schemeClr val="accent1"/>
+            </a:fillRef>
+            <a:effectRef idx="0">
+              <a:schemeClr val="accent1"/>
+            </a:effectRef>
+            <a:fontRef idx="minor">
+              <a:schemeClr val="lt1"/>
+            </a:fontRef>
+          </p:style>
+          <p:txBody>
+            <a:bodyPr rtlCol="0" anchor="ctr"/>
+            <a:lstStyle/>
+            <a:p>
+              <a:pPr algn="ctr"/>
+              <a:r>
+                <a:rPr lang="en-US" dirty="0"/>
+                <a:t>Input</a:t>
+              </a:r>
+            </a:p>
+          </p:txBody>
+        </p:sp>
+        <mc:AlternateContent xmlns:mc="http://schemas.openxmlformats.org/markup-compatibility/2006">
+          <mc:Choice xmlns:a14="http://schemas.microsoft.com/office/drawing/2010/main" Requires="a14">
+            <p:sp>
+              <p:nvSpPr>
+                <p:cNvPr id="6" name="Rectangle 5">
+                  <a:extLst>
+                    <a:ext uri="{FF2B5EF4-FFF2-40B4-BE49-F238E27FC236}">
+                      <a16:creationId xmlns:a16="http://schemas.microsoft.com/office/drawing/2014/main" id="{DA939040-3567-4F7E-88F1-3015CEA4FF60}"/>
+                    </a:ext>
+                  </a:extLst>
+                </p:cNvPr>
+                <p:cNvSpPr/>
+                <p:nvPr/>
+              </p:nvSpPr>
+              <p:spPr>
+                <a:xfrm>
+                  <a:off x="4367868" y="2103539"/>
+                  <a:ext cx="1728132" cy="2650921"/>
+                </a:xfrm>
+                <a:prstGeom prst="rect">
+                  <a:avLst/>
+                </a:prstGeom>
+              </p:spPr>
+              <p:style>
+                <a:lnRef idx="2">
+                  <a:schemeClr val="accent1">
+                    <a:shade val="50000"/>
+                  </a:schemeClr>
+                </a:lnRef>
+                <a:fillRef idx="1">
+                  <a:schemeClr val="accent1"/>
+                </a:fillRef>
+                <a:effectRef idx="0">
+                  <a:schemeClr val="accent1"/>
+                </a:effectRef>
+                <a:fontRef idx="minor">
+                  <a:schemeClr val="lt1"/>
+                </a:fontRef>
+              </p:style>
+              <p:txBody>
+                <a:bodyPr rtlCol="0" anchor="ctr"/>
+                <a:lstStyle/>
+                <a:p>
+                  <a:pPr algn="ctr"/>
+                  <a14:m>
+                    <m:oMathPara xmlns:m="http://schemas.openxmlformats.org/officeDocument/2006/math">
+                      <m:oMathParaPr>
+                        <m:jc m:val="centerGroup"/>
+                      </m:oMathParaPr>
+                      <m:oMath xmlns:m="http://schemas.openxmlformats.org/officeDocument/2006/math">
+                        <m:sSub>
+                          <m:sSubPr>
+                            <m:ctrlPr>
+                              <a:rPr lang="en-US" i="1" smtClean="0">
+                                <a:latin typeface="Cambria Math" panose="02040503050406030204" pitchFamily="18" charset="0"/>
+                              </a:rPr>
+                            </m:ctrlPr>
+                          </m:sSubPr>
+                          <m:e>
+                            <m:r>
+                              <a:rPr lang="en-US" b="0" i="1" smtClean="0">
+                                <a:latin typeface="Cambria Math" panose="02040503050406030204" pitchFamily="18" charset="0"/>
+                              </a:rPr>
+                              <m:t>𝑊</m:t>
+                            </m:r>
+                          </m:e>
+                          <m:sub>
+                            <m:r>
+                              <a:rPr lang="en-US" b="0" i="1" smtClean="0">
+                                <a:latin typeface="Cambria Math" panose="02040503050406030204" pitchFamily="18" charset="0"/>
+                              </a:rPr>
+                              <m:t>𝑀</m:t>
+                            </m:r>
+                            <m:r>
+                              <a:rPr lang="en-US" b="0" i="1" smtClean="0">
+                                <a:latin typeface="Cambria Math" panose="02040503050406030204" pitchFamily="18" charset="0"/>
+                                <a:ea typeface="Cambria Math" panose="02040503050406030204" pitchFamily="18" charset="0"/>
+                              </a:rPr>
+                              <m:t>×</m:t>
+                            </m:r>
+                            <m:r>
+                              <a:rPr lang="en-US" b="0" i="1" smtClean="0">
+                                <a:latin typeface="Cambria Math" panose="02040503050406030204" pitchFamily="18" charset="0"/>
+                                <a:ea typeface="Cambria Math" panose="02040503050406030204" pitchFamily="18" charset="0"/>
+                              </a:rPr>
+                              <m:t>𝑁</m:t>
+                            </m:r>
+                          </m:sub>
+                        </m:sSub>
+                      </m:oMath>
+                    </m:oMathPara>
+                  </a14:m>
+                  <a:endParaRPr lang="en-US" dirty="0"/>
+                </a:p>
+              </p:txBody>
+            </p:sp>
+          </mc:Choice>
+          <mc:Fallback>
+            <p:sp>
+              <p:nvSpPr>
+                <p:cNvPr id="6" name="Rectangle 5">
+                  <a:extLst>
+                    <a:ext uri="{FF2B5EF4-FFF2-40B4-BE49-F238E27FC236}">
+                      <a16:creationId xmlns:a16="http://schemas.microsoft.com/office/drawing/2014/main" id="{DA939040-3567-4F7E-88F1-3015CEA4FF60}"/>
+                    </a:ext>
+                  </a:extLst>
+                </p:cNvPr>
+                <p:cNvSpPr>
+                  <a:spLocks noRot="1" noChangeAspect="1" noMove="1" noResize="1" noEditPoints="1" noAdjustHandles="1" noChangeArrowheads="1" noChangeShapeType="1" noTextEdit="1"/>
+                </p:cNvSpPr>
+                <p:nvPr/>
+              </p:nvSpPr>
+              <p:spPr>
+                <a:xfrm>
+                  <a:off x="4367868" y="2103539"/>
+                  <a:ext cx="1728132" cy="2650921"/>
+                </a:xfrm>
+                <a:prstGeom prst="rect">
+                  <a:avLst/>
+                </a:prstGeom>
+                <a:blipFill>
+                  <a:blip r:embed="rId2"/>
+                  <a:stretch>
+                    <a:fillRect/>
+                  </a:stretch>
+                </a:blipFill>
+              </p:spPr>
+              <p:txBody>
+                <a:bodyPr/>
+                <a:lstStyle/>
+                <a:p>
+                  <a:r>
+                    <a:rPr lang="en-US">
+                      <a:noFill/>
+                    </a:rPr>
+                    <a:t> </a:t>
+                  </a:r>
+                </a:p>
+              </p:txBody>
+            </p:sp>
+          </mc:Fallback>
+        </mc:AlternateContent>
+        <p:sp>
+          <p:nvSpPr>
+            <p:cNvPr id="27" name="Subtitle 2">
+              <a:extLst>
+                <a:ext uri="{FF2B5EF4-FFF2-40B4-BE49-F238E27FC236}">
+                  <a16:creationId xmlns:a16="http://schemas.microsoft.com/office/drawing/2014/main" id="{BB78E030-A6B7-414E-A31F-7F8D6674422D}"/>
+                </a:ext>
+              </a:extLst>
+            </p:cNvPr>
+            <p:cNvSpPr txBox="1">
+              <a:spLocks/>
+            </p:cNvSpPr>
+            <p:nvPr/>
+          </p:nvSpPr>
+          <p:spPr>
+            <a:xfrm>
+              <a:off x="3724711" y="3258597"/>
+              <a:ext cx="336958" cy="340803"/>
+            </a:xfrm>
+            <a:prstGeom prst="rect">
+              <a:avLst/>
+            </a:prstGeom>
+          </p:spPr>
+          <p:txBody>
+            <a:bodyPr vert="horz" lIns="91440" tIns="45720" rIns="91440" bIns="45720" rtlCol="0">
+              <a:normAutofit fontScale="77500" lnSpcReduction="20000"/>
+            </a:bodyPr>
+            <a:lstStyle>
+              <a:lvl1pPr marL="228600" indent="-228600" algn="l" defTabSz="914400" rtl="0" eaLnBrk="1" latinLnBrk="0" hangingPunct="1">
+                <a:lnSpc>
+                  <a:spcPct val="90000"/>
+                </a:lnSpc>
+                <a:spcBef>
+                  <a:spcPts val="1000"/>
+                </a:spcBef>
+                <a:buFont typeface="Arial" panose="020B0604020202020204" pitchFamily="34" charset="0"/>
+                <a:buChar char="•"/>
+                <a:defRPr sz="2800" kern="1200">
+                  <a:solidFill>
+                    <a:schemeClr val="tx1"/>
+                  </a:solidFill>
+                  <a:latin typeface="+mn-lt"/>
+                  <a:ea typeface="+mn-ea"/>
+                  <a:cs typeface="+mn-cs"/>
+                </a:defRPr>
+              </a:lvl1pPr>
+              <a:lvl2pPr marL="685800" indent="-228600" algn="l" defTabSz="914400" rtl="0" eaLnBrk="1" latinLnBrk="0" hangingPunct="1">
+                <a:lnSpc>
+                  <a:spcPct val="90000"/>
+                </a:lnSpc>
+                <a:spcBef>
+                  <a:spcPts val="500"/>
+                </a:spcBef>
+                <a:buFont typeface="Arial" panose="020B0604020202020204" pitchFamily="34" charset="0"/>
+                <a:buChar char="•"/>
+                <a:defRPr sz="2400" kern="1200">
+                  <a:solidFill>
+                    <a:schemeClr val="tx1"/>
+                  </a:solidFill>
+                  <a:latin typeface="+mn-lt"/>
+                  <a:ea typeface="+mn-ea"/>
+                  <a:cs typeface="+mn-cs"/>
+                </a:defRPr>
+              </a:lvl2pPr>
+              <a:lvl3pPr marL="1143000" indent="-228600" algn="l" defTabSz="914400" rtl="0" eaLnBrk="1" latinLnBrk="0" hangingPunct="1">
+                <a:lnSpc>
+                  <a:spcPct val="90000"/>
+                </a:lnSpc>
+                <a:spcBef>
+                  <a:spcPts val="500"/>
+                </a:spcBef>
+                <a:buFont typeface="Arial" panose="020B0604020202020204" pitchFamily="34" charset="0"/>
+                <a:buChar char="•"/>
+                <a:defRPr sz="2000" kern="1200">
+                  <a:solidFill>
+                    <a:schemeClr val="tx1"/>
+                  </a:solidFill>
+                  <a:latin typeface="+mn-lt"/>
+                  <a:ea typeface="+mn-ea"/>
+                  <a:cs typeface="+mn-cs"/>
+                </a:defRPr>
+              </a:lvl3pPr>
+              <a:lvl4pPr marL="1600200" indent="-228600" algn="l" defTabSz="914400" rtl="0" eaLnBrk="1" latinLnBrk="0" hangingPunct="1">
+                <a:lnSpc>
+                  <a:spcPct val="90000"/>
+                </a:lnSpc>
+                <a:spcBef>
+                  <a:spcPts val="500"/>
+                </a:spcBef>
+                <a:buFont typeface="Arial" panose="020B0604020202020204" pitchFamily="34" charset="0"/>
+                <a:buChar char="•"/>
+                <a:defRPr sz="1800" kern="1200">
+                  <a:solidFill>
+                    <a:schemeClr val="tx1"/>
+                  </a:solidFill>
+                  <a:latin typeface="+mn-lt"/>
+                  <a:ea typeface="+mn-ea"/>
+                  <a:cs typeface="+mn-cs"/>
+                </a:defRPr>
+              </a:lvl4pPr>
+              <a:lvl5pPr marL="2057400" indent="-228600" algn="l" defTabSz="914400" rtl="0" eaLnBrk="1" latinLnBrk="0" hangingPunct="1">
+                <a:lnSpc>
+                  <a:spcPct val="90000"/>
+                </a:lnSpc>
+                <a:spcBef>
+                  <a:spcPts val="500"/>
+                </a:spcBef>
+                <a:buFont typeface="Arial" panose="020B0604020202020204" pitchFamily="34" charset="0"/>
+                <a:buChar char="•"/>
+                <a:defRPr sz="1800" kern="1200">
+                  <a:solidFill>
+                    <a:schemeClr val="tx1"/>
+                  </a:solidFill>
+                  <a:latin typeface="+mn-lt"/>
+                  <a:ea typeface="+mn-ea"/>
+                  <a:cs typeface="+mn-cs"/>
+                </a:defRPr>
+              </a:lvl5pPr>
+              <a:lvl6pPr marL="2514600" indent="-228600" algn="l" defTabSz="914400" rtl="0" eaLnBrk="1" latinLnBrk="0" hangingPunct="1">
+                <a:lnSpc>
+                  <a:spcPct val="90000"/>
+                </a:lnSpc>
+                <a:spcBef>
+                  <a:spcPts val="500"/>
+                </a:spcBef>
+                <a:buFont typeface="Arial" panose="020B0604020202020204" pitchFamily="34" charset="0"/>
+                <a:buChar char="•"/>
+                <a:defRPr sz="1800" kern="1200">
+                  <a:solidFill>
+                    <a:schemeClr val="tx1"/>
+                  </a:solidFill>
+                  <a:latin typeface="+mn-lt"/>
+                  <a:ea typeface="+mn-ea"/>
+                  <a:cs typeface="+mn-cs"/>
+                </a:defRPr>
+              </a:lvl6pPr>
+              <a:lvl7pPr marL="2971800" indent="-228600" algn="l" defTabSz="914400" rtl="0" eaLnBrk="1" latinLnBrk="0" hangingPunct="1">
+                <a:lnSpc>
+                  <a:spcPct val="90000"/>
+                </a:lnSpc>
+                <a:spcBef>
+                  <a:spcPts val="500"/>
+                </a:spcBef>
+                <a:buFont typeface="Arial" panose="020B0604020202020204" pitchFamily="34" charset="0"/>
+                <a:buChar char="•"/>
+                <a:defRPr sz="1800" kern="1200">
+                  <a:solidFill>
+                    <a:schemeClr val="tx1"/>
+                  </a:solidFill>
+                  <a:latin typeface="+mn-lt"/>
+                  <a:ea typeface="+mn-ea"/>
+                  <a:cs typeface="+mn-cs"/>
+                </a:defRPr>
+              </a:lvl7pPr>
+              <a:lvl8pPr marL="3429000" indent="-228600" algn="l" defTabSz="914400" rtl="0" eaLnBrk="1" latinLnBrk="0" hangingPunct="1">
+                <a:lnSpc>
+                  <a:spcPct val="90000"/>
+                </a:lnSpc>
+                <a:spcBef>
+                  <a:spcPts val="500"/>
+                </a:spcBef>
+                <a:buFont typeface="Arial" panose="020B0604020202020204" pitchFamily="34" charset="0"/>
+                <a:buChar char="•"/>
+                <a:defRPr sz="1800" kern="1200">
+                  <a:solidFill>
+                    <a:schemeClr val="tx1"/>
+                  </a:solidFill>
+                  <a:latin typeface="+mn-lt"/>
+                  <a:ea typeface="+mn-ea"/>
+                  <a:cs typeface="+mn-cs"/>
+                </a:defRPr>
+              </a:lvl8pPr>
+              <a:lvl9pPr marL="3886200" indent="-228600" algn="l" defTabSz="914400" rtl="0" eaLnBrk="1" latinLnBrk="0" hangingPunct="1">
+                <a:lnSpc>
+                  <a:spcPct val="90000"/>
+                </a:lnSpc>
+                <a:spcBef>
+                  <a:spcPts val="500"/>
+                </a:spcBef>
+                <a:buFont typeface="Arial" panose="020B0604020202020204" pitchFamily="34" charset="0"/>
+                <a:buChar char="•"/>
+                <a:defRPr sz="1800" kern="1200">
+                  <a:solidFill>
+                    <a:schemeClr val="tx1"/>
+                  </a:solidFill>
+                  <a:latin typeface="+mn-lt"/>
+                  <a:ea typeface="+mn-ea"/>
+                  <a:cs typeface="+mn-cs"/>
+                </a:defRPr>
+              </a:lvl9pPr>
+            </a:lstStyle>
+            <a:p>
+              <a:pPr marL="0" indent="0">
+                <a:buNone/>
+              </a:pPr>
+              <a:r>
+                <a:rPr lang="en-US" dirty="0">
+                  <a:latin typeface="Times New Roman" panose="02020603050405020304" pitchFamily="18" charset="0"/>
+                  <a:cs typeface="Times New Roman" panose="02020603050405020304" pitchFamily="18" charset="0"/>
+                </a:rPr>
+                <a:t>x</a:t>
+              </a:r>
+            </a:p>
+          </p:txBody>
+        </p:sp>
+        <p:sp>
+          <p:nvSpPr>
+            <p:cNvPr id="30" name="Subtitle 2">
+              <a:extLst>
+                <a:ext uri="{FF2B5EF4-FFF2-40B4-BE49-F238E27FC236}">
+                  <a16:creationId xmlns:a16="http://schemas.microsoft.com/office/drawing/2014/main" id="{81260934-15A1-4E00-B960-A9EBD235D84F}"/>
+                </a:ext>
+              </a:extLst>
+            </p:cNvPr>
+            <p:cNvSpPr txBox="1">
+              <a:spLocks/>
+            </p:cNvSpPr>
+            <p:nvPr/>
+          </p:nvSpPr>
+          <p:spPr>
+            <a:xfrm>
+              <a:off x="6402199" y="3258597"/>
+              <a:ext cx="336958" cy="340803"/>
+            </a:xfrm>
+            <a:prstGeom prst="rect">
+              <a:avLst/>
+            </a:prstGeom>
+          </p:spPr>
+          <p:txBody>
+            <a:bodyPr vert="horz" lIns="91440" tIns="45720" rIns="91440" bIns="45720" rtlCol="0">
+              <a:normAutofit fontScale="77500" lnSpcReduction="20000"/>
+            </a:bodyPr>
+            <a:lstStyle>
+              <a:lvl1pPr marL="228600" indent="-228600" algn="l" defTabSz="914400" rtl="0" eaLnBrk="1" latinLnBrk="0" hangingPunct="1">
+                <a:lnSpc>
+                  <a:spcPct val="90000"/>
+                </a:lnSpc>
+                <a:spcBef>
+                  <a:spcPts val="1000"/>
+                </a:spcBef>
+                <a:buFont typeface="Arial" panose="020B0604020202020204" pitchFamily="34" charset="0"/>
+                <a:buChar char="•"/>
+                <a:defRPr sz="2800" kern="1200">
+                  <a:solidFill>
+                    <a:schemeClr val="tx1"/>
+                  </a:solidFill>
+                  <a:latin typeface="+mn-lt"/>
+                  <a:ea typeface="+mn-ea"/>
+                  <a:cs typeface="+mn-cs"/>
+                </a:defRPr>
+              </a:lvl1pPr>
+              <a:lvl2pPr marL="685800" indent="-228600" algn="l" defTabSz="914400" rtl="0" eaLnBrk="1" latinLnBrk="0" hangingPunct="1">
+                <a:lnSpc>
+                  <a:spcPct val="90000"/>
+                </a:lnSpc>
+                <a:spcBef>
+                  <a:spcPts val="500"/>
+                </a:spcBef>
+                <a:buFont typeface="Arial" panose="020B0604020202020204" pitchFamily="34" charset="0"/>
+                <a:buChar char="•"/>
+                <a:defRPr sz="2400" kern="1200">
+                  <a:solidFill>
+                    <a:schemeClr val="tx1"/>
+                  </a:solidFill>
+                  <a:latin typeface="+mn-lt"/>
+                  <a:ea typeface="+mn-ea"/>
+                  <a:cs typeface="+mn-cs"/>
+                </a:defRPr>
+              </a:lvl2pPr>
+              <a:lvl3pPr marL="1143000" indent="-228600" algn="l" defTabSz="914400" rtl="0" eaLnBrk="1" latinLnBrk="0" hangingPunct="1">
+                <a:lnSpc>
+                  <a:spcPct val="90000"/>
+                </a:lnSpc>
+                <a:spcBef>
+                  <a:spcPts val="500"/>
+                </a:spcBef>
+                <a:buFont typeface="Arial" panose="020B0604020202020204" pitchFamily="34" charset="0"/>
+                <a:buChar char="•"/>
+                <a:defRPr sz="2000" kern="1200">
+                  <a:solidFill>
+                    <a:schemeClr val="tx1"/>
+                  </a:solidFill>
+                  <a:latin typeface="+mn-lt"/>
+                  <a:ea typeface="+mn-ea"/>
+                  <a:cs typeface="+mn-cs"/>
+                </a:defRPr>
+              </a:lvl3pPr>
+              <a:lvl4pPr marL="1600200" indent="-228600" algn="l" defTabSz="914400" rtl="0" eaLnBrk="1" latinLnBrk="0" hangingPunct="1">
+                <a:lnSpc>
+                  <a:spcPct val="90000"/>
+                </a:lnSpc>
+                <a:spcBef>
+                  <a:spcPts val="500"/>
+                </a:spcBef>
+                <a:buFont typeface="Arial" panose="020B0604020202020204" pitchFamily="34" charset="0"/>
+                <a:buChar char="•"/>
+                <a:defRPr sz="1800" kern="1200">
+                  <a:solidFill>
+                    <a:schemeClr val="tx1"/>
+                  </a:solidFill>
+                  <a:latin typeface="+mn-lt"/>
+                  <a:ea typeface="+mn-ea"/>
+                  <a:cs typeface="+mn-cs"/>
+                </a:defRPr>
+              </a:lvl4pPr>
+              <a:lvl5pPr marL="2057400" indent="-228600" algn="l" defTabSz="914400" rtl="0" eaLnBrk="1" latinLnBrk="0" hangingPunct="1">
+                <a:lnSpc>
+                  <a:spcPct val="90000"/>
+                </a:lnSpc>
+                <a:spcBef>
+                  <a:spcPts val="500"/>
+                </a:spcBef>
+                <a:buFont typeface="Arial" panose="020B0604020202020204" pitchFamily="34" charset="0"/>
+                <a:buChar char="•"/>
+                <a:defRPr sz="1800" kern="1200">
+                  <a:solidFill>
+                    <a:schemeClr val="tx1"/>
+                  </a:solidFill>
+                  <a:latin typeface="+mn-lt"/>
+                  <a:ea typeface="+mn-ea"/>
+                  <a:cs typeface="+mn-cs"/>
+                </a:defRPr>
+              </a:lvl5pPr>
+              <a:lvl6pPr marL="2514600" indent="-228600" algn="l" defTabSz="914400" rtl="0" eaLnBrk="1" latinLnBrk="0" hangingPunct="1">
+                <a:lnSpc>
+                  <a:spcPct val="90000"/>
+                </a:lnSpc>
+                <a:spcBef>
+                  <a:spcPts val="500"/>
+                </a:spcBef>
+                <a:buFont typeface="Arial" panose="020B0604020202020204" pitchFamily="34" charset="0"/>
+                <a:buChar char="•"/>
+                <a:defRPr sz="1800" kern="1200">
+                  <a:solidFill>
+                    <a:schemeClr val="tx1"/>
+                  </a:solidFill>
+                  <a:latin typeface="+mn-lt"/>
+                  <a:ea typeface="+mn-ea"/>
+                  <a:cs typeface="+mn-cs"/>
+                </a:defRPr>
+              </a:lvl6pPr>
+              <a:lvl7pPr marL="2971800" indent="-228600" algn="l" defTabSz="914400" rtl="0" eaLnBrk="1" latinLnBrk="0" hangingPunct="1">
+                <a:lnSpc>
+                  <a:spcPct val="90000"/>
+                </a:lnSpc>
+                <a:spcBef>
+                  <a:spcPts val="500"/>
+                </a:spcBef>
+                <a:buFont typeface="Arial" panose="020B0604020202020204" pitchFamily="34" charset="0"/>
+                <a:buChar char="•"/>
+                <a:defRPr sz="1800" kern="1200">
+                  <a:solidFill>
+                    <a:schemeClr val="tx1"/>
+                  </a:solidFill>
+                  <a:latin typeface="+mn-lt"/>
+                  <a:ea typeface="+mn-ea"/>
+                  <a:cs typeface="+mn-cs"/>
+                </a:defRPr>
+              </a:lvl7pPr>
+              <a:lvl8pPr marL="3429000" indent="-228600" algn="l" defTabSz="914400" rtl="0" eaLnBrk="1" latinLnBrk="0" hangingPunct="1">
+                <a:lnSpc>
+                  <a:spcPct val="90000"/>
+                </a:lnSpc>
+                <a:spcBef>
+                  <a:spcPts val="500"/>
+                </a:spcBef>
+                <a:buFont typeface="Arial" panose="020B0604020202020204" pitchFamily="34" charset="0"/>
+                <a:buChar char="•"/>
+                <a:defRPr sz="1800" kern="1200">
+                  <a:solidFill>
+                    <a:schemeClr val="tx1"/>
+                  </a:solidFill>
+                  <a:latin typeface="+mn-lt"/>
+                  <a:ea typeface="+mn-ea"/>
+                  <a:cs typeface="+mn-cs"/>
+                </a:defRPr>
+              </a:lvl8pPr>
+              <a:lvl9pPr marL="3886200" indent="-228600" algn="l" defTabSz="914400" rtl="0" eaLnBrk="1" latinLnBrk="0" hangingPunct="1">
+                <a:lnSpc>
+                  <a:spcPct val="90000"/>
+                </a:lnSpc>
+                <a:spcBef>
+                  <a:spcPts val="500"/>
+                </a:spcBef>
+                <a:buFont typeface="Arial" panose="020B0604020202020204" pitchFamily="34" charset="0"/>
+                <a:buChar char="•"/>
+                <a:defRPr sz="1800" kern="1200">
+                  <a:solidFill>
+                    <a:schemeClr val="tx1"/>
+                  </a:solidFill>
+                  <a:latin typeface="+mn-lt"/>
+                  <a:ea typeface="+mn-ea"/>
+                  <a:cs typeface="+mn-cs"/>
+                </a:defRPr>
+              </a:lvl9pPr>
+            </a:lstStyle>
+            <a:p>
+              <a:pPr marL="0" indent="0">
+                <a:buNone/>
+              </a:pPr>
+              <a:r>
+                <a:rPr lang="en-US" dirty="0">
+                  <a:latin typeface="Times New Roman" panose="02020603050405020304" pitchFamily="18" charset="0"/>
+                  <a:cs typeface="Times New Roman" panose="02020603050405020304" pitchFamily="18" charset="0"/>
+                </a:rPr>
+                <a:t>=</a:t>
+              </a:r>
+            </a:p>
+          </p:txBody>
+        </p:sp>
+        <mc:AlternateContent xmlns:mc="http://schemas.openxmlformats.org/markup-compatibility/2006">
+          <mc:Choice xmlns:a14="http://schemas.microsoft.com/office/drawing/2010/main" Requires="a14">
+            <p:sp>
+              <p:nvSpPr>
+                <p:cNvPr id="32" name="Rectangle 31">
+                  <a:extLst>
+                    <a:ext uri="{FF2B5EF4-FFF2-40B4-BE49-F238E27FC236}">
+                      <a16:creationId xmlns:a16="http://schemas.microsoft.com/office/drawing/2014/main" id="{B7AD171C-EEB4-41F0-A77A-C7DDB44EFA7A}"/>
+                    </a:ext>
+                  </a:extLst>
+                </p:cNvPr>
+                <p:cNvSpPr/>
+                <p:nvPr/>
+              </p:nvSpPr>
+              <p:spPr>
+                <a:xfrm>
+                  <a:off x="7045355" y="2851469"/>
+                  <a:ext cx="1728132" cy="1155058"/>
+                </a:xfrm>
+                <a:prstGeom prst="rect">
+                  <a:avLst/>
+                </a:prstGeom>
+              </p:spPr>
+              <p:style>
+                <a:lnRef idx="2">
+                  <a:schemeClr val="accent1">
+                    <a:shade val="50000"/>
+                  </a:schemeClr>
+                </a:lnRef>
+                <a:fillRef idx="1">
+                  <a:schemeClr val="accent1"/>
+                </a:fillRef>
+                <a:effectRef idx="0">
+                  <a:schemeClr val="accent1"/>
+                </a:effectRef>
+                <a:fontRef idx="minor">
+                  <a:schemeClr val="lt1"/>
+                </a:fontRef>
+              </p:style>
+              <p:txBody>
+                <a:bodyPr rtlCol="0" anchor="ctr"/>
+                <a:lstStyle/>
+                <a:p>
+                  <a:pPr algn="ctr"/>
+                  <a14:m>
+                    <m:oMathPara xmlns:m="http://schemas.openxmlformats.org/officeDocument/2006/math">
+                      <m:oMathParaPr>
+                        <m:jc m:val="centerGroup"/>
+                      </m:oMathParaPr>
+                      <m:oMath xmlns:m="http://schemas.openxmlformats.org/officeDocument/2006/math">
+                        <m:sSub>
+                          <m:sSubPr>
+                            <m:ctrlPr>
+                              <a:rPr lang="en-US" i="1" smtClean="0">
+                                <a:latin typeface="Cambria Math" panose="02040503050406030204" pitchFamily="18" charset="0"/>
+                              </a:rPr>
+                            </m:ctrlPr>
+                          </m:sSubPr>
+                          <m:e>
+                            <m:r>
+                              <a:rPr lang="en-US" b="0" i="1" smtClean="0">
+                                <a:latin typeface="Cambria Math" panose="02040503050406030204" pitchFamily="18" charset="0"/>
+                              </a:rPr>
+                              <m:t>h</m:t>
+                            </m:r>
+                          </m:e>
+                          <m:sub>
+                            <m:r>
+                              <a:rPr lang="en-US" b="0" i="1" smtClean="0">
+                                <a:latin typeface="Cambria Math" panose="02040503050406030204" pitchFamily="18" charset="0"/>
+                                <a:ea typeface="Cambria Math" panose="02040503050406030204" pitchFamily="18" charset="0"/>
+                              </a:rPr>
+                              <m:t>𝑁</m:t>
+                            </m:r>
+                            <m:r>
+                              <a:rPr lang="en-US" b="0" i="1" smtClean="0">
+                                <a:latin typeface="Cambria Math" panose="02040503050406030204" pitchFamily="18" charset="0"/>
+                                <a:ea typeface="Cambria Math" panose="02040503050406030204" pitchFamily="18" charset="0"/>
+                              </a:rPr>
+                              <m:t>×1</m:t>
+                            </m:r>
+                          </m:sub>
+                        </m:sSub>
+                      </m:oMath>
+                    </m:oMathPara>
+                  </a14:m>
+                  <a:endParaRPr lang="en-US" dirty="0"/>
+                </a:p>
+              </p:txBody>
+            </p:sp>
+          </mc:Choice>
+          <mc:Fallback>
+            <p:sp>
+              <p:nvSpPr>
+                <p:cNvPr id="32" name="Rectangle 31">
+                  <a:extLst>
+                    <a:ext uri="{FF2B5EF4-FFF2-40B4-BE49-F238E27FC236}">
+                      <a16:creationId xmlns:a16="http://schemas.microsoft.com/office/drawing/2014/main" id="{B7AD171C-EEB4-41F0-A77A-C7DDB44EFA7A}"/>
+                    </a:ext>
+                  </a:extLst>
+                </p:cNvPr>
+                <p:cNvSpPr>
+                  <a:spLocks noRot="1" noChangeAspect="1" noMove="1" noResize="1" noEditPoints="1" noAdjustHandles="1" noChangeArrowheads="1" noChangeShapeType="1" noTextEdit="1"/>
+                </p:cNvSpPr>
+                <p:nvPr/>
+              </p:nvSpPr>
+              <p:spPr>
+                <a:xfrm>
+                  <a:off x="7045355" y="2851469"/>
+                  <a:ext cx="1728132" cy="1155058"/>
+                </a:xfrm>
+                <a:prstGeom prst="rect">
+                  <a:avLst/>
+                </a:prstGeom>
+                <a:blipFill>
+                  <a:blip r:embed="rId3"/>
+                  <a:stretch>
+                    <a:fillRect/>
+                  </a:stretch>
+                </a:blipFill>
+              </p:spPr>
+              <p:txBody>
+                <a:bodyPr/>
+                <a:lstStyle/>
+                <a:p>
+                  <a:r>
+                    <a:rPr lang="en-US">
+                      <a:noFill/>
+                    </a:rPr>
+                    <a:t> </a:t>
+                  </a:r>
+                </a:p>
+              </p:txBody>
+            </p:sp>
+          </mc:Fallback>
+        </mc:AlternateContent>
+        <mc:AlternateContent xmlns:mc="http://schemas.openxmlformats.org/markup-compatibility/2006">
+          <mc:Choice xmlns:a14="http://schemas.microsoft.com/office/drawing/2010/main" Requires="a14">
+            <p:sp>
+              <p:nvSpPr>
+                <p:cNvPr id="34" name="TextBox 33">
+                  <a:extLst>
+                    <a:ext uri="{FF2B5EF4-FFF2-40B4-BE49-F238E27FC236}">
+                      <a16:creationId xmlns:a16="http://schemas.microsoft.com/office/drawing/2014/main" id="{15E0D6EF-9E3B-4830-BA4A-1A79BA000111}"/>
+                    </a:ext>
+                  </a:extLst>
+                </p:cNvPr>
+                <p:cNvSpPr txBox="1"/>
+                <p:nvPr/>
+              </p:nvSpPr>
+              <p:spPr>
+                <a:xfrm>
+                  <a:off x="2184633" y="4973097"/>
+                  <a:ext cx="6766420" cy="369332"/>
+                </a:xfrm>
+                <a:prstGeom prst="rect">
+                  <a:avLst/>
+                </a:prstGeom>
+                <a:noFill/>
+              </p:spPr>
+              <p:txBody>
+                <a:bodyPr wrap="square">
+                  <a:spAutoFit/>
+                </a:bodyPr>
+                <a:lstStyle/>
+                <a:p>
+                  <a:pPr/>
+                  <a14:m>
+                    <m:oMathPara xmlns:m="http://schemas.openxmlformats.org/officeDocument/2006/math">
+                      <m:oMathParaPr>
+                        <m:jc m:val="centerGroup"/>
+                      </m:oMathParaPr>
+                      <m:oMath xmlns:m="http://schemas.openxmlformats.org/officeDocument/2006/math">
+                        <m:r>
+                          <a:rPr lang="en-US" i="1" smtClean="0">
+                            <a:latin typeface="Cambria Math" panose="02040503050406030204" pitchFamily="18" charset="0"/>
+                          </a:rPr>
+                          <m:t>𝑀</m:t>
+                        </m:r>
+                        <m:r>
+                          <a:rPr lang="en-US" i="0">
+                            <a:latin typeface="Cambria Math" panose="02040503050406030204" pitchFamily="18" charset="0"/>
+                          </a:rPr>
+                          <m:t>=</m:t>
+                        </m:r>
+                        <m:r>
+                          <a:rPr lang="en-US" i="1">
+                            <a:latin typeface="Cambria Math" panose="02040503050406030204" pitchFamily="18" charset="0"/>
+                          </a:rPr>
+                          <m:t>𝑀𝐴𝑋</m:t>
+                        </m:r>
+                        <m:r>
+                          <m:rPr>
+                            <m:lit/>
+                          </m:rPr>
+                          <a:rPr lang="en-US" i="0">
+                            <a:latin typeface="Cambria Math" panose="02040503050406030204" pitchFamily="18" charset="0"/>
+                          </a:rPr>
+                          <m:t>_</m:t>
+                        </m:r>
+                        <m:r>
+                          <a:rPr lang="en-US" i="1">
+                            <a:latin typeface="Cambria Math" panose="02040503050406030204" pitchFamily="18" charset="0"/>
+                          </a:rPr>
+                          <m:t>𝑉𝑂𝐶𝐴𝐵</m:t>
+                        </m:r>
+                        <m:r>
+                          <m:rPr>
+                            <m:lit/>
+                          </m:rPr>
+                          <a:rPr lang="en-US" i="0">
+                            <a:latin typeface="Cambria Math" panose="02040503050406030204" pitchFamily="18" charset="0"/>
+                          </a:rPr>
+                          <m:t>_</m:t>
+                        </m:r>
+                        <m:r>
+                          <a:rPr lang="en-US" i="1">
+                            <a:latin typeface="Cambria Math" panose="02040503050406030204" pitchFamily="18" charset="0"/>
+                          </a:rPr>
+                          <m:t>𝑆𝐼𝑍𝐸</m:t>
+                        </m:r>
+                        <m:r>
+                          <a:rPr lang="en-US" b="0" i="1" smtClean="0">
+                            <a:latin typeface="Cambria Math" panose="02040503050406030204" pitchFamily="18" charset="0"/>
+                          </a:rPr>
+                          <m:t>=</m:t>
+                        </m:r>
+                        <m:r>
+                          <m:rPr>
+                            <m:nor/>
+                          </m:rPr>
+                          <a:rPr lang="en-US" dirty="0">
+                            <a:latin typeface="Times New Roman" panose="02020603050405020304" pitchFamily="18" charset="0"/>
+                            <a:ea typeface="Times New Roman" panose="02020603050405020304" pitchFamily="18" charset="0"/>
+                          </a:rPr>
+                          <m:t>30000000</m:t>
+                        </m:r>
+                        <m:r>
+                          <a:rPr lang="en-US" i="0">
+                            <a:latin typeface="Cambria Math" panose="02040503050406030204" pitchFamily="18" charset="0"/>
+                          </a:rPr>
+                          <m:t>+</m:t>
+                        </m:r>
+                        <m:r>
+                          <a:rPr lang="en-US" i="1">
+                            <a:latin typeface="Cambria Math" panose="02040503050406030204" pitchFamily="18" charset="0"/>
+                          </a:rPr>
+                          <m:t>𝑏𝑢𝑐𝑘</m:t>
+                        </m:r>
+                        <m:r>
+                          <m:rPr>
+                            <m:lit/>
+                          </m:rPr>
+                          <a:rPr lang="en-US" i="0">
+                            <a:latin typeface="Cambria Math" panose="02040503050406030204" pitchFamily="18" charset="0"/>
+                          </a:rPr>
+                          <m:t>_</m:t>
+                        </m:r>
+                        <m:r>
+                          <a:rPr lang="en-US" i="1">
+                            <a:latin typeface="Cambria Math" panose="02040503050406030204" pitchFamily="18" charset="0"/>
+                          </a:rPr>
+                          <m:t>𝑠𝑖𝑧𝑒</m:t>
+                        </m:r>
+                        <m:r>
+                          <a:rPr lang="en-US" b="0" i="1" smtClean="0">
+                            <a:latin typeface="Cambria Math" panose="02040503050406030204" pitchFamily="18" charset="0"/>
+                          </a:rPr>
+                          <m:t>=</m:t>
+                        </m:r>
+                        <m:r>
+                          <m:rPr>
+                            <m:nor/>
+                          </m:rPr>
+                          <a:rPr lang="en-US" b="0" i="0" smtClean="0">
+                            <a:latin typeface="Cambria Math" panose="02040503050406030204" pitchFamily="18" charset="0"/>
+                          </a:rPr>
+                          <m:t>2000000</m:t>
+                        </m:r>
+                      </m:oMath>
+                    </m:oMathPara>
+                  </a14:m>
+                  <a:endParaRPr lang="en-US" dirty="0"/>
+                </a:p>
+              </p:txBody>
+            </p:sp>
+          </mc:Choice>
+          <mc:Fallback>
+            <p:sp>
+              <p:nvSpPr>
+                <p:cNvPr id="34" name="TextBox 33">
+                  <a:extLst>
+                    <a:ext uri="{FF2B5EF4-FFF2-40B4-BE49-F238E27FC236}">
+                      <a16:creationId xmlns:a16="http://schemas.microsoft.com/office/drawing/2014/main" id="{15E0D6EF-9E3B-4830-BA4A-1A79BA000111}"/>
+                    </a:ext>
+                  </a:extLst>
+                </p:cNvPr>
+                <p:cNvSpPr txBox="1">
+                  <a:spLocks noRot="1" noChangeAspect="1" noMove="1" noResize="1" noEditPoints="1" noAdjustHandles="1" noChangeArrowheads="1" noChangeShapeType="1" noTextEdit="1"/>
+                </p:cNvSpPr>
+                <p:nvPr/>
+              </p:nvSpPr>
+              <p:spPr>
+                <a:xfrm>
+                  <a:off x="2184633" y="4973097"/>
+                  <a:ext cx="6766420" cy="369332"/>
+                </a:xfrm>
+                <a:prstGeom prst="rect">
+                  <a:avLst/>
+                </a:prstGeom>
+                <a:blipFill>
+                  <a:blip r:embed="rId4"/>
+                  <a:stretch>
+                    <a:fillRect/>
+                  </a:stretch>
+                </a:blipFill>
+              </p:spPr>
+              <p:txBody>
+                <a:bodyPr/>
+                <a:lstStyle/>
+                <a:p>
+                  <a:r>
+                    <a:rPr lang="en-US">
+                      <a:noFill/>
+                    </a:rPr>
+                    <a:t> </a:t>
+                  </a:r>
+                </a:p>
+              </p:txBody>
+            </p:sp>
+          </mc:Fallback>
+        </mc:AlternateContent>
+        <p:sp>
+          <p:nvSpPr>
+            <p:cNvPr id="35" name="TextBox 34">
+              <a:extLst>
+                <a:ext uri="{FF2B5EF4-FFF2-40B4-BE49-F238E27FC236}">
+                  <a16:creationId xmlns:a16="http://schemas.microsoft.com/office/drawing/2014/main" id="{8C48E832-54AD-4772-A925-1F6658E0D6A0}"/>
+                </a:ext>
+              </a:extLst>
+            </p:cNvPr>
+            <p:cNvSpPr txBox="1"/>
+            <p:nvPr/>
+          </p:nvSpPr>
+          <p:spPr>
+            <a:xfrm>
+              <a:off x="4718458" y="5342429"/>
+              <a:ext cx="1026952" cy="369332"/>
+            </a:xfrm>
+            <a:prstGeom prst="rect">
+              <a:avLst/>
+            </a:prstGeom>
+            <a:noFill/>
+          </p:spPr>
+          <p:txBody>
+            <a:bodyPr wrap="square">
+              <a:spAutoFit/>
+            </a:bodyPr>
+            <a:lstStyle/>
+            <a:p>
+              <a:r>
+                <a:rPr lang="en-US" sz="1800" dirty="0">
+                  <a:effectLst/>
+                  <a:latin typeface="Times New Roman" panose="02020603050405020304" pitchFamily="18" charset="0"/>
+                  <a:ea typeface="Times New Roman" panose="02020603050405020304" pitchFamily="18" charset="0"/>
+                </a:rPr>
+                <a:t>N = dim</a:t>
+              </a:r>
+              <a:endParaRPr lang="en-US" dirty="0"/>
+            </a:p>
+          </p:txBody>
+        </p:sp>
+      </p:grpSp>
+    </p:spTree>
+    <p:extLst>
+      <p:ext uri="{BB962C8B-B14F-4D97-AF65-F5344CB8AC3E}">
+        <p14:creationId xmlns:p14="http://schemas.microsoft.com/office/powerpoint/2010/main" val="2387353844"/>
+      </p:ext>
+    </p:extLst>
+  </p:cSld>
+  <p:clrMapOvr>
+    <a:masterClrMapping/>
+  </p:clrMapOvr>
+</p:sld>
+</file>
+
+<file path=ppt/slides/slide32.xml><?xml version="1.0" encoding="utf-8"?>
+<p:sld xmlns:a="http://schemas.openxmlformats.org/drawingml/2006/main" xmlns:r="http://schemas.openxmlformats.org/officeDocument/2006/relationships" xmlns:p="http://schemas.openxmlformats.org/presentationml/2006/main">
+  <p:cSld>
+    <p:spTree>
+      <p:nvGrpSpPr>
+        <p:cNvPr id="1" name=""/>
+        <p:cNvGrpSpPr/>
+        <p:nvPr/>
+      </p:nvGrpSpPr>
+      <p:grpSpPr>
+        <a:xfrm>
+          <a:off x="0" y="0"/>
+          <a:ext cx="0" cy="0"/>
+          <a:chOff x="0" y="0"/>
+          <a:chExt cx="0" cy="0"/>
+        </a:xfrm>
+      </p:grpSpPr>
+      <p:sp>
+        <p:nvSpPr>
+          <p:cNvPr id="2" name="Title 1">
+            <a:extLst>
+              <a:ext uri="{FF2B5EF4-FFF2-40B4-BE49-F238E27FC236}">
+                <a16:creationId xmlns:a16="http://schemas.microsoft.com/office/drawing/2014/main" id="{03F1F093-082A-4E79-A9AE-FA782EA9D40D}"/>
+              </a:ext>
+            </a:extLst>
+          </p:cNvPr>
+          <p:cNvSpPr>
+            <a:spLocks noGrp="1"/>
+          </p:cNvSpPr>
+          <p:nvPr>
+            <p:ph type="title"/>
+          </p:nvPr>
+        </p:nvSpPr>
+        <p:spPr/>
+        <p:txBody>
+          <a:bodyPr/>
+          <a:lstStyle/>
+          <a:p>
+            <a:r>
+              <a:rPr lang="en-US"/>
+              <a:t>fastText</a:t>
+            </a:r>
+            <a:endParaRPr lang="en-US" dirty="0"/>
+          </a:p>
+        </p:txBody>
+      </p:sp>
+      <mc:AlternateContent xmlns:mc="http://schemas.openxmlformats.org/markup-compatibility/2006">
+        <mc:Choice xmlns:a14="http://schemas.microsoft.com/office/drawing/2010/main" Requires="a14">
+          <p:sp>
+            <p:nvSpPr>
+              <p:cNvPr id="11" name="TextBox 10">
+                <a:extLst>
+                  <a:ext uri="{FF2B5EF4-FFF2-40B4-BE49-F238E27FC236}">
+                    <a16:creationId xmlns:a16="http://schemas.microsoft.com/office/drawing/2014/main" id="{00F39D1A-D6B5-42BA-BD43-44BCF58A07AA}"/>
+                  </a:ext>
+                </a:extLst>
+              </p:cNvPr>
+              <p:cNvSpPr txBox="1"/>
+              <p:nvPr/>
+            </p:nvSpPr>
+            <p:spPr>
+              <a:xfrm>
+                <a:off x="4675114" y="1375730"/>
+                <a:ext cx="2841771" cy="629916"/>
+              </a:xfrm>
+              <a:prstGeom prst="rect">
+                <a:avLst/>
+              </a:prstGeom>
+              <a:noFill/>
+            </p:spPr>
+            <p:txBody>
+              <a:bodyPr wrap="square">
+                <a:spAutoFit/>
+              </a:bodyPr>
+              <a:lstStyle/>
+              <a:p>
+                <a:pPr/>
+                <a14:m>
+                  <m:oMathPara xmlns:m="http://schemas.openxmlformats.org/officeDocument/2006/math">
+                    <m:oMathParaPr>
+                      <m:jc m:val="centerGroup"/>
+                    </m:oMathParaPr>
+                    <m:oMath xmlns:m="http://schemas.openxmlformats.org/officeDocument/2006/math">
+                      <m:r>
+                        <a:rPr lang="en-US" i="1" smtClean="0">
+                          <a:latin typeface="Cambria Math" panose="02040503050406030204" pitchFamily="18" charset="0"/>
+                        </a:rPr>
+                        <m:t>𝑓</m:t>
+                      </m:r>
+                      <m:d>
+                        <m:dPr>
+                          <m:ctrlPr>
+                            <a:rPr lang="en-US" i="1">
+                              <a:latin typeface="Cambria Math" panose="02040503050406030204" pitchFamily="18" charset="0"/>
+                            </a:rPr>
+                          </m:ctrlPr>
+                        </m:dPr>
+                        <m:e>
+                          <m:r>
+                            <a:rPr lang="en-US" i="1">
+                              <a:latin typeface="Cambria Math" panose="02040503050406030204" pitchFamily="18" charset="0"/>
+                            </a:rPr>
+                            <m:t>𝑤</m:t>
+                          </m:r>
+                        </m:e>
+                      </m:d>
+                      <m:r>
+                        <a:rPr lang="en-US" i="0">
+                          <a:latin typeface="Cambria Math" panose="02040503050406030204" pitchFamily="18" charset="0"/>
+                        </a:rPr>
+                        <m:t>=</m:t>
+                      </m:r>
+                      <m:f>
+                        <m:fPr>
+                          <m:ctrlPr>
+                            <a:rPr lang="en-US" i="1">
+                              <a:latin typeface="Cambria Math" panose="02040503050406030204" pitchFamily="18" charset="0"/>
+                            </a:rPr>
+                          </m:ctrlPr>
+                        </m:fPr>
+                        <m:num>
+                          <m:r>
+                            <a:rPr lang="en-US" i="1">
+                              <a:latin typeface="Cambria Math" panose="02040503050406030204" pitchFamily="18" charset="0"/>
+                            </a:rPr>
+                            <m:t>𝑐𝑜𝑢𝑛𝑡</m:t>
+                          </m:r>
+                          <m:d>
+                            <m:dPr>
+                              <m:ctrlPr>
+                                <a:rPr lang="en-US" i="1">
+                                  <a:latin typeface="Cambria Math" panose="02040503050406030204" pitchFamily="18" charset="0"/>
+                                </a:rPr>
+                              </m:ctrlPr>
+                            </m:dPr>
+                            <m:e>
+                              <m:r>
+                                <a:rPr lang="en-US" i="1">
+                                  <a:latin typeface="Cambria Math" panose="02040503050406030204" pitchFamily="18" charset="0"/>
+                                </a:rPr>
+                                <m:t>𝑤</m:t>
+                              </m:r>
+                            </m:e>
+                          </m:d>
+                        </m:num>
+                        <m:den>
+                          <m:r>
+                            <a:rPr lang="en-US" i="1">
+                              <a:latin typeface="Cambria Math" panose="02040503050406030204" pitchFamily="18" charset="0"/>
+                            </a:rPr>
+                            <m:t>𝑡𝑜𝑡𝑎𝑙</m:t>
+                          </m:r>
+                          <m:r>
+                            <a:rPr lang="en-US" i="0">
+                              <a:latin typeface="Cambria Math" panose="02040503050406030204" pitchFamily="18" charset="0"/>
+                            </a:rPr>
+                            <m:t> </m:t>
+                          </m:r>
+                          <m:r>
+                            <a:rPr lang="en-US" i="1">
+                              <a:latin typeface="Cambria Math" panose="02040503050406030204" pitchFamily="18" charset="0"/>
+                            </a:rPr>
+                            <m:t>𝑡𝑜𝑘𝑒𝑛𝑠</m:t>
+                          </m:r>
+                        </m:den>
+                      </m:f>
+                    </m:oMath>
+                  </m:oMathPara>
+                </a14:m>
+                <a:endParaRPr lang="en-US" dirty="0"/>
+              </a:p>
+            </p:txBody>
+          </p:sp>
+        </mc:Choice>
+        <mc:Fallback>
+          <p:sp>
+            <p:nvSpPr>
+              <p:cNvPr id="11" name="TextBox 10">
+                <a:extLst>
+                  <a:ext uri="{FF2B5EF4-FFF2-40B4-BE49-F238E27FC236}">
+                    <a16:creationId xmlns:a16="http://schemas.microsoft.com/office/drawing/2014/main" id="{00F39D1A-D6B5-42BA-BD43-44BCF58A07AA}"/>
+                  </a:ext>
+                </a:extLst>
+              </p:cNvPr>
+              <p:cNvSpPr txBox="1">
+                <a:spLocks noRot="1" noChangeAspect="1" noMove="1" noResize="1" noEditPoints="1" noAdjustHandles="1" noChangeArrowheads="1" noChangeShapeType="1" noTextEdit="1"/>
+              </p:cNvSpPr>
+              <p:nvPr/>
+            </p:nvSpPr>
+            <p:spPr>
+              <a:xfrm>
+                <a:off x="4675114" y="1375730"/>
+                <a:ext cx="2841771" cy="629916"/>
+              </a:xfrm>
+              <a:prstGeom prst="rect">
+                <a:avLst/>
+              </a:prstGeom>
+              <a:blipFill>
+                <a:blip r:embed="rId2"/>
+                <a:stretch>
+                  <a:fillRect/>
+                </a:stretch>
+              </a:blipFill>
+            </p:spPr>
+            <p:txBody>
+              <a:bodyPr/>
+              <a:lstStyle/>
+              <a:p>
+                <a:r>
+                  <a:rPr lang="en-US">
+                    <a:noFill/>
+                  </a:rPr>
+                  <a:t> </a:t>
+                </a:r>
+              </a:p>
+            </p:txBody>
+          </p:sp>
+        </mc:Fallback>
+      </mc:AlternateContent>
+      <mc:AlternateContent xmlns:mc="http://schemas.openxmlformats.org/markup-compatibility/2006">
+        <mc:Choice xmlns:a14="http://schemas.microsoft.com/office/drawing/2010/main" Requires="a14">
+          <p:sp>
+            <p:nvSpPr>
+              <p:cNvPr id="13" name="TextBox 12">
+                <a:extLst>
+                  <a:ext uri="{FF2B5EF4-FFF2-40B4-BE49-F238E27FC236}">
+                    <a16:creationId xmlns:a16="http://schemas.microsoft.com/office/drawing/2014/main" id="{87CAE0D7-1555-4E42-AED4-B8D85CAD49D6}"/>
+                  </a:ext>
+                </a:extLst>
+              </p:cNvPr>
+              <p:cNvSpPr txBox="1"/>
+              <p:nvPr/>
+            </p:nvSpPr>
+            <p:spPr>
+              <a:xfrm>
+                <a:off x="3894937" y="2269443"/>
+                <a:ext cx="4402123" cy="892296"/>
+              </a:xfrm>
+              <a:prstGeom prst="rect">
+                <a:avLst/>
+              </a:prstGeom>
+              <a:noFill/>
+            </p:spPr>
+            <p:txBody>
+              <a:bodyPr wrap="square">
+                <a:spAutoFit/>
+              </a:bodyPr>
+              <a:lstStyle/>
+              <a:p>
+                <a:pPr/>
+                <a14:m>
+                  <m:oMathPara xmlns:m="http://schemas.openxmlformats.org/officeDocument/2006/math">
+                    <m:oMathParaPr>
+                      <m:jc m:val="centerGroup"/>
+                    </m:oMathParaPr>
+                    <m:oMath xmlns:m="http://schemas.openxmlformats.org/officeDocument/2006/math">
+                      <m:sSub>
+                        <m:sSubPr>
+                          <m:ctrlPr>
+                            <a:rPr lang="en-US" i="1" smtClean="0">
+                              <a:latin typeface="Cambria Math" panose="02040503050406030204" pitchFamily="18" charset="0"/>
+                            </a:rPr>
+                          </m:ctrlPr>
+                        </m:sSubPr>
+                        <m:e>
+                          <m:r>
+                            <a:rPr lang="en-US" i="1">
+                              <a:latin typeface="Cambria Math" panose="02040503050406030204" pitchFamily="18" charset="0"/>
+                            </a:rPr>
+                            <m:t>𝑃</m:t>
+                          </m:r>
+                        </m:e>
+                        <m:sub>
+                          <m:r>
+                            <a:rPr lang="en-US" i="1">
+                              <a:latin typeface="Cambria Math" panose="02040503050406030204" pitchFamily="18" charset="0"/>
+                            </a:rPr>
+                            <m:t>𝑛</m:t>
+                          </m:r>
+                        </m:sub>
+                      </m:sSub>
+                      <m:d>
+                        <m:dPr>
+                          <m:ctrlPr>
+                            <a:rPr lang="en-US" i="1">
+                              <a:latin typeface="Cambria Math" panose="02040503050406030204" pitchFamily="18" charset="0"/>
+                            </a:rPr>
+                          </m:ctrlPr>
+                        </m:dPr>
+                        <m:e>
+                          <m:r>
+                            <a:rPr lang="en-US" i="1">
+                              <a:latin typeface="Cambria Math" panose="02040503050406030204" pitchFamily="18" charset="0"/>
+                            </a:rPr>
+                            <m:t>𝑤</m:t>
+                          </m:r>
+                        </m:e>
+                      </m:d>
+                      <m:r>
+                        <a:rPr lang="en-US" i="0">
+                          <a:latin typeface="Cambria Math" panose="02040503050406030204" pitchFamily="18" charset="0"/>
+                        </a:rPr>
+                        <m:t>=1−</m:t>
+                      </m:r>
+                      <m:sSup>
+                        <m:sSupPr>
+                          <m:ctrlPr>
+                            <a:rPr lang="en-US" i="1">
+                              <a:latin typeface="Cambria Math" panose="02040503050406030204" pitchFamily="18" charset="0"/>
+                            </a:rPr>
+                          </m:ctrlPr>
+                        </m:sSupPr>
+                        <m:e>
+                          <m:d>
+                            <m:dPr>
+                              <m:ctrlPr>
+                                <a:rPr lang="en-US" i="1">
+                                  <a:latin typeface="Cambria Math" panose="02040503050406030204" pitchFamily="18" charset="0"/>
+                                </a:rPr>
+                              </m:ctrlPr>
+                            </m:dPr>
+                            <m:e>
+                              <m:f>
+                                <m:fPr>
+                                  <m:ctrlPr>
+                                    <a:rPr lang="en-US" i="1">
+                                      <a:latin typeface="Cambria Math" panose="02040503050406030204" pitchFamily="18" charset="0"/>
+                                    </a:rPr>
+                                  </m:ctrlPr>
+                                </m:fPr>
+                                <m:num>
+                                  <m:r>
+                                    <a:rPr lang="en-US" i="1">
+                                      <a:latin typeface="Cambria Math" panose="02040503050406030204" pitchFamily="18" charset="0"/>
+                                    </a:rPr>
+                                    <m:t>𝑡</m:t>
+                                  </m:r>
+                                </m:num>
+                                <m:den>
+                                  <m:r>
+                                    <a:rPr lang="en-US" i="1">
+                                      <a:latin typeface="Cambria Math" panose="02040503050406030204" pitchFamily="18" charset="0"/>
+                                    </a:rPr>
+                                    <m:t>𝑓</m:t>
+                                  </m:r>
+                                  <m:d>
+                                    <m:dPr>
+                                      <m:ctrlPr>
+                                        <a:rPr lang="en-US" i="1">
+                                          <a:latin typeface="Cambria Math" panose="02040503050406030204" pitchFamily="18" charset="0"/>
+                                        </a:rPr>
+                                      </m:ctrlPr>
+                                    </m:dPr>
+                                    <m:e>
+                                      <m:r>
+                                        <a:rPr lang="en-US" i="1">
+                                          <a:latin typeface="Cambria Math" panose="02040503050406030204" pitchFamily="18" charset="0"/>
+                                        </a:rPr>
+                                        <m:t>𝑤</m:t>
+                                      </m:r>
+                                    </m:e>
+                                  </m:d>
+                                </m:den>
+                              </m:f>
+                            </m:e>
+                          </m:d>
+                        </m:e>
+                        <m:sup>
+                          <m:f>
+                            <m:fPr>
+                              <m:ctrlPr>
+                                <a:rPr lang="en-US" i="1" smtClean="0">
+                                  <a:latin typeface="Cambria Math" panose="02040503050406030204" pitchFamily="18" charset="0"/>
+                                </a:rPr>
+                              </m:ctrlPr>
+                            </m:fPr>
+                            <m:num>
+                              <m:r>
+                                <a:rPr lang="en-US" b="0" i="1" smtClean="0">
+                                  <a:latin typeface="Cambria Math" panose="02040503050406030204" pitchFamily="18" charset="0"/>
+                                </a:rPr>
+                                <m:t>1</m:t>
+                              </m:r>
+                            </m:num>
+                            <m:den>
+                              <m:r>
+                                <a:rPr lang="en-US" b="0" i="1" smtClean="0">
+                                  <a:latin typeface="Cambria Math" panose="02040503050406030204" pitchFamily="18" charset="0"/>
+                                </a:rPr>
+                                <m:t>2</m:t>
+                              </m:r>
+                            </m:den>
+                          </m:f>
+                        </m:sup>
+                      </m:sSup>
+                      <m:r>
+                        <a:rPr lang="en-US" i="1">
+                          <a:latin typeface="Cambria Math" panose="02040503050406030204" pitchFamily="18" charset="0"/>
+                        </a:rPr>
+                        <m:t>𝑣</m:t>
+                      </m:r>
+                      <m:r>
+                        <a:rPr lang="en-US" i="0">
+                          <a:latin typeface="Cambria Math" panose="02040503050406030204" pitchFamily="18" charset="0"/>
+                        </a:rPr>
+                        <m:t>ớ</m:t>
+                      </m:r>
+                      <m:r>
+                        <a:rPr lang="en-US" i="1">
+                          <a:latin typeface="Cambria Math" panose="02040503050406030204" pitchFamily="18" charset="0"/>
+                        </a:rPr>
+                        <m:t>𝑖</m:t>
+                      </m:r>
+                      <m:r>
+                        <a:rPr lang="en-US" i="0">
+                          <a:latin typeface="Cambria Math" panose="02040503050406030204" pitchFamily="18" charset="0"/>
+                        </a:rPr>
+                        <m:t> </m:t>
+                      </m:r>
+                      <m:r>
+                        <a:rPr lang="en-US" i="1">
+                          <a:latin typeface="Cambria Math" panose="02040503050406030204" pitchFamily="18" charset="0"/>
+                        </a:rPr>
+                        <m:t>𝑡</m:t>
+                      </m:r>
+                      <m:r>
+                        <a:rPr lang="en-US" i="0">
+                          <a:latin typeface="Cambria Math" panose="02040503050406030204" pitchFamily="18" charset="0"/>
+                        </a:rPr>
+                        <m:t>=</m:t>
+                      </m:r>
+                      <m:sSup>
+                        <m:sSupPr>
+                          <m:ctrlPr>
+                            <a:rPr lang="en-US" i="1">
+                              <a:latin typeface="Cambria Math" panose="02040503050406030204" pitchFamily="18" charset="0"/>
+                            </a:rPr>
+                          </m:ctrlPr>
+                        </m:sSupPr>
+                        <m:e>
+                          <m:r>
+                            <a:rPr lang="en-US" i="0">
+                              <a:latin typeface="Cambria Math" panose="02040503050406030204" pitchFamily="18" charset="0"/>
+                            </a:rPr>
+                            <m:t>10</m:t>
+                          </m:r>
+                        </m:e>
+                        <m:sup>
+                          <m:r>
+                            <a:rPr lang="en-US" i="0">
+                              <a:latin typeface="Cambria Math" panose="02040503050406030204" pitchFamily="18" charset="0"/>
+                            </a:rPr>
+                            <m:t>−5</m:t>
+                          </m:r>
+                        </m:sup>
+                      </m:sSup>
+                    </m:oMath>
+                  </m:oMathPara>
+                </a14:m>
+                <a:endParaRPr lang="en-US" dirty="0"/>
+              </a:p>
+            </p:txBody>
+          </p:sp>
+        </mc:Choice>
+        <mc:Fallback>
+          <p:sp>
+            <p:nvSpPr>
+              <p:cNvPr id="13" name="TextBox 12">
+                <a:extLst>
+                  <a:ext uri="{FF2B5EF4-FFF2-40B4-BE49-F238E27FC236}">
+                    <a16:creationId xmlns:a16="http://schemas.microsoft.com/office/drawing/2014/main" id="{87CAE0D7-1555-4E42-AED4-B8D85CAD49D6}"/>
+                  </a:ext>
+                </a:extLst>
+              </p:cNvPr>
+              <p:cNvSpPr txBox="1">
+                <a:spLocks noRot="1" noChangeAspect="1" noMove="1" noResize="1" noEditPoints="1" noAdjustHandles="1" noChangeArrowheads="1" noChangeShapeType="1" noTextEdit="1"/>
+              </p:cNvSpPr>
+              <p:nvPr/>
+            </p:nvSpPr>
+            <p:spPr>
+              <a:xfrm>
+                <a:off x="3894937" y="2269443"/>
+                <a:ext cx="4402123" cy="892296"/>
+              </a:xfrm>
+              <a:prstGeom prst="rect">
+                <a:avLst/>
+              </a:prstGeom>
+              <a:blipFill>
+                <a:blip r:embed="rId3"/>
+                <a:stretch>
+                  <a:fillRect/>
+                </a:stretch>
+              </a:blipFill>
+            </p:spPr>
+            <p:txBody>
+              <a:bodyPr/>
+              <a:lstStyle/>
+              <a:p>
+                <a:r>
+                  <a:rPr lang="en-US">
+                    <a:noFill/>
+                  </a:rPr>
+                  <a:t> </a:t>
+                </a:r>
+              </a:p>
+            </p:txBody>
+          </p:sp>
+        </mc:Fallback>
+      </mc:AlternateContent>
+      <p:sp>
+        <p:nvSpPr>
+          <p:cNvPr id="14" name="Subtitle 2">
+            <a:extLst>
+              <a:ext uri="{FF2B5EF4-FFF2-40B4-BE49-F238E27FC236}">
+                <a16:creationId xmlns:a16="http://schemas.microsoft.com/office/drawing/2014/main" id="{533E69AD-355A-4B03-B7C6-BD732B7C4BAA}"/>
+              </a:ext>
+            </a:extLst>
+          </p:cNvPr>
+          <p:cNvSpPr txBox="1">
+            <a:spLocks/>
+          </p:cNvSpPr>
+          <p:nvPr/>
+        </p:nvSpPr>
+        <p:spPr>
+          <a:xfrm>
+            <a:off x="1192633" y="3425536"/>
+            <a:ext cx="9806730" cy="892296"/>
+          </a:xfrm>
+          <a:prstGeom prst="rect">
+            <a:avLst/>
+          </a:prstGeom>
+        </p:spPr>
+        <p:txBody>
+          <a:bodyPr vert="horz" lIns="91440" tIns="45720" rIns="91440" bIns="45720" rtlCol="0">
+            <a:normAutofit fontScale="85000" lnSpcReduction="10000"/>
+          </a:bodyPr>
+          <a:lstStyle>
+            <a:lvl1pPr marL="228600" indent="-228600" algn="l" defTabSz="914400" rtl="0" eaLnBrk="1" latinLnBrk="0" hangingPunct="1">
+              <a:lnSpc>
+                <a:spcPct val="90000"/>
+              </a:lnSpc>
+              <a:spcBef>
+                <a:spcPts val="1000"/>
+              </a:spcBef>
+              <a:buFont typeface="Arial" panose="020B0604020202020204" pitchFamily="34" charset="0"/>
+              <a:buChar char="•"/>
+              <a:defRPr sz="2800" kern="1200">
+                <a:solidFill>
+                  <a:schemeClr val="tx1"/>
+                </a:solidFill>
+                <a:latin typeface="+mn-lt"/>
+                <a:ea typeface="+mn-ea"/>
+                <a:cs typeface="+mn-cs"/>
+              </a:defRPr>
+            </a:lvl1pPr>
+            <a:lvl2pPr marL="685800" indent="-228600" algn="l" defTabSz="914400" rtl="0" eaLnBrk="1" latinLnBrk="0" hangingPunct="1">
+              <a:lnSpc>
+                <a:spcPct val="90000"/>
+              </a:lnSpc>
+              <a:spcBef>
+                <a:spcPts val="500"/>
+              </a:spcBef>
+              <a:buFont typeface="Arial" panose="020B0604020202020204" pitchFamily="34" charset="0"/>
+              <a:buChar char="•"/>
+              <a:defRPr sz="2400" kern="1200">
+                <a:solidFill>
+                  <a:schemeClr val="tx1"/>
+                </a:solidFill>
+                <a:latin typeface="+mn-lt"/>
+                <a:ea typeface="+mn-ea"/>
+                <a:cs typeface="+mn-cs"/>
+              </a:defRPr>
+            </a:lvl2pPr>
+            <a:lvl3pPr marL="1143000" indent="-228600" algn="l" defTabSz="914400" rtl="0" eaLnBrk="1" latinLnBrk="0" hangingPunct="1">
+              <a:lnSpc>
+                <a:spcPct val="90000"/>
+              </a:lnSpc>
+              <a:spcBef>
+                <a:spcPts val="500"/>
+              </a:spcBef>
+              <a:buFont typeface="Arial" panose="020B0604020202020204" pitchFamily="34" charset="0"/>
+              <a:buChar char="•"/>
+              <a:defRPr sz="2000" kern="1200">
+                <a:solidFill>
+                  <a:schemeClr val="tx1"/>
+                </a:solidFill>
+                <a:latin typeface="+mn-lt"/>
+                <a:ea typeface="+mn-ea"/>
+                <a:cs typeface="+mn-cs"/>
+              </a:defRPr>
+            </a:lvl3pPr>
+            <a:lvl4pPr marL="1600200" indent="-228600" algn="l" defTabSz="914400" rtl="0" eaLnBrk="1" latinLnBrk="0" hangingPunct="1">
+              <a:lnSpc>
+                <a:spcPct val="90000"/>
+              </a:lnSpc>
+              <a:spcBef>
+                <a:spcPts val="500"/>
+              </a:spcBef>
+              <a:buFont typeface="Arial" panose="020B0604020202020204" pitchFamily="34" charset="0"/>
+              <a:buChar char="•"/>
+              <a:defRPr sz="1800" kern="1200">
+                <a:solidFill>
+                  <a:schemeClr val="tx1"/>
+                </a:solidFill>
+                <a:latin typeface="+mn-lt"/>
+                <a:ea typeface="+mn-ea"/>
+                <a:cs typeface="+mn-cs"/>
+              </a:defRPr>
+            </a:lvl4pPr>
+            <a:lvl5pPr marL="2057400" indent="-228600" algn="l" defTabSz="914400" rtl="0" eaLnBrk="1" latinLnBrk="0" hangingPunct="1">
+              <a:lnSpc>
+                <a:spcPct val="90000"/>
+              </a:lnSpc>
+              <a:spcBef>
+                <a:spcPts val="500"/>
+              </a:spcBef>
+              <a:buFont typeface="Arial" panose="020B0604020202020204" pitchFamily="34" charset="0"/>
+              <a:buChar char="•"/>
+              <a:defRPr sz="1800" kern="1200">
+                <a:solidFill>
+                  <a:schemeClr val="tx1"/>
+                </a:solidFill>
+                <a:latin typeface="+mn-lt"/>
+                <a:ea typeface="+mn-ea"/>
+                <a:cs typeface="+mn-cs"/>
+              </a:defRPr>
+            </a:lvl5pPr>
+            <a:lvl6pPr marL="2514600" indent="-228600" algn="l" defTabSz="914400" rtl="0" eaLnBrk="1" latinLnBrk="0" hangingPunct="1">
+              <a:lnSpc>
+                <a:spcPct val="90000"/>
+              </a:lnSpc>
+              <a:spcBef>
+                <a:spcPts val="500"/>
+              </a:spcBef>
+              <a:buFont typeface="Arial" panose="020B0604020202020204" pitchFamily="34" charset="0"/>
+              <a:buChar char="•"/>
+              <a:defRPr sz="1800" kern="1200">
+                <a:solidFill>
+                  <a:schemeClr val="tx1"/>
+                </a:solidFill>
+                <a:latin typeface="+mn-lt"/>
+                <a:ea typeface="+mn-ea"/>
+                <a:cs typeface="+mn-cs"/>
+              </a:defRPr>
+            </a:lvl6pPr>
+            <a:lvl7pPr marL="2971800" indent="-228600" algn="l" defTabSz="914400" rtl="0" eaLnBrk="1" latinLnBrk="0" hangingPunct="1">
+              <a:lnSpc>
+                <a:spcPct val="90000"/>
+              </a:lnSpc>
+              <a:spcBef>
+                <a:spcPts val="500"/>
+              </a:spcBef>
+              <a:buFont typeface="Arial" panose="020B0604020202020204" pitchFamily="34" charset="0"/>
+              <a:buChar char="•"/>
+              <a:defRPr sz="1800" kern="1200">
+                <a:solidFill>
+                  <a:schemeClr val="tx1"/>
+                </a:solidFill>
+                <a:latin typeface="+mn-lt"/>
+                <a:ea typeface="+mn-ea"/>
+                <a:cs typeface="+mn-cs"/>
+              </a:defRPr>
+            </a:lvl7pPr>
+            <a:lvl8pPr marL="3429000" indent="-228600" algn="l" defTabSz="914400" rtl="0" eaLnBrk="1" latinLnBrk="0" hangingPunct="1">
+              <a:lnSpc>
+                <a:spcPct val="90000"/>
+              </a:lnSpc>
+              <a:spcBef>
+                <a:spcPts val="500"/>
+              </a:spcBef>
+              <a:buFont typeface="Arial" panose="020B0604020202020204" pitchFamily="34" charset="0"/>
+              <a:buChar char="•"/>
+              <a:defRPr sz="1800" kern="1200">
+                <a:solidFill>
+                  <a:schemeClr val="tx1"/>
+                </a:solidFill>
+                <a:latin typeface="+mn-lt"/>
+                <a:ea typeface="+mn-ea"/>
+                <a:cs typeface="+mn-cs"/>
+              </a:defRPr>
+            </a:lvl8pPr>
+            <a:lvl9pPr marL="3886200" indent="-228600" algn="l" defTabSz="914400" rtl="0" eaLnBrk="1" latinLnBrk="0" hangingPunct="1">
+              <a:lnSpc>
+                <a:spcPct val="90000"/>
+              </a:lnSpc>
+              <a:spcBef>
+                <a:spcPts val="500"/>
+              </a:spcBef>
+              <a:buFont typeface="Arial" panose="020B0604020202020204" pitchFamily="34" charset="0"/>
+              <a:buChar char="•"/>
+              <a:defRPr sz="1800" kern="1200">
+                <a:solidFill>
+                  <a:schemeClr val="tx1"/>
+                </a:solidFill>
+                <a:latin typeface="+mn-lt"/>
+                <a:ea typeface="+mn-ea"/>
+                <a:cs typeface="+mn-cs"/>
+              </a:defRPr>
+            </a:lvl9pPr>
+          </a:lstStyle>
+          <a:p>
+            <a:pPr marL="0" indent="0">
+              <a:buNone/>
+            </a:pPr>
+            <a:r>
+              <a:rPr lang="en-US" dirty="0">
+                <a:latin typeface="Times New Roman" panose="02020603050405020304" pitchFamily="18" charset="0"/>
+                <a:cs typeface="Times New Roman" panose="02020603050405020304" pitchFamily="18" charset="0"/>
+              </a:rPr>
+              <a:t>(Theo: Tomas </a:t>
+            </a:r>
+            <a:r>
+              <a:rPr lang="en-US" dirty="0" err="1">
+                <a:latin typeface="Times New Roman" panose="02020603050405020304" pitchFamily="18" charset="0"/>
+                <a:cs typeface="Times New Roman" panose="02020603050405020304" pitchFamily="18" charset="0"/>
+              </a:rPr>
+              <a:t>Mikolov</a:t>
+            </a:r>
+            <a:r>
+              <a:rPr lang="en-US" dirty="0">
+                <a:latin typeface="Times New Roman" panose="02020603050405020304" pitchFamily="18" charset="0"/>
+                <a:cs typeface="Times New Roman" panose="02020603050405020304" pitchFamily="18" charset="0"/>
+              </a:rPr>
+              <a:t>, Ilya </a:t>
+            </a:r>
+            <a:r>
+              <a:rPr lang="en-US" dirty="0" err="1">
+                <a:latin typeface="Times New Roman" panose="02020603050405020304" pitchFamily="18" charset="0"/>
+                <a:cs typeface="Times New Roman" panose="02020603050405020304" pitchFamily="18" charset="0"/>
+              </a:rPr>
+              <a:t>Sutskever</a:t>
+            </a:r>
+            <a:r>
+              <a:rPr lang="en-US" dirty="0">
+                <a:latin typeface="Times New Roman" panose="02020603050405020304" pitchFamily="18" charset="0"/>
+                <a:cs typeface="Times New Roman" panose="02020603050405020304" pitchFamily="18" charset="0"/>
+              </a:rPr>
+              <a:t>, Kai Chen, Greg </a:t>
+            </a:r>
+            <a:r>
+              <a:rPr lang="en-US" dirty="0" err="1">
+                <a:latin typeface="Times New Roman" panose="02020603050405020304" pitchFamily="18" charset="0"/>
+                <a:cs typeface="Times New Roman" panose="02020603050405020304" pitchFamily="18" charset="0"/>
+              </a:rPr>
+              <a:t>Corrado</a:t>
+            </a:r>
+            <a:r>
+              <a:rPr lang="en-US" dirty="0">
+                <a:latin typeface="Times New Roman" panose="02020603050405020304" pitchFamily="18" charset="0"/>
+                <a:cs typeface="Times New Roman" panose="02020603050405020304" pitchFamily="18" charset="0"/>
+              </a:rPr>
+              <a:t>, Jeffrey Dean, Distributed Representations of Words and Phrases and their Compositionality)</a:t>
+            </a:r>
+          </a:p>
+        </p:txBody>
+      </p:sp>
+      <mc:AlternateContent xmlns:mc="http://schemas.openxmlformats.org/markup-compatibility/2006">
+        <mc:Choice xmlns:a14="http://schemas.microsoft.com/office/drawing/2010/main" Requires="a14">
+          <p:sp>
+            <p:nvSpPr>
+              <p:cNvPr id="16" name="TextBox 15">
+                <a:extLst>
+                  <a:ext uri="{FF2B5EF4-FFF2-40B4-BE49-F238E27FC236}">
+                    <a16:creationId xmlns:a16="http://schemas.microsoft.com/office/drawing/2014/main" id="{5359C5F6-BA78-422C-B8F0-6F56EC6C5B7C}"/>
+                  </a:ext>
+                </a:extLst>
+              </p:cNvPr>
+              <p:cNvSpPr txBox="1"/>
+              <p:nvPr/>
+            </p:nvSpPr>
+            <p:spPr>
+              <a:xfrm>
+                <a:off x="3048697" y="4581629"/>
+                <a:ext cx="6094602" cy="867225"/>
+              </a:xfrm>
+              <a:prstGeom prst="rect">
+                <a:avLst/>
+              </a:prstGeom>
+              <a:noFill/>
+            </p:spPr>
+            <p:txBody>
+              <a:bodyPr wrap="square">
+                <a:spAutoFit/>
+              </a:bodyPr>
+              <a:lstStyle/>
+              <a:p>
+                <a:pPr/>
+                <a14:m>
+                  <m:oMathPara xmlns:m="http://schemas.openxmlformats.org/officeDocument/2006/math">
+                    <m:oMathParaPr>
+                      <m:jc m:val="centerGroup"/>
+                    </m:oMathParaPr>
+                    <m:oMath xmlns:m="http://schemas.openxmlformats.org/officeDocument/2006/math">
+                      <m:sSub>
+                        <m:sSubPr>
+                          <m:ctrlPr>
+                            <a:rPr lang="en-US" i="1" smtClean="0">
+                              <a:latin typeface="Cambria Math" panose="02040503050406030204" pitchFamily="18" charset="0"/>
+                            </a:rPr>
+                          </m:ctrlPr>
+                        </m:sSubPr>
+                        <m:e>
+                          <m:r>
+                            <a:rPr lang="en-US" i="1">
+                              <a:latin typeface="Cambria Math" panose="02040503050406030204" pitchFamily="18" charset="0"/>
+                            </a:rPr>
+                            <m:t>𝑃</m:t>
+                          </m:r>
+                        </m:e>
+                        <m:sub>
+                          <m:r>
+                            <a:rPr lang="en-US" i="1">
+                              <a:latin typeface="Cambria Math" panose="02040503050406030204" pitchFamily="18" charset="0"/>
+                            </a:rPr>
+                            <m:t>𝑛</m:t>
+                          </m:r>
+                        </m:sub>
+                      </m:sSub>
+                      <m:d>
+                        <m:dPr>
+                          <m:ctrlPr>
+                            <a:rPr lang="en-US" i="1">
+                              <a:latin typeface="Cambria Math" panose="02040503050406030204" pitchFamily="18" charset="0"/>
+                            </a:rPr>
+                          </m:ctrlPr>
+                        </m:dPr>
+                        <m:e>
+                          <m:r>
+                            <a:rPr lang="en-US" i="1">
+                              <a:latin typeface="Cambria Math" panose="02040503050406030204" pitchFamily="18" charset="0"/>
+                            </a:rPr>
+                            <m:t>𝑤</m:t>
+                          </m:r>
+                        </m:e>
+                      </m:d>
+                      <m:r>
+                        <a:rPr lang="en-US" i="0">
+                          <a:latin typeface="Cambria Math" panose="02040503050406030204" pitchFamily="18" charset="0"/>
+                        </a:rPr>
+                        <m:t>=</m:t>
+                      </m:r>
+                      <m:f>
+                        <m:fPr>
+                          <m:ctrlPr>
+                            <a:rPr lang="en-US" i="1">
+                              <a:latin typeface="Cambria Math" panose="02040503050406030204" pitchFamily="18" charset="0"/>
+                            </a:rPr>
+                          </m:ctrlPr>
+                        </m:fPr>
+                        <m:num>
+                          <m:r>
+                            <a:rPr lang="en-US" i="1">
+                              <a:latin typeface="Cambria Math" panose="02040503050406030204" pitchFamily="18" charset="0"/>
+                            </a:rPr>
+                            <m:t>𝑡</m:t>
+                          </m:r>
+                        </m:num>
+                        <m:den>
+                          <m:r>
+                            <a:rPr lang="en-US" i="1">
+                              <a:latin typeface="Cambria Math" panose="02040503050406030204" pitchFamily="18" charset="0"/>
+                            </a:rPr>
+                            <m:t>𝑓</m:t>
+                          </m:r>
+                          <m:d>
+                            <m:dPr>
+                              <m:ctrlPr>
+                                <a:rPr lang="en-US" i="1">
+                                  <a:latin typeface="Cambria Math" panose="02040503050406030204" pitchFamily="18" charset="0"/>
+                                </a:rPr>
+                              </m:ctrlPr>
+                            </m:dPr>
+                            <m:e>
+                              <m:r>
+                                <a:rPr lang="en-US" i="1">
+                                  <a:latin typeface="Cambria Math" panose="02040503050406030204" pitchFamily="18" charset="0"/>
+                                </a:rPr>
+                                <m:t>𝑤</m:t>
+                              </m:r>
+                            </m:e>
+                          </m:d>
+                        </m:den>
+                      </m:f>
+                      <m:r>
+                        <a:rPr lang="en-US" i="0">
+                          <a:latin typeface="Cambria Math" panose="02040503050406030204" pitchFamily="18" charset="0"/>
+                        </a:rPr>
+                        <m:t>+</m:t>
+                      </m:r>
+                      <m:sSup>
+                        <m:sSupPr>
+                          <m:ctrlPr>
+                            <a:rPr lang="en-US" i="1">
+                              <a:latin typeface="Cambria Math" panose="02040503050406030204" pitchFamily="18" charset="0"/>
+                            </a:rPr>
+                          </m:ctrlPr>
+                        </m:sSupPr>
+                        <m:e>
+                          <m:d>
+                            <m:dPr>
+                              <m:ctrlPr>
+                                <a:rPr lang="en-US" i="1">
+                                  <a:latin typeface="Cambria Math" panose="02040503050406030204" pitchFamily="18" charset="0"/>
+                                </a:rPr>
+                              </m:ctrlPr>
+                            </m:dPr>
+                            <m:e>
+                              <m:f>
+                                <m:fPr>
+                                  <m:ctrlPr>
+                                    <a:rPr lang="en-US" i="1">
+                                      <a:latin typeface="Cambria Math" panose="02040503050406030204" pitchFamily="18" charset="0"/>
+                                    </a:rPr>
+                                  </m:ctrlPr>
+                                </m:fPr>
+                                <m:num>
+                                  <m:r>
+                                    <a:rPr lang="en-US" i="1">
+                                      <a:latin typeface="Cambria Math" panose="02040503050406030204" pitchFamily="18" charset="0"/>
+                                    </a:rPr>
+                                    <m:t>𝑡</m:t>
+                                  </m:r>
+                                </m:num>
+                                <m:den>
+                                  <m:r>
+                                    <a:rPr lang="en-US" i="1">
+                                      <a:latin typeface="Cambria Math" panose="02040503050406030204" pitchFamily="18" charset="0"/>
+                                    </a:rPr>
+                                    <m:t>𝑓</m:t>
+                                  </m:r>
+                                  <m:d>
+                                    <m:dPr>
+                                      <m:ctrlPr>
+                                        <a:rPr lang="en-US" i="1">
+                                          <a:latin typeface="Cambria Math" panose="02040503050406030204" pitchFamily="18" charset="0"/>
+                                        </a:rPr>
+                                      </m:ctrlPr>
+                                    </m:dPr>
+                                    <m:e>
+                                      <m:r>
+                                        <a:rPr lang="en-US" i="1">
+                                          <a:latin typeface="Cambria Math" panose="02040503050406030204" pitchFamily="18" charset="0"/>
+                                        </a:rPr>
+                                        <m:t>𝑤</m:t>
+                                      </m:r>
+                                    </m:e>
+                                  </m:d>
+                                </m:den>
+                              </m:f>
+                            </m:e>
+                          </m:d>
+                        </m:e>
+                        <m:sup>
+                          <m:f>
+                            <m:fPr>
+                              <m:ctrlPr>
+                                <a:rPr lang="en-US" i="1">
+                                  <a:latin typeface="Cambria Math" panose="02040503050406030204" pitchFamily="18" charset="0"/>
+                                </a:rPr>
+                              </m:ctrlPr>
+                            </m:fPr>
+                            <m:num>
+                              <m:r>
+                                <a:rPr lang="en-US" i="1">
+                                  <a:latin typeface="Cambria Math" panose="02040503050406030204" pitchFamily="18" charset="0"/>
+                                </a:rPr>
+                                <m:t>1</m:t>
+                              </m:r>
+                            </m:num>
+                            <m:den>
+                              <m:r>
+                                <a:rPr lang="en-US" i="1">
+                                  <a:latin typeface="Cambria Math" panose="02040503050406030204" pitchFamily="18" charset="0"/>
+                                </a:rPr>
+                                <m:t>2</m:t>
+                              </m:r>
+                            </m:den>
+                          </m:f>
+                        </m:sup>
+                      </m:sSup>
+                    </m:oMath>
+                  </m:oMathPara>
+                </a14:m>
+                <a:endParaRPr lang="en-US" dirty="0"/>
+              </a:p>
+            </p:txBody>
+          </p:sp>
+        </mc:Choice>
+        <mc:Fallback>
+          <p:sp>
+            <p:nvSpPr>
+              <p:cNvPr id="16" name="TextBox 15">
+                <a:extLst>
+                  <a:ext uri="{FF2B5EF4-FFF2-40B4-BE49-F238E27FC236}">
+                    <a16:creationId xmlns:a16="http://schemas.microsoft.com/office/drawing/2014/main" id="{5359C5F6-BA78-422C-B8F0-6F56EC6C5B7C}"/>
+                  </a:ext>
+                </a:extLst>
+              </p:cNvPr>
+              <p:cNvSpPr txBox="1">
+                <a:spLocks noRot="1" noChangeAspect="1" noMove="1" noResize="1" noEditPoints="1" noAdjustHandles="1" noChangeArrowheads="1" noChangeShapeType="1" noTextEdit="1"/>
+              </p:cNvSpPr>
+              <p:nvPr/>
+            </p:nvSpPr>
+            <p:spPr>
+              <a:xfrm>
+                <a:off x="3048697" y="4581629"/>
+                <a:ext cx="6094602" cy="867225"/>
+              </a:xfrm>
+              <a:prstGeom prst="rect">
+                <a:avLst/>
+              </a:prstGeom>
+              <a:blipFill>
+                <a:blip r:embed="rId4"/>
+                <a:stretch>
+                  <a:fillRect/>
+                </a:stretch>
+              </a:blipFill>
+            </p:spPr>
+            <p:txBody>
+              <a:bodyPr/>
+              <a:lstStyle/>
+              <a:p>
+                <a:r>
+                  <a:rPr lang="en-US">
+                    <a:noFill/>
+                  </a:rPr>
+                  <a:t> </a:t>
+                </a:r>
+              </a:p>
+            </p:txBody>
+          </p:sp>
+        </mc:Fallback>
+      </mc:AlternateContent>
+      <p:sp>
+        <p:nvSpPr>
+          <p:cNvPr id="17" name="Subtitle 2">
+            <a:extLst>
+              <a:ext uri="{FF2B5EF4-FFF2-40B4-BE49-F238E27FC236}">
+                <a16:creationId xmlns:a16="http://schemas.microsoft.com/office/drawing/2014/main" id="{C1E631B9-B731-4413-827C-A7B22855E047}"/>
+              </a:ext>
+            </a:extLst>
+          </p:cNvPr>
+          <p:cNvSpPr txBox="1">
+            <a:spLocks/>
+          </p:cNvSpPr>
+          <p:nvPr/>
+        </p:nvSpPr>
+        <p:spPr>
+          <a:xfrm>
+            <a:off x="4759351" y="5712651"/>
+            <a:ext cx="2673294" cy="534209"/>
+          </a:xfrm>
+          <a:prstGeom prst="rect">
+            <a:avLst/>
+          </a:prstGeom>
+        </p:spPr>
+        <p:txBody>
+          <a:bodyPr vert="horz" lIns="91440" tIns="45720" rIns="91440" bIns="45720" rtlCol="0">
+            <a:normAutofit/>
+          </a:bodyPr>
+          <a:lstStyle>
+            <a:lvl1pPr marL="228600" indent="-228600" algn="l" defTabSz="914400" rtl="0" eaLnBrk="1" latinLnBrk="0" hangingPunct="1">
+              <a:lnSpc>
+                <a:spcPct val="90000"/>
+              </a:lnSpc>
+              <a:spcBef>
+                <a:spcPts val="1000"/>
+              </a:spcBef>
+              <a:buFont typeface="Arial" panose="020B0604020202020204" pitchFamily="34" charset="0"/>
+              <a:buChar char="•"/>
+              <a:defRPr sz="2800" kern="1200">
+                <a:solidFill>
+                  <a:schemeClr val="tx1"/>
+                </a:solidFill>
+                <a:latin typeface="+mn-lt"/>
+                <a:ea typeface="+mn-ea"/>
+                <a:cs typeface="+mn-cs"/>
+              </a:defRPr>
+            </a:lvl1pPr>
+            <a:lvl2pPr marL="685800" indent="-228600" algn="l" defTabSz="914400" rtl="0" eaLnBrk="1" latinLnBrk="0" hangingPunct="1">
+              <a:lnSpc>
+                <a:spcPct val="90000"/>
+              </a:lnSpc>
+              <a:spcBef>
+                <a:spcPts val="500"/>
+              </a:spcBef>
+              <a:buFont typeface="Arial" panose="020B0604020202020204" pitchFamily="34" charset="0"/>
+              <a:buChar char="•"/>
+              <a:defRPr sz="2400" kern="1200">
+                <a:solidFill>
+                  <a:schemeClr val="tx1"/>
+                </a:solidFill>
+                <a:latin typeface="+mn-lt"/>
+                <a:ea typeface="+mn-ea"/>
+                <a:cs typeface="+mn-cs"/>
+              </a:defRPr>
+            </a:lvl2pPr>
+            <a:lvl3pPr marL="1143000" indent="-228600" algn="l" defTabSz="914400" rtl="0" eaLnBrk="1" latinLnBrk="0" hangingPunct="1">
+              <a:lnSpc>
+                <a:spcPct val="90000"/>
+              </a:lnSpc>
+              <a:spcBef>
+                <a:spcPts val="500"/>
+              </a:spcBef>
+              <a:buFont typeface="Arial" panose="020B0604020202020204" pitchFamily="34" charset="0"/>
+              <a:buChar char="•"/>
+              <a:defRPr sz="2000" kern="1200">
+                <a:solidFill>
+                  <a:schemeClr val="tx1"/>
+                </a:solidFill>
+                <a:latin typeface="+mn-lt"/>
+                <a:ea typeface="+mn-ea"/>
+                <a:cs typeface="+mn-cs"/>
+              </a:defRPr>
+            </a:lvl3pPr>
+            <a:lvl4pPr marL="1600200" indent="-228600" algn="l" defTabSz="914400" rtl="0" eaLnBrk="1" latinLnBrk="0" hangingPunct="1">
+              <a:lnSpc>
+                <a:spcPct val="90000"/>
+              </a:lnSpc>
+              <a:spcBef>
+                <a:spcPts val="500"/>
+              </a:spcBef>
+              <a:buFont typeface="Arial" panose="020B0604020202020204" pitchFamily="34" charset="0"/>
+              <a:buChar char="•"/>
+              <a:defRPr sz="1800" kern="1200">
+                <a:solidFill>
+                  <a:schemeClr val="tx1"/>
+                </a:solidFill>
+                <a:latin typeface="+mn-lt"/>
+                <a:ea typeface="+mn-ea"/>
+                <a:cs typeface="+mn-cs"/>
+              </a:defRPr>
+            </a:lvl4pPr>
+            <a:lvl5pPr marL="2057400" indent="-228600" algn="l" defTabSz="914400" rtl="0" eaLnBrk="1" latinLnBrk="0" hangingPunct="1">
+              <a:lnSpc>
+                <a:spcPct val="90000"/>
+              </a:lnSpc>
+              <a:spcBef>
+                <a:spcPts val="500"/>
+              </a:spcBef>
+              <a:buFont typeface="Arial" panose="020B0604020202020204" pitchFamily="34" charset="0"/>
+              <a:buChar char="•"/>
+              <a:defRPr sz="1800" kern="1200">
+                <a:solidFill>
+                  <a:schemeClr val="tx1"/>
+                </a:solidFill>
+                <a:latin typeface="+mn-lt"/>
+                <a:ea typeface="+mn-ea"/>
+                <a:cs typeface="+mn-cs"/>
+              </a:defRPr>
+            </a:lvl5pPr>
+            <a:lvl6pPr marL="2514600" indent="-228600" algn="l" defTabSz="914400" rtl="0" eaLnBrk="1" latinLnBrk="0" hangingPunct="1">
+              <a:lnSpc>
+                <a:spcPct val="90000"/>
+              </a:lnSpc>
+              <a:spcBef>
+                <a:spcPts val="500"/>
+              </a:spcBef>
+              <a:buFont typeface="Arial" panose="020B0604020202020204" pitchFamily="34" charset="0"/>
+              <a:buChar char="•"/>
+              <a:defRPr sz="1800" kern="1200">
+                <a:solidFill>
+                  <a:schemeClr val="tx1"/>
+                </a:solidFill>
+                <a:latin typeface="+mn-lt"/>
+                <a:ea typeface="+mn-ea"/>
+                <a:cs typeface="+mn-cs"/>
+              </a:defRPr>
+            </a:lvl6pPr>
+            <a:lvl7pPr marL="2971800" indent="-228600" algn="l" defTabSz="914400" rtl="0" eaLnBrk="1" latinLnBrk="0" hangingPunct="1">
+              <a:lnSpc>
+                <a:spcPct val="90000"/>
+              </a:lnSpc>
+              <a:spcBef>
+                <a:spcPts val="500"/>
+              </a:spcBef>
+              <a:buFont typeface="Arial" panose="020B0604020202020204" pitchFamily="34" charset="0"/>
+              <a:buChar char="•"/>
+              <a:defRPr sz="1800" kern="1200">
+                <a:solidFill>
+                  <a:schemeClr val="tx1"/>
+                </a:solidFill>
+                <a:latin typeface="+mn-lt"/>
+                <a:ea typeface="+mn-ea"/>
+                <a:cs typeface="+mn-cs"/>
+              </a:defRPr>
+            </a:lvl7pPr>
+            <a:lvl8pPr marL="3429000" indent="-228600" algn="l" defTabSz="914400" rtl="0" eaLnBrk="1" latinLnBrk="0" hangingPunct="1">
+              <a:lnSpc>
+                <a:spcPct val="90000"/>
+              </a:lnSpc>
+              <a:spcBef>
+                <a:spcPts val="500"/>
+              </a:spcBef>
+              <a:buFont typeface="Arial" panose="020B0604020202020204" pitchFamily="34" charset="0"/>
+              <a:buChar char="•"/>
+              <a:defRPr sz="1800" kern="1200">
+                <a:solidFill>
+                  <a:schemeClr val="tx1"/>
+                </a:solidFill>
+                <a:latin typeface="+mn-lt"/>
+                <a:ea typeface="+mn-ea"/>
+                <a:cs typeface="+mn-cs"/>
+              </a:defRPr>
+            </a:lvl8pPr>
+            <a:lvl9pPr marL="3886200" indent="-228600" algn="l" defTabSz="914400" rtl="0" eaLnBrk="1" latinLnBrk="0" hangingPunct="1">
+              <a:lnSpc>
+                <a:spcPct val="90000"/>
+              </a:lnSpc>
+              <a:spcBef>
+                <a:spcPts val="500"/>
+              </a:spcBef>
+              <a:buFont typeface="Arial" panose="020B0604020202020204" pitchFamily="34" charset="0"/>
+              <a:buChar char="•"/>
+              <a:defRPr sz="1800" kern="1200">
+                <a:solidFill>
+                  <a:schemeClr val="tx1"/>
+                </a:solidFill>
+                <a:latin typeface="+mn-lt"/>
+                <a:ea typeface="+mn-ea"/>
+                <a:cs typeface="+mn-cs"/>
+              </a:defRPr>
+            </a:lvl9pPr>
+          </a:lstStyle>
+          <a:p>
+            <a:pPr marL="0" indent="0">
+              <a:buNone/>
+            </a:pPr>
+            <a:r>
+              <a:rPr lang="en-US" dirty="0">
+                <a:latin typeface="Times New Roman" panose="02020603050405020304" pitchFamily="18" charset="0"/>
+                <a:cs typeface="Times New Roman" panose="02020603050405020304" pitchFamily="18" charset="0"/>
+              </a:rPr>
+              <a:t>(Theo: </a:t>
+            </a:r>
+            <a:r>
+              <a:rPr lang="en-US" dirty="0" err="1">
+                <a:latin typeface="Times New Roman" panose="02020603050405020304" pitchFamily="18" charset="0"/>
+                <a:cs typeface="Times New Roman" panose="02020603050405020304" pitchFamily="18" charset="0"/>
+              </a:rPr>
+              <a:t>fastText</a:t>
+            </a:r>
+            <a:r>
+              <a:rPr lang="en-US" dirty="0">
+                <a:latin typeface="Times New Roman" panose="02020603050405020304" pitchFamily="18" charset="0"/>
+                <a:cs typeface="Times New Roman" panose="02020603050405020304" pitchFamily="18" charset="0"/>
+              </a:rPr>
+              <a:t>)</a:t>
+            </a:r>
+          </a:p>
+        </p:txBody>
+      </p:sp>
+    </p:spTree>
+    <p:extLst>
+      <p:ext uri="{BB962C8B-B14F-4D97-AF65-F5344CB8AC3E}">
+        <p14:creationId xmlns:p14="http://schemas.microsoft.com/office/powerpoint/2010/main" val="1727486197"/>
+      </p:ext>
+    </p:extLst>
+  </p:cSld>
+  <p:clrMapOvr>
+    <a:masterClrMapping/>
+  </p:clrMapOvr>
+</p:sld>
+</file>
+
+<file path=ppt/slides/slide33.xml><?xml version="1.0" encoding="utf-8"?>
+<p:sld xmlns:a="http://schemas.openxmlformats.org/drawingml/2006/main" xmlns:r="http://schemas.openxmlformats.org/officeDocument/2006/relationships" xmlns:p="http://schemas.openxmlformats.org/presentationml/2006/main">
+  <p:cSld>
+    <p:spTree>
+      <p:nvGrpSpPr>
+        <p:cNvPr id="1" name=""/>
+        <p:cNvGrpSpPr/>
+        <p:nvPr/>
+      </p:nvGrpSpPr>
+      <p:grpSpPr>
+        <a:xfrm>
+          <a:off x="0" y="0"/>
+          <a:ext cx="0" cy="0"/>
+          <a:chOff x="0" y="0"/>
+          <a:chExt cx="0" cy="0"/>
+        </a:xfrm>
+      </p:grpSpPr>
+      <p:sp>
+        <p:nvSpPr>
+          <p:cNvPr id="2" name="Title 1">
+            <a:extLst>
+              <a:ext uri="{FF2B5EF4-FFF2-40B4-BE49-F238E27FC236}">
+                <a16:creationId xmlns:a16="http://schemas.microsoft.com/office/drawing/2014/main" id="{03F1F093-082A-4E79-A9AE-FA782EA9D40D}"/>
+              </a:ext>
+            </a:extLst>
+          </p:cNvPr>
+          <p:cNvSpPr>
+            <a:spLocks noGrp="1"/>
+          </p:cNvSpPr>
+          <p:nvPr>
+            <p:ph type="title"/>
+          </p:nvPr>
+        </p:nvSpPr>
+        <p:spPr/>
+        <p:txBody>
+          <a:bodyPr/>
+          <a:lstStyle/>
+          <a:p>
+            <a:r>
+              <a:rPr lang="en-US"/>
+              <a:t>fastText</a:t>
+            </a:r>
+            <a:endParaRPr lang="en-US" dirty="0"/>
+          </a:p>
+        </p:txBody>
+      </p:sp>
+      <p:pic>
+        <p:nvPicPr>
+          <p:cNvPr id="10" name="Picture 2" descr="https://miro.medium.com/max/903/1*cuOmGT7NevP9oJFJfVpRKA.png">
+            <a:extLst>
+              <a:ext uri="{FF2B5EF4-FFF2-40B4-BE49-F238E27FC236}">
+                <a16:creationId xmlns:a16="http://schemas.microsoft.com/office/drawing/2014/main" id="{C8816674-E459-485E-B521-44E2F524E364}"/>
+              </a:ext>
+            </a:extLst>
+          </p:cNvPr>
+          <p:cNvPicPr>
+            <a:picLocks noGrp="1" noChangeAspect="1" noChangeArrowheads="1"/>
+          </p:cNvPicPr>
+          <p:nvPr>
+            <p:ph idx="1"/>
+          </p:nvPr>
+        </p:nvPicPr>
+        <p:blipFill>
+          <a:blip r:embed="rId2">
+            <a:extLst>
+              <a:ext uri="{28A0092B-C50C-407E-A947-70E740481C1C}">
+                <a14:useLocalDpi xmlns:a14="http://schemas.microsoft.com/office/drawing/2010/main" val="0"/>
+              </a:ext>
+            </a:extLst>
+          </a:blip>
+          <a:srcRect/>
+          <a:stretch>
+            <a:fillRect/>
+          </a:stretch>
+        </p:blipFill>
+        <p:spPr bwMode="auto">
+          <a:xfrm>
+            <a:off x="2396303" y="1400927"/>
+            <a:ext cx="7399394" cy="4056146"/>
+          </a:xfrm>
+          <a:prstGeom prst="rect">
+            <a:avLst/>
+          </a:prstGeom>
+          <a:noFill/>
+          <a:extLst>
+            <a:ext uri="{909E8E84-426E-40DD-AFC4-6F175D3DCCD1}">
+              <a14:hiddenFill xmlns:a14="http://schemas.microsoft.com/office/drawing/2010/main">
+                <a:solidFill>
+                  <a:srgbClr val="FFFFFF"/>
+                </a:solidFill>
+              </a14:hiddenFill>
+            </a:ext>
+          </a:extLst>
+        </p:spPr>
+      </p:pic>
+    </p:spTree>
+    <p:extLst>
+      <p:ext uri="{BB962C8B-B14F-4D97-AF65-F5344CB8AC3E}">
+        <p14:creationId xmlns:p14="http://schemas.microsoft.com/office/powerpoint/2010/main" val="4116576063"/>
+      </p:ext>
+    </p:extLst>
+  </p:cSld>
+  <p:clrMapOvr>
+    <a:masterClrMapping/>
+  </p:clrMapOvr>
+</p:sld>
+</file>
+
+<file path=ppt/slides/slide34.xml><?xml version="1.0" encoding="utf-8"?>
 <p:sld xmlns:a="http://schemas.openxmlformats.org/drawingml/2006/main" xmlns:r="http://schemas.openxmlformats.org/officeDocument/2006/relationships" xmlns:p="http://schemas.openxmlformats.org/presentationml/2006/main">
   <p:cSld>
     <p:spTree>
@@ -26924,7 +30524,7 @@
 </p:sld>
 </file>
 
-<file path=ppt/slides/slide32.xml><?xml version="1.0" encoding="utf-8"?>
+<file path=ppt/slides/slide35.xml><?xml version="1.0" encoding="utf-8"?>
 <p:sld xmlns:a="http://schemas.openxmlformats.org/drawingml/2006/main" xmlns:r="http://schemas.openxmlformats.org/officeDocument/2006/relationships" xmlns:p="http://schemas.openxmlformats.org/presentationml/2006/main">
   <p:cSld>
     <p:spTree>
@@ -27020,7 +30620,7 @@
 </p:sld>
 </file>
 
-<file path=ppt/slides/slide33.xml><?xml version="1.0" encoding="utf-8"?>
+<file path=ppt/slides/slide36.xml><?xml version="1.0" encoding="utf-8"?>
 <p:sld xmlns:a="http://schemas.openxmlformats.org/drawingml/2006/main" xmlns:r="http://schemas.openxmlformats.org/officeDocument/2006/relationships" xmlns:p="http://schemas.openxmlformats.org/presentationml/2006/main">
   <p:cSld>
     <p:spTree>
@@ -27112,7 +30712,7 @@
 </p:sld>
 </file>
 
-<file path=ppt/slides/slide34.xml><?xml version="1.0" encoding="utf-8"?>
+<file path=ppt/slides/slide37.xml><?xml version="1.0" encoding="utf-8"?>
 <p:sld xmlns:a="http://schemas.openxmlformats.org/drawingml/2006/main" xmlns:r="http://schemas.openxmlformats.org/officeDocument/2006/relationships" xmlns:p="http://schemas.openxmlformats.org/presentationml/2006/main">
   <p:cSld>
     <p:spTree>
@@ -27204,7 +30804,7 @@
 </p:sld>
 </file>
 
-<file path=ppt/slides/slide35.xml><?xml version="1.0" encoding="utf-8"?>
+<file path=ppt/slides/slide38.xml><?xml version="1.0" encoding="utf-8"?>
 <p:sld xmlns:a="http://schemas.openxmlformats.org/drawingml/2006/main" xmlns:r="http://schemas.openxmlformats.org/officeDocument/2006/relationships" xmlns:p="http://schemas.openxmlformats.org/presentationml/2006/main">
   <p:cSld>
     <p:spTree>
@@ -27313,7 +30913,7 @@
 </p:sld>
 </file>
 
-<file path=ppt/slides/slide36.xml><?xml version="1.0" encoding="utf-8"?>
+<file path=ppt/slides/slide39.xml><?xml version="1.0" encoding="utf-8"?>
 <p:sld xmlns:a="http://schemas.openxmlformats.org/drawingml/2006/main" xmlns:r="http://schemas.openxmlformats.org/officeDocument/2006/relationships" xmlns:p="http://schemas.openxmlformats.org/presentationml/2006/main">
   <p:cSld>
     <p:spTree>
@@ -27396,287 +30996,6 @@
     <p:extLst>
       <p:ext uri="{BB962C8B-B14F-4D97-AF65-F5344CB8AC3E}">
         <p14:creationId xmlns:p14="http://schemas.microsoft.com/office/powerpoint/2010/main" val="2728157078"/>
-      </p:ext>
-    </p:extLst>
-  </p:cSld>
-  <p:clrMapOvr>
-    <a:masterClrMapping/>
-  </p:clrMapOvr>
-</p:sld>
-</file>
-
-<file path=ppt/slides/slide37.xml><?xml version="1.0" encoding="utf-8"?>
-<p:sld xmlns:a="http://schemas.openxmlformats.org/drawingml/2006/main" xmlns:r="http://schemas.openxmlformats.org/officeDocument/2006/relationships" xmlns:p="http://schemas.openxmlformats.org/presentationml/2006/main">
-  <p:cSld>
-    <p:spTree>
-      <p:nvGrpSpPr>
-        <p:cNvPr id="1" name=""/>
-        <p:cNvGrpSpPr/>
-        <p:nvPr/>
-      </p:nvGrpSpPr>
-      <p:grpSpPr>
-        <a:xfrm>
-          <a:off x="0" y="0"/>
-          <a:ext cx="0" cy="0"/>
-          <a:chOff x="0" y="0"/>
-          <a:chExt cx="0" cy="0"/>
-        </a:xfrm>
-      </p:grpSpPr>
-      <p:sp>
-        <p:nvSpPr>
-          <p:cNvPr id="2" name="Title 1"/>
-          <p:cNvSpPr>
-            <a:spLocks noGrp="1"/>
-          </p:cNvSpPr>
-          <p:nvPr>
-            <p:ph type="title"/>
-          </p:nvPr>
-        </p:nvSpPr>
-        <p:spPr/>
-        <p:txBody>
-          <a:bodyPr/>
-          <a:lstStyle/>
-          <a:p>
-            <a:r>
-              <a:rPr lang="vi-VN" dirty="0"/>
-              <a:t>Glove(cost)</a:t>
-            </a:r>
-            <a:endParaRPr lang="en-US" dirty="0"/>
-          </a:p>
-        </p:txBody>
-      </p:sp>
-      <p:pic>
-        <p:nvPicPr>
-          <p:cNvPr id="6146" name="Picture 2" descr="https://miro.medium.com/max/1400/1*DLE0CW1BXLKPnk9HZiOxgw.jpeg"/>
-          <p:cNvPicPr>
-            <a:picLocks noGrp="1" noChangeAspect="1" noChangeArrowheads="1"/>
-          </p:cNvPicPr>
-          <p:nvPr>
-            <p:ph idx="1"/>
-          </p:nvPr>
-        </p:nvPicPr>
-        <p:blipFill>
-          <a:blip r:embed="rId2">
-            <a:extLst>
-              <a:ext uri="{28A0092B-C50C-407E-A947-70E740481C1C}">
-                <a14:useLocalDpi xmlns:a14="http://schemas.microsoft.com/office/drawing/2010/main" val="0"/>
-              </a:ext>
-            </a:extLst>
-          </a:blip>
-          <a:srcRect/>
-          <a:stretch>
-            <a:fillRect/>
-          </a:stretch>
-        </p:blipFill>
-        <p:spPr bwMode="auto">
-          <a:xfrm>
-            <a:off x="838200" y="2583493"/>
-            <a:ext cx="10515600" cy="2343476"/>
-          </a:xfrm>
-          <a:prstGeom prst="rect">
-            <a:avLst/>
-          </a:prstGeom>
-          <a:noFill/>
-          <a:extLst>
-            <a:ext uri="{909E8E84-426E-40DD-AFC4-6F175D3DCCD1}">
-              <a14:hiddenFill xmlns:a14="http://schemas.microsoft.com/office/drawing/2010/main">
-                <a:solidFill>
-                  <a:srgbClr val="FFFFFF"/>
-                </a:solidFill>
-              </a14:hiddenFill>
-            </a:ext>
-          </a:extLst>
-        </p:spPr>
-      </p:pic>
-    </p:spTree>
-    <p:extLst>
-      <p:ext uri="{BB962C8B-B14F-4D97-AF65-F5344CB8AC3E}">
-        <p14:creationId xmlns:p14="http://schemas.microsoft.com/office/powerpoint/2010/main" val="1056209568"/>
-      </p:ext>
-    </p:extLst>
-  </p:cSld>
-  <p:clrMapOvr>
-    <a:masterClrMapping/>
-  </p:clrMapOvr>
-</p:sld>
-</file>
-
-<file path=ppt/slides/slide38.xml><?xml version="1.0" encoding="utf-8"?>
-<p:sld xmlns:a="http://schemas.openxmlformats.org/drawingml/2006/main" xmlns:r="http://schemas.openxmlformats.org/officeDocument/2006/relationships" xmlns:p="http://schemas.openxmlformats.org/presentationml/2006/main">
-  <p:cSld>
-    <p:spTree>
-      <p:nvGrpSpPr>
-        <p:cNvPr id="1" name=""/>
-        <p:cNvGrpSpPr/>
-        <p:nvPr/>
-      </p:nvGrpSpPr>
-      <p:grpSpPr>
-        <a:xfrm>
-          <a:off x="0" y="0"/>
-          <a:ext cx="0" cy="0"/>
-          <a:chOff x="0" y="0"/>
-          <a:chExt cx="0" cy="0"/>
-        </a:xfrm>
-      </p:grpSpPr>
-      <p:sp>
-        <p:nvSpPr>
-          <p:cNvPr id="2" name="Title 1"/>
-          <p:cNvSpPr>
-            <a:spLocks noGrp="1"/>
-          </p:cNvSpPr>
-          <p:nvPr>
-            <p:ph type="title"/>
-          </p:nvPr>
-        </p:nvSpPr>
-        <p:spPr/>
-        <p:txBody>
-          <a:bodyPr/>
-          <a:lstStyle/>
-          <a:p>
-            <a:r>
-              <a:rPr lang="vi-VN" dirty="0"/>
-              <a:t>Elmo</a:t>
-            </a:r>
-            <a:endParaRPr lang="en-US" dirty="0"/>
-          </a:p>
-        </p:txBody>
-      </p:sp>
-      <p:pic>
-        <p:nvPicPr>
-          <p:cNvPr id="4" name="Content Placeholder 3" descr="https://miro.medium.com/max/1064/1*ko2Ut74J_oMxF4jSo1VnCg.png"/>
-          <p:cNvPicPr>
-            <a:picLocks noGrp="1"/>
-          </p:cNvPicPr>
-          <p:nvPr>
-            <p:ph idx="1"/>
-          </p:nvPr>
-        </p:nvPicPr>
-        <p:blipFill>
-          <a:blip r:embed="rId2">
-            <a:extLst>
-              <a:ext uri="{28A0092B-C50C-407E-A947-70E740481C1C}">
-                <a14:useLocalDpi xmlns:a14="http://schemas.microsoft.com/office/drawing/2010/main" val="0"/>
-              </a:ext>
-            </a:extLst>
-          </a:blip>
-          <a:srcRect/>
-          <a:stretch>
-            <a:fillRect/>
-          </a:stretch>
-        </p:blipFill>
-        <p:spPr bwMode="auto">
-          <a:xfrm>
-            <a:off x="1981569" y="1825625"/>
-            <a:ext cx="8228862" cy="3859213"/>
-          </a:xfrm>
-          <a:prstGeom prst="rect">
-            <a:avLst/>
-          </a:prstGeom>
-          <a:noFill/>
-          <a:ln>
-            <a:noFill/>
-          </a:ln>
-        </p:spPr>
-      </p:pic>
-    </p:spTree>
-    <p:extLst>
-      <p:ext uri="{BB962C8B-B14F-4D97-AF65-F5344CB8AC3E}">
-        <p14:creationId xmlns:p14="http://schemas.microsoft.com/office/powerpoint/2010/main" val="1669408570"/>
-      </p:ext>
-    </p:extLst>
-  </p:cSld>
-  <p:clrMapOvr>
-    <a:masterClrMapping/>
-  </p:clrMapOvr>
-</p:sld>
-</file>
-
-<file path=ppt/slides/slide39.xml><?xml version="1.0" encoding="utf-8"?>
-<p:sld xmlns:a="http://schemas.openxmlformats.org/drawingml/2006/main" xmlns:r="http://schemas.openxmlformats.org/officeDocument/2006/relationships" xmlns:p="http://schemas.openxmlformats.org/presentationml/2006/main">
-  <p:cSld>
-    <p:spTree>
-      <p:nvGrpSpPr>
-        <p:cNvPr id="1" name=""/>
-        <p:cNvGrpSpPr/>
-        <p:nvPr/>
-      </p:nvGrpSpPr>
-      <p:grpSpPr>
-        <a:xfrm>
-          <a:off x="0" y="0"/>
-          <a:ext cx="0" cy="0"/>
-          <a:chOff x="0" y="0"/>
-          <a:chExt cx="0" cy="0"/>
-        </a:xfrm>
-      </p:grpSpPr>
-      <p:sp>
-        <p:nvSpPr>
-          <p:cNvPr id="2" name="Title 1"/>
-          <p:cNvSpPr>
-            <a:spLocks noGrp="1"/>
-          </p:cNvSpPr>
-          <p:nvPr>
-            <p:ph type="title"/>
-          </p:nvPr>
-        </p:nvSpPr>
-        <p:spPr/>
-        <p:txBody>
-          <a:bodyPr/>
-          <a:lstStyle/>
-          <a:p>
-            <a:r>
-              <a:rPr lang="en-US" dirty="0"/>
-              <a:t>Elmo</a:t>
-            </a:r>
-          </a:p>
-        </p:txBody>
-      </p:sp>
-      <p:pic>
-        <p:nvPicPr>
-          <p:cNvPr id="2050" name="Picture 2" descr="https://www.mihaileric.com/static/baseline_biLM-f9173e8e65a8597d3d8a909f3aee39f1-36fb0.png"/>
-          <p:cNvPicPr>
-            <a:picLocks noGrp="1" noChangeAspect="1" noChangeArrowheads="1"/>
-          </p:cNvPicPr>
-          <p:nvPr>
-            <p:ph idx="1"/>
-          </p:nvPr>
-        </p:nvPicPr>
-        <p:blipFill>
-          <a:blip r:embed="rId2">
-            <a:extLst>
-              <a:ext uri="{28A0092B-C50C-407E-A947-70E740481C1C}">
-                <a14:useLocalDpi xmlns:a14="http://schemas.microsoft.com/office/drawing/2010/main" val="0"/>
-              </a:ext>
-            </a:extLst>
-          </a:blip>
-          <a:srcRect/>
-          <a:stretch>
-            <a:fillRect/>
-          </a:stretch>
-        </p:blipFill>
-        <p:spPr bwMode="auto">
-          <a:xfrm>
-            <a:off x="3331405" y="1476002"/>
-            <a:ext cx="5529190" cy="4994811"/>
-          </a:xfrm>
-          <a:prstGeom prst="rect">
-            <a:avLst/>
-          </a:prstGeom>
-          <a:noFill/>
-          <a:extLst>
-            <a:ext uri="{909E8E84-426E-40DD-AFC4-6F175D3DCCD1}">
-              <a14:hiddenFill xmlns:a14="http://schemas.microsoft.com/office/drawing/2010/main">
-                <a:solidFill>
-                  <a:srgbClr val="FFFFFF"/>
-                </a:solidFill>
-              </a14:hiddenFill>
-            </a:ext>
-          </a:extLst>
-        </p:spPr>
-      </p:pic>
-    </p:spTree>
-    <p:extLst>
-      <p:ext uri="{BB962C8B-B14F-4D97-AF65-F5344CB8AC3E}">
-        <p14:creationId xmlns:p14="http://schemas.microsoft.com/office/powerpoint/2010/main" val="1017846679"/>
       </p:ext>
     </p:extLst>
   </p:cSld>
@@ -27804,6 +31123,287 @@
           <a:bodyPr/>
           <a:lstStyle/>
           <a:p>
+            <a:r>
+              <a:rPr lang="vi-VN" dirty="0"/>
+              <a:t>Glove(cost)</a:t>
+            </a:r>
+            <a:endParaRPr lang="en-US" dirty="0"/>
+          </a:p>
+        </p:txBody>
+      </p:sp>
+      <p:pic>
+        <p:nvPicPr>
+          <p:cNvPr id="6146" name="Picture 2" descr="https://miro.medium.com/max/1400/1*DLE0CW1BXLKPnk9HZiOxgw.jpeg"/>
+          <p:cNvPicPr>
+            <a:picLocks noGrp="1" noChangeAspect="1" noChangeArrowheads="1"/>
+          </p:cNvPicPr>
+          <p:nvPr>
+            <p:ph idx="1"/>
+          </p:nvPr>
+        </p:nvPicPr>
+        <p:blipFill>
+          <a:blip r:embed="rId2">
+            <a:extLst>
+              <a:ext uri="{28A0092B-C50C-407E-A947-70E740481C1C}">
+                <a14:useLocalDpi xmlns:a14="http://schemas.microsoft.com/office/drawing/2010/main" val="0"/>
+              </a:ext>
+            </a:extLst>
+          </a:blip>
+          <a:srcRect/>
+          <a:stretch>
+            <a:fillRect/>
+          </a:stretch>
+        </p:blipFill>
+        <p:spPr bwMode="auto">
+          <a:xfrm>
+            <a:off x="838200" y="2583493"/>
+            <a:ext cx="10515600" cy="2343476"/>
+          </a:xfrm>
+          <a:prstGeom prst="rect">
+            <a:avLst/>
+          </a:prstGeom>
+          <a:noFill/>
+          <a:extLst>
+            <a:ext uri="{909E8E84-426E-40DD-AFC4-6F175D3DCCD1}">
+              <a14:hiddenFill xmlns:a14="http://schemas.microsoft.com/office/drawing/2010/main">
+                <a:solidFill>
+                  <a:srgbClr val="FFFFFF"/>
+                </a:solidFill>
+              </a14:hiddenFill>
+            </a:ext>
+          </a:extLst>
+        </p:spPr>
+      </p:pic>
+    </p:spTree>
+    <p:extLst>
+      <p:ext uri="{BB962C8B-B14F-4D97-AF65-F5344CB8AC3E}">
+        <p14:creationId xmlns:p14="http://schemas.microsoft.com/office/powerpoint/2010/main" val="1056209568"/>
+      </p:ext>
+    </p:extLst>
+  </p:cSld>
+  <p:clrMapOvr>
+    <a:masterClrMapping/>
+  </p:clrMapOvr>
+</p:sld>
+</file>
+
+<file path=ppt/slides/slide41.xml><?xml version="1.0" encoding="utf-8"?>
+<p:sld xmlns:a="http://schemas.openxmlformats.org/drawingml/2006/main" xmlns:r="http://schemas.openxmlformats.org/officeDocument/2006/relationships" xmlns:p="http://schemas.openxmlformats.org/presentationml/2006/main">
+  <p:cSld>
+    <p:spTree>
+      <p:nvGrpSpPr>
+        <p:cNvPr id="1" name=""/>
+        <p:cNvGrpSpPr/>
+        <p:nvPr/>
+      </p:nvGrpSpPr>
+      <p:grpSpPr>
+        <a:xfrm>
+          <a:off x="0" y="0"/>
+          <a:ext cx="0" cy="0"/>
+          <a:chOff x="0" y="0"/>
+          <a:chExt cx="0" cy="0"/>
+        </a:xfrm>
+      </p:grpSpPr>
+      <p:sp>
+        <p:nvSpPr>
+          <p:cNvPr id="2" name="Title 1"/>
+          <p:cNvSpPr>
+            <a:spLocks noGrp="1"/>
+          </p:cNvSpPr>
+          <p:nvPr>
+            <p:ph type="title"/>
+          </p:nvPr>
+        </p:nvSpPr>
+        <p:spPr/>
+        <p:txBody>
+          <a:bodyPr/>
+          <a:lstStyle/>
+          <a:p>
+            <a:r>
+              <a:rPr lang="vi-VN" dirty="0"/>
+              <a:t>Elmo</a:t>
+            </a:r>
+            <a:endParaRPr lang="en-US" dirty="0"/>
+          </a:p>
+        </p:txBody>
+      </p:sp>
+      <p:pic>
+        <p:nvPicPr>
+          <p:cNvPr id="4" name="Content Placeholder 3" descr="https://miro.medium.com/max/1064/1*ko2Ut74J_oMxF4jSo1VnCg.png"/>
+          <p:cNvPicPr>
+            <a:picLocks noGrp="1"/>
+          </p:cNvPicPr>
+          <p:nvPr>
+            <p:ph idx="1"/>
+          </p:nvPr>
+        </p:nvPicPr>
+        <p:blipFill>
+          <a:blip r:embed="rId2">
+            <a:extLst>
+              <a:ext uri="{28A0092B-C50C-407E-A947-70E740481C1C}">
+                <a14:useLocalDpi xmlns:a14="http://schemas.microsoft.com/office/drawing/2010/main" val="0"/>
+              </a:ext>
+            </a:extLst>
+          </a:blip>
+          <a:srcRect/>
+          <a:stretch>
+            <a:fillRect/>
+          </a:stretch>
+        </p:blipFill>
+        <p:spPr bwMode="auto">
+          <a:xfrm>
+            <a:off x="1981569" y="1825625"/>
+            <a:ext cx="8228862" cy="3859213"/>
+          </a:xfrm>
+          <a:prstGeom prst="rect">
+            <a:avLst/>
+          </a:prstGeom>
+          <a:noFill/>
+          <a:ln>
+            <a:noFill/>
+          </a:ln>
+        </p:spPr>
+      </p:pic>
+    </p:spTree>
+    <p:extLst>
+      <p:ext uri="{BB962C8B-B14F-4D97-AF65-F5344CB8AC3E}">
+        <p14:creationId xmlns:p14="http://schemas.microsoft.com/office/powerpoint/2010/main" val="1669408570"/>
+      </p:ext>
+    </p:extLst>
+  </p:cSld>
+  <p:clrMapOvr>
+    <a:masterClrMapping/>
+  </p:clrMapOvr>
+</p:sld>
+</file>
+
+<file path=ppt/slides/slide42.xml><?xml version="1.0" encoding="utf-8"?>
+<p:sld xmlns:a="http://schemas.openxmlformats.org/drawingml/2006/main" xmlns:r="http://schemas.openxmlformats.org/officeDocument/2006/relationships" xmlns:p="http://schemas.openxmlformats.org/presentationml/2006/main">
+  <p:cSld>
+    <p:spTree>
+      <p:nvGrpSpPr>
+        <p:cNvPr id="1" name=""/>
+        <p:cNvGrpSpPr/>
+        <p:nvPr/>
+      </p:nvGrpSpPr>
+      <p:grpSpPr>
+        <a:xfrm>
+          <a:off x="0" y="0"/>
+          <a:ext cx="0" cy="0"/>
+          <a:chOff x="0" y="0"/>
+          <a:chExt cx="0" cy="0"/>
+        </a:xfrm>
+      </p:grpSpPr>
+      <p:sp>
+        <p:nvSpPr>
+          <p:cNvPr id="2" name="Title 1"/>
+          <p:cNvSpPr>
+            <a:spLocks noGrp="1"/>
+          </p:cNvSpPr>
+          <p:nvPr>
+            <p:ph type="title"/>
+          </p:nvPr>
+        </p:nvSpPr>
+        <p:spPr/>
+        <p:txBody>
+          <a:bodyPr/>
+          <a:lstStyle/>
+          <a:p>
+            <a:r>
+              <a:rPr lang="en-US" dirty="0"/>
+              <a:t>Elmo</a:t>
+            </a:r>
+          </a:p>
+        </p:txBody>
+      </p:sp>
+      <p:pic>
+        <p:nvPicPr>
+          <p:cNvPr id="2050" name="Picture 2" descr="https://www.mihaileric.com/static/baseline_biLM-f9173e8e65a8597d3d8a909f3aee39f1-36fb0.png"/>
+          <p:cNvPicPr>
+            <a:picLocks noGrp="1" noChangeAspect="1" noChangeArrowheads="1"/>
+          </p:cNvPicPr>
+          <p:nvPr>
+            <p:ph idx="1"/>
+          </p:nvPr>
+        </p:nvPicPr>
+        <p:blipFill>
+          <a:blip r:embed="rId2">
+            <a:extLst>
+              <a:ext uri="{28A0092B-C50C-407E-A947-70E740481C1C}">
+                <a14:useLocalDpi xmlns:a14="http://schemas.microsoft.com/office/drawing/2010/main" val="0"/>
+              </a:ext>
+            </a:extLst>
+          </a:blip>
+          <a:srcRect/>
+          <a:stretch>
+            <a:fillRect/>
+          </a:stretch>
+        </p:blipFill>
+        <p:spPr bwMode="auto">
+          <a:xfrm>
+            <a:off x="3331405" y="1476002"/>
+            <a:ext cx="5529190" cy="4994811"/>
+          </a:xfrm>
+          <a:prstGeom prst="rect">
+            <a:avLst/>
+          </a:prstGeom>
+          <a:noFill/>
+          <a:extLst>
+            <a:ext uri="{909E8E84-426E-40DD-AFC4-6F175D3DCCD1}">
+              <a14:hiddenFill xmlns:a14="http://schemas.microsoft.com/office/drawing/2010/main">
+                <a:solidFill>
+                  <a:srgbClr val="FFFFFF"/>
+                </a:solidFill>
+              </a14:hiddenFill>
+            </a:ext>
+          </a:extLst>
+        </p:spPr>
+      </p:pic>
+    </p:spTree>
+    <p:extLst>
+      <p:ext uri="{BB962C8B-B14F-4D97-AF65-F5344CB8AC3E}">
+        <p14:creationId xmlns:p14="http://schemas.microsoft.com/office/powerpoint/2010/main" val="1017846679"/>
+      </p:ext>
+    </p:extLst>
+  </p:cSld>
+  <p:clrMapOvr>
+    <a:masterClrMapping/>
+  </p:clrMapOvr>
+</p:sld>
+</file>
+
+<file path=ppt/slides/slide43.xml><?xml version="1.0" encoding="utf-8"?>
+<p:sld xmlns:a="http://schemas.openxmlformats.org/drawingml/2006/main" xmlns:r="http://schemas.openxmlformats.org/officeDocument/2006/relationships" xmlns:p="http://schemas.openxmlformats.org/presentationml/2006/main">
+  <p:cSld>
+    <p:spTree>
+      <p:nvGrpSpPr>
+        <p:cNvPr id="1" name=""/>
+        <p:cNvGrpSpPr/>
+        <p:nvPr/>
+      </p:nvGrpSpPr>
+      <p:grpSpPr>
+        <a:xfrm>
+          <a:off x="0" y="0"/>
+          <a:ext cx="0" cy="0"/>
+          <a:chOff x="0" y="0"/>
+          <a:chExt cx="0" cy="0"/>
+        </a:xfrm>
+      </p:grpSpPr>
+      <p:sp>
+        <p:nvSpPr>
+          <p:cNvPr id="2" name="Title 1"/>
+          <p:cNvSpPr>
+            <a:spLocks noGrp="1"/>
+          </p:cNvSpPr>
+          <p:nvPr>
+            <p:ph type="title"/>
+          </p:nvPr>
+        </p:nvSpPr>
+        <p:spPr/>
+        <p:txBody>
+          <a:bodyPr/>
+          <a:lstStyle/>
+          <a:p>
             <a:endParaRPr lang="en-US"/>
           </a:p>
         </p:txBody>
@@ -27864,7 +31464,7 @@
 </p:sld>
 </file>
 
-<file path=ppt/slides/slide41.xml><?xml version="1.0" encoding="utf-8"?>
+<file path=ppt/slides/slide44.xml><?xml version="1.0" encoding="utf-8"?>
 <p:sld xmlns:a="http://schemas.openxmlformats.org/drawingml/2006/main" xmlns:r="http://schemas.openxmlformats.org/officeDocument/2006/relationships" xmlns:p="http://schemas.openxmlformats.org/presentationml/2006/main">
   <p:cSld>
     <p:spTree>

</xml_diff>